<commit_message>
added examples of basic git commands in ppx
</commit_message>
<xml_diff>
--- a/Intro to git.pptx
+++ b/Intro to git.pptx
@@ -12,6 +12,14 @@
     <p:sldId id="260" r:id="rId6"/>
     <p:sldId id="261" r:id="rId7"/>
     <p:sldId id="262" r:id="rId8"/>
+    <p:sldId id="263" r:id="rId9"/>
+    <p:sldId id="264" r:id="rId10"/>
+    <p:sldId id="265" r:id="rId11"/>
+    <p:sldId id="266" r:id="rId12"/>
+    <p:sldId id="267" r:id="rId13"/>
+    <p:sldId id="268" r:id="rId14"/>
+    <p:sldId id="269" r:id="rId15"/>
+    <p:sldId id="270" r:id="rId16"/>
   </p:sldIdLst>
   <p:sldSz cx="12192000" cy="6858000"/>
   <p:notesSz cx="6858000" cy="9144000"/>
@@ -110,6 +118,11 @@
       </a:defRPr>
     </a:lvl9pPr>
   </p:defaultTextStyle>
+  <p:extLst>
+    <p:ext uri="{EFAFB233-063F-42B5-8137-9DF3F51BA10A}">
+      <p15:sldGuideLst xmlns:p15="http://schemas.microsoft.com/office/powerpoint/2012/main"/>
+    </p:ext>
+  </p:extLst>
 </p:presentation>
 </file>
 
@@ -449,7 +462,7 @@
             <a:fld id="{5923F103-BC34-4FE4-A40E-EDDEECFDA5D0}" type="datetimeFigureOut">
               <a:rPr lang="en-US" dirty="0"/>
               <a:pPr/>
-              <a:t>3/22/2016</a:t>
+              <a:t>4/2/2016</a:t>
             </a:fld>
             <a:endParaRPr lang="en-US" dirty="0"/>
           </a:p>
@@ -1537,7 +1550,7 @@
           <a:p>
             <a:fld id="{923A1CC3-2375-41D4-9E03-427CAF2A4C1A}" type="datetimeFigureOut">
               <a:rPr lang="en-US" dirty="0"/>
-              <a:t>3/22/2016</a:t>
+              <a:t>4/2/2016</a:t>
             </a:fld>
             <a:endParaRPr lang="en-US" dirty="0"/>
           </a:p>
@@ -2517,7 +2530,7 @@
           <a:p>
             <a:fld id="{AFF16868-8199-4C2C-A5B1-63AEE139F88E}" type="datetimeFigureOut">
               <a:rPr lang="en-US" dirty="0"/>
-              <a:t>3/22/2016</a:t>
+              <a:t>4/2/2016</a:t>
             </a:fld>
             <a:endParaRPr lang="en-US" dirty="0"/>
           </a:p>
@@ -3651,7 +3664,7 @@
           <a:p>
             <a:fld id="{AAD9FF7F-6988-44CC-821B-644E70CD2F73}" type="datetimeFigureOut">
               <a:rPr lang="en-US" dirty="0"/>
-              <a:t>3/22/2016</a:t>
+              <a:t>4/2/2016</a:t>
             </a:fld>
             <a:endParaRPr lang="en-US" dirty="0"/>
           </a:p>
@@ -4684,7 +4697,7 @@
           <a:p>
             <a:fld id="{5C12C299-16B2-4475-990D-751901EACC14}" type="datetimeFigureOut">
               <a:rPr lang="en-US" dirty="0"/>
-              <a:t>3/22/2016</a:t>
+              <a:t>4/2/2016</a:t>
             </a:fld>
             <a:endParaRPr lang="en-US" dirty="0"/>
           </a:p>
@@ -5344,7 +5357,7 @@
           <a:p>
             <a:fld id="{9FE86839-B9D8-4651-8783-F325ECE74E65}" type="datetimeFigureOut">
               <a:rPr lang="en-US" dirty="0"/>
-              <a:t>3/22/2016</a:t>
+              <a:t>4/2/2016</a:t>
             </a:fld>
             <a:endParaRPr lang="en-US" dirty="0"/>
           </a:p>
@@ -6205,7 +6218,7 @@
           <a:p>
             <a:fld id="{FD484F64-32F6-45C5-931F-ADC1662401D0}" type="datetimeFigureOut">
               <a:rPr lang="en-US" dirty="0"/>
-              <a:t>3/22/2016</a:t>
+              <a:t>4/2/2016</a:t>
             </a:fld>
             <a:endParaRPr lang="en-US" dirty="0"/>
           </a:p>
@@ -6395,7 +6408,7 @@
           <a:p>
             <a:fld id="{53086D93-FCAC-47E0-A2EE-787E62CA814C}" type="datetimeFigureOut">
               <a:rPr lang="en-US" dirty="0"/>
-              <a:t>3/22/2016</a:t>
+              <a:t>4/2/2016</a:t>
             </a:fld>
             <a:endParaRPr lang="en-US" dirty="0"/>
           </a:p>
@@ -7367,7 +7380,7 @@
           <a:p>
             <a:fld id="{CDA879A6-0FD0-4734-A311-86BFCA472E6E}" type="datetimeFigureOut">
               <a:rPr lang="en-US" dirty="0"/>
-              <a:t>3/22/2016</a:t>
+              <a:t>4/2/2016</a:t>
             </a:fld>
             <a:endParaRPr lang="en-US" dirty="0"/>
           </a:p>
@@ -7578,7 +7591,7 @@
           <a:p>
             <a:fld id="{19C9CA7B-DFD4-44B5-8C60-D14B8CD1FB59}" type="datetimeFigureOut">
               <a:rPr lang="en-US" dirty="0"/>
-              <a:t>3/22/2016</a:t>
+              <a:t>4/2/2016</a:t>
             </a:fld>
             <a:endParaRPr lang="en-US" dirty="0"/>
           </a:p>
@@ -8612,7 +8625,7 @@
           <a:p>
             <a:fld id="{F34E6425-0181-43F2-84FC-787E803FD2F8}" type="datetimeFigureOut">
               <a:rPr lang="en-US" dirty="0"/>
-              <a:t>3/22/2016</a:t>
+              <a:t>4/2/2016</a:t>
             </a:fld>
             <a:endParaRPr lang="en-US" dirty="0"/>
           </a:p>
@@ -8884,7 +8897,7 @@
           <a:p>
             <a:fld id="{3BDB8791-F1B0-41E7-B7FD-A781E65C4266}" type="datetimeFigureOut">
               <a:rPr lang="en-US" dirty="0"/>
-              <a:t>3/22/2016</a:t>
+              <a:t>4/2/2016</a:t>
             </a:fld>
             <a:endParaRPr lang="en-US" dirty="0"/>
           </a:p>
@@ -9294,7 +9307,7 @@
           <a:p>
             <a:fld id="{5FDD63B2-E120-4ED8-B27B-C685F510A5FE}" type="datetimeFigureOut">
               <a:rPr lang="en-US" dirty="0"/>
-              <a:t>3/22/2016</a:t>
+              <a:t>4/2/2016</a:t>
             </a:fld>
             <a:endParaRPr lang="en-US" dirty="0"/>
           </a:p>
@@ -9421,7 +9434,7 @@
           <a:p>
             <a:fld id="{7AA18ACC-A947-437B-A130-35BD54FDF1E9}" type="datetimeFigureOut">
               <a:rPr lang="en-US" dirty="0"/>
-              <a:t>3/22/2016</a:t>
+              <a:t>4/2/2016</a:t>
             </a:fld>
             <a:endParaRPr lang="en-US" dirty="0"/>
           </a:p>
@@ -9516,7 +9529,7 @@
           <a:p>
             <a:fld id="{7C8D7E02-BCB8-4D50-A234-369438C08659}" type="datetimeFigureOut">
               <a:rPr lang="en-US" dirty="0"/>
-              <a:t>3/22/2016</a:t>
+              <a:t>4/2/2016</a:t>
             </a:fld>
             <a:endParaRPr lang="en-US" dirty="0"/>
           </a:p>
@@ -10597,7 +10610,7 @@
           <a:p>
             <a:fld id="{76E86A4C-8E40-4F87-A4F0-01A0687C5742}" type="datetimeFigureOut">
               <a:rPr lang="en-US" dirty="0"/>
-              <a:t>3/22/2016</a:t>
+              <a:t>4/2/2016</a:t>
             </a:fld>
             <a:endParaRPr lang="en-US" dirty="0"/>
           </a:p>
@@ -11705,7 +11718,7 @@
           <a:p>
             <a:fld id="{35E72C73-2D91-4E12-BA25-F0AA0C03599B}" type="datetimeFigureOut">
               <a:rPr lang="en-US" dirty="0"/>
-              <a:t>3/22/2016</a:t>
+              <a:t>4/2/2016</a:t>
             </a:fld>
             <a:endParaRPr lang="en-US" dirty="0"/>
           </a:p>
@@ -12702,7 +12715,7 @@
           <a:p>
             <a:fld id="{2BE451C3-0FF4-47C4-B829-773ADF60F88C}" type="datetimeFigureOut">
               <a:rPr lang="en-US" dirty="0"/>
-              <a:t>3/22/2016</a:t>
+              <a:t>4/2/2016</a:t>
             </a:fld>
             <a:endParaRPr lang="en-US" dirty="0"/>
           </a:p>
@@ -13415,6 +13428,618 @@
 </p:sld>
 </file>
 
+<file path=ppt/slides/slide10.xml><?xml version="1.0" encoding="utf-8"?>
+<p:sld xmlns:a="http://schemas.openxmlformats.org/drawingml/2006/main" xmlns:r="http://schemas.openxmlformats.org/officeDocument/2006/relationships" xmlns:p="http://schemas.openxmlformats.org/presentationml/2006/main">
+  <p:cSld>
+    <p:spTree>
+      <p:nvGrpSpPr>
+        <p:cNvPr id="1" name=""/>
+        <p:cNvGrpSpPr/>
+        <p:nvPr/>
+      </p:nvGrpSpPr>
+      <p:grpSpPr>
+        <a:xfrm>
+          <a:off x="0" y="0"/>
+          <a:ext cx="0" cy="0"/>
+          <a:chOff x="0" y="0"/>
+          <a:chExt cx="0" cy="0"/>
+        </a:xfrm>
+      </p:grpSpPr>
+      <p:sp>
+        <p:nvSpPr>
+          <p:cNvPr id="2" name="Title 1"/>
+          <p:cNvSpPr>
+            <a:spLocks noGrp="1"/>
+          </p:cNvSpPr>
+          <p:nvPr>
+            <p:ph type="title"/>
+          </p:nvPr>
+        </p:nvSpPr>
+        <p:spPr/>
+        <p:txBody>
+          <a:bodyPr/>
+          <a:lstStyle/>
+          <a:p>
+            <a:r>
+              <a:rPr lang="en-US" dirty="0" smtClean="0"/>
+              <a:t>Examples of basic </a:t>
+            </a:r>
+            <a:r>
+              <a:rPr lang="en-US" dirty="0" err="1" smtClean="0"/>
+              <a:t>Git</a:t>
+            </a:r>
+            <a:r>
+              <a:rPr lang="en-US" dirty="0" smtClean="0"/>
+              <a:t> commands</a:t>
+            </a:r>
+            <a:endParaRPr lang="en-US" dirty="0"/>
+          </a:p>
+        </p:txBody>
+      </p:sp>
+      <p:sp>
+        <p:nvSpPr>
+          <p:cNvPr id="3" name="Content Placeholder 2"/>
+          <p:cNvSpPr>
+            <a:spLocks noGrp="1"/>
+          </p:cNvSpPr>
+          <p:nvPr>
+            <p:ph idx="1"/>
+          </p:nvPr>
+        </p:nvSpPr>
+        <p:spPr>
+          <a:xfrm>
+            <a:off x="1154954" y="2603500"/>
+            <a:ext cx="8825659" cy="435914"/>
+          </a:xfrm>
+        </p:spPr>
+        <p:txBody>
+          <a:bodyPr/>
+          <a:lstStyle/>
+          <a:p>
+            <a:r>
+              <a:rPr lang="en-US" dirty="0" smtClean="0"/>
+              <a:t>Once we have a commit, we can push or we can add more commits.</a:t>
+            </a:r>
+            <a:endParaRPr lang="en-US" dirty="0"/>
+          </a:p>
+        </p:txBody>
+      </p:sp>
+    </p:spTree>
+    <p:extLst>
+      <p:ext uri="{BB962C8B-B14F-4D97-AF65-F5344CB8AC3E}">
+        <p14:creationId xmlns:p14="http://schemas.microsoft.com/office/powerpoint/2010/main" val="463719291"/>
+      </p:ext>
+    </p:extLst>
+  </p:cSld>
+  <p:clrMapOvr>
+    <a:masterClrMapping/>
+  </p:clrMapOvr>
+</p:sld>
+</file>
+
+<file path=ppt/slides/slide11.xml><?xml version="1.0" encoding="utf-8"?>
+<p:sld xmlns:a="http://schemas.openxmlformats.org/drawingml/2006/main" xmlns:r="http://schemas.openxmlformats.org/officeDocument/2006/relationships" xmlns:p="http://schemas.openxmlformats.org/presentationml/2006/main">
+  <p:cSld>
+    <p:spTree>
+      <p:nvGrpSpPr>
+        <p:cNvPr id="1" name=""/>
+        <p:cNvGrpSpPr/>
+        <p:nvPr/>
+      </p:nvGrpSpPr>
+      <p:grpSpPr>
+        <a:xfrm>
+          <a:off x="0" y="0"/>
+          <a:ext cx="0" cy="0"/>
+          <a:chOff x="0" y="0"/>
+          <a:chExt cx="0" cy="0"/>
+        </a:xfrm>
+      </p:grpSpPr>
+      <p:pic>
+        <p:nvPicPr>
+          <p:cNvPr id="4" name="Content Placeholder 3"/>
+          <p:cNvPicPr>
+            <a:picLocks noGrp="1" noChangeAspect="1"/>
+          </p:cNvPicPr>
+          <p:nvPr>
+            <p:ph idx="1"/>
+          </p:nvPr>
+        </p:nvPicPr>
+        <p:blipFill>
+          <a:blip r:embed="rId2">
+            <a:extLst>
+              <a:ext uri="{28A0092B-C50C-407E-A947-70E740481C1C}">
+                <a14:useLocalDpi xmlns:a14="http://schemas.microsoft.com/office/drawing/2010/main" val="0"/>
+              </a:ext>
+            </a:extLst>
+          </a:blip>
+          <a:stretch>
+            <a:fillRect/>
+          </a:stretch>
+        </p:blipFill>
+        <p:spPr>
+          <a:xfrm>
+            <a:off x="995256" y="1108657"/>
+            <a:ext cx="9153296" cy="5678653"/>
+          </a:xfrm>
+        </p:spPr>
+      </p:pic>
+    </p:spTree>
+    <p:extLst>
+      <p:ext uri="{BB962C8B-B14F-4D97-AF65-F5344CB8AC3E}">
+        <p14:creationId xmlns:p14="http://schemas.microsoft.com/office/powerpoint/2010/main" val="3925122114"/>
+      </p:ext>
+    </p:extLst>
+  </p:cSld>
+  <p:clrMapOvr>
+    <a:masterClrMapping/>
+  </p:clrMapOvr>
+</p:sld>
+</file>
+
+<file path=ppt/slides/slide12.xml><?xml version="1.0" encoding="utf-8"?>
+<p:sld xmlns:a="http://schemas.openxmlformats.org/drawingml/2006/main" xmlns:r="http://schemas.openxmlformats.org/officeDocument/2006/relationships" xmlns:p="http://schemas.openxmlformats.org/presentationml/2006/main">
+  <p:cSld>
+    <p:spTree>
+      <p:nvGrpSpPr>
+        <p:cNvPr id="1" name=""/>
+        <p:cNvGrpSpPr/>
+        <p:nvPr/>
+      </p:nvGrpSpPr>
+      <p:grpSpPr>
+        <a:xfrm>
+          <a:off x="0" y="0"/>
+          <a:ext cx="0" cy="0"/>
+          <a:chOff x="0" y="0"/>
+          <a:chExt cx="0" cy="0"/>
+        </a:xfrm>
+      </p:grpSpPr>
+      <p:sp>
+        <p:nvSpPr>
+          <p:cNvPr id="2" name="Title 1"/>
+          <p:cNvSpPr>
+            <a:spLocks noGrp="1"/>
+          </p:cNvSpPr>
+          <p:nvPr>
+            <p:ph type="title"/>
+          </p:nvPr>
+        </p:nvSpPr>
+        <p:spPr/>
+        <p:txBody>
+          <a:bodyPr/>
+          <a:lstStyle/>
+          <a:p>
+            <a:r>
+              <a:rPr lang="en-US" dirty="0" smtClean="0"/>
+              <a:t>Examples of basic </a:t>
+            </a:r>
+            <a:r>
+              <a:rPr lang="en-US" dirty="0" err="1" smtClean="0"/>
+              <a:t>Git</a:t>
+            </a:r>
+            <a:r>
+              <a:rPr lang="en-US" dirty="0"/>
+              <a:t> </a:t>
+            </a:r>
+            <a:r>
+              <a:rPr lang="en-US" dirty="0" smtClean="0"/>
+              <a:t>commands</a:t>
+            </a:r>
+            <a:endParaRPr lang="en-US" dirty="0"/>
+          </a:p>
+        </p:txBody>
+      </p:sp>
+      <p:sp>
+        <p:nvSpPr>
+          <p:cNvPr id="3" name="Content Placeholder 2"/>
+          <p:cNvSpPr>
+            <a:spLocks noGrp="1"/>
+          </p:cNvSpPr>
+          <p:nvPr>
+            <p:ph idx="1"/>
+          </p:nvPr>
+        </p:nvSpPr>
+        <p:spPr>
+          <a:xfrm>
+            <a:off x="1296622" y="2448953"/>
+            <a:ext cx="8825659" cy="757886"/>
+          </a:xfrm>
+        </p:spPr>
+        <p:txBody>
+          <a:bodyPr/>
+          <a:lstStyle/>
+          <a:p>
+            <a:r>
+              <a:rPr lang="en-US" dirty="0" smtClean="0"/>
+              <a:t>When we feel compelled that our changes should be added to the remote repository, we push our commit(s).</a:t>
+            </a:r>
+            <a:endParaRPr lang="en-US" dirty="0"/>
+          </a:p>
+        </p:txBody>
+      </p:sp>
+    </p:spTree>
+    <p:extLst>
+      <p:ext uri="{BB962C8B-B14F-4D97-AF65-F5344CB8AC3E}">
+        <p14:creationId xmlns:p14="http://schemas.microsoft.com/office/powerpoint/2010/main" val="67755914"/>
+      </p:ext>
+    </p:extLst>
+  </p:cSld>
+  <p:clrMapOvr>
+    <a:masterClrMapping/>
+  </p:clrMapOvr>
+</p:sld>
+</file>
+
+<file path=ppt/slides/slide13.xml><?xml version="1.0" encoding="utf-8"?>
+<p:sld xmlns:a="http://schemas.openxmlformats.org/drawingml/2006/main" xmlns:r="http://schemas.openxmlformats.org/officeDocument/2006/relationships" xmlns:p="http://schemas.openxmlformats.org/presentationml/2006/main">
+  <p:cSld>
+    <p:spTree>
+      <p:nvGrpSpPr>
+        <p:cNvPr id="1" name=""/>
+        <p:cNvGrpSpPr/>
+        <p:nvPr/>
+      </p:nvGrpSpPr>
+      <p:grpSpPr>
+        <a:xfrm>
+          <a:off x="0" y="0"/>
+          <a:ext cx="0" cy="0"/>
+          <a:chOff x="0" y="0"/>
+          <a:chExt cx="0" cy="0"/>
+        </a:xfrm>
+      </p:grpSpPr>
+      <p:pic>
+        <p:nvPicPr>
+          <p:cNvPr id="4" name="Content Placeholder 3"/>
+          <p:cNvPicPr>
+            <a:picLocks noGrp="1" noChangeAspect="1"/>
+          </p:cNvPicPr>
+          <p:nvPr>
+            <p:ph idx="1"/>
+          </p:nvPr>
+        </p:nvPicPr>
+        <p:blipFill>
+          <a:blip r:embed="rId2">
+            <a:extLst>
+              <a:ext uri="{28A0092B-C50C-407E-A947-70E740481C1C}">
+                <a14:useLocalDpi xmlns:a14="http://schemas.microsoft.com/office/drawing/2010/main" val="0"/>
+              </a:ext>
+            </a:extLst>
+          </a:blip>
+          <a:stretch>
+            <a:fillRect/>
+          </a:stretch>
+        </p:blipFill>
+        <p:spPr>
+          <a:xfrm>
+            <a:off x="1050161" y="772732"/>
+            <a:ext cx="9188543" cy="5909849"/>
+          </a:xfrm>
+        </p:spPr>
+      </p:pic>
+    </p:spTree>
+    <p:extLst>
+      <p:ext uri="{BB962C8B-B14F-4D97-AF65-F5344CB8AC3E}">
+        <p14:creationId xmlns:p14="http://schemas.microsoft.com/office/powerpoint/2010/main" val="1427423542"/>
+      </p:ext>
+    </p:extLst>
+  </p:cSld>
+  <p:clrMapOvr>
+    <a:masterClrMapping/>
+  </p:clrMapOvr>
+</p:sld>
+</file>
+
+<file path=ppt/slides/slide14.xml><?xml version="1.0" encoding="utf-8"?>
+<p:sld xmlns:a="http://schemas.openxmlformats.org/drawingml/2006/main" xmlns:r="http://schemas.openxmlformats.org/officeDocument/2006/relationships" xmlns:p="http://schemas.openxmlformats.org/presentationml/2006/main">
+  <p:cSld>
+    <p:spTree>
+      <p:nvGrpSpPr>
+        <p:cNvPr id="1" name=""/>
+        <p:cNvGrpSpPr/>
+        <p:nvPr/>
+      </p:nvGrpSpPr>
+      <p:grpSpPr>
+        <a:xfrm>
+          <a:off x="0" y="0"/>
+          <a:ext cx="0" cy="0"/>
+          <a:chOff x="0" y="0"/>
+          <a:chExt cx="0" cy="0"/>
+        </a:xfrm>
+      </p:grpSpPr>
+      <p:sp>
+        <p:nvSpPr>
+          <p:cNvPr id="2" name="Title 1"/>
+          <p:cNvSpPr>
+            <a:spLocks noGrp="1"/>
+          </p:cNvSpPr>
+          <p:nvPr>
+            <p:ph type="title"/>
+          </p:nvPr>
+        </p:nvSpPr>
+        <p:spPr/>
+        <p:txBody>
+          <a:bodyPr/>
+          <a:lstStyle/>
+          <a:p>
+            <a:r>
+              <a:rPr lang="en-US" dirty="0" smtClean="0"/>
+              <a:t>Intermediate </a:t>
+            </a:r>
+            <a:r>
+              <a:rPr lang="en-US" dirty="0" err="1" smtClean="0"/>
+              <a:t>Git</a:t>
+            </a:r>
+            <a:r>
+              <a:rPr lang="en-US" dirty="0" smtClean="0"/>
+              <a:t> commands</a:t>
+            </a:r>
+            <a:endParaRPr lang="en-US" dirty="0"/>
+          </a:p>
+        </p:txBody>
+      </p:sp>
+      <p:sp>
+        <p:nvSpPr>
+          <p:cNvPr id="3" name="Content Placeholder 2"/>
+          <p:cNvSpPr>
+            <a:spLocks noGrp="1"/>
+          </p:cNvSpPr>
+          <p:nvPr>
+            <p:ph idx="1"/>
+          </p:nvPr>
+        </p:nvSpPr>
+        <p:spPr/>
+        <p:txBody>
+          <a:bodyPr>
+            <a:normAutofit fontScale="92500" lnSpcReduction="20000"/>
+          </a:bodyPr>
+          <a:lstStyle/>
+          <a:p>
+            <a:r>
+              <a:rPr lang="en-US" dirty="0" smtClean="0"/>
+              <a:t>Add, commit and push are the basics commands of </a:t>
+            </a:r>
+            <a:r>
+              <a:rPr lang="en-US" dirty="0" err="1" smtClean="0"/>
+              <a:t>Git</a:t>
+            </a:r>
+            <a:r>
+              <a:rPr lang="en-US" dirty="0"/>
+              <a:t> </a:t>
+            </a:r>
+            <a:r>
+              <a:rPr lang="en-US" dirty="0" smtClean="0"/>
+              <a:t>and represent just the bare minimum needed to use </a:t>
+            </a:r>
+            <a:r>
+              <a:rPr lang="en-US" dirty="0" err="1" smtClean="0"/>
+              <a:t>Git</a:t>
+            </a:r>
+            <a:r>
+              <a:rPr lang="en-US" dirty="0" smtClean="0"/>
+              <a:t>.</a:t>
+            </a:r>
+          </a:p>
+          <a:p>
+            <a:r>
+              <a:rPr lang="en-US" dirty="0" smtClean="0"/>
+              <a:t>Branching</a:t>
+            </a:r>
+          </a:p>
+          <a:p>
+            <a:pPr lvl="1"/>
+            <a:r>
+              <a:rPr lang="en-US" dirty="0" smtClean="0"/>
+              <a:t>Code can be branched off, so that changes on one branch do not effect another branch. This is useful for adding new functionality or attempting to debug a major problem without destroying your current version of code.</a:t>
+            </a:r>
+          </a:p>
+          <a:p>
+            <a:r>
+              <a:rPr lang="en-US" dirty="0" err="1" smtClean="0"/>
+              <a:t>git</a:t>
+            </a:r>
+            <a:r>
+              <a:rPr lang="en-US" dirty="0" smtClean="0"/>
+              <a:t> pull</a:t>
+            </a:r>
+          </a:p>
+          <a:p>
+            <a:pPr lvl="1"/>
+            <a:r>
+              <a:rPr lang="en-US" dirty="0" smtClean="0"/>
+              <a:t>This command brings down any changes to from the remote repository and adds it to the local repository. Be aware of merge conflicts here.</a:t>
+            </a:r>
+          </a:p>
+          <a:p>
+            <a:r>
+              <a:rPr lang="en-US" dirty="0" smtClean="0"/>
+              <a:t>Cloning:</a:t>
+            </a:r>
+          </a:p>
+          <a:p>
+            <a:pPr lvl="1"/>
+            <a:r>
+              <a:rPr lang="en-US" dirty="0" smtClean="0"/>
+              <a:t>This is the act of pulling down an existing repository. This can be more easily done using the GitHub app.</a:t>
+            </a:r>
+          </a:p>
+        </p:txBody>
+      </p:sp>
+    </p:spTree>
+    <p:extLst>
+      <p:ext uri="{BB962C8B-B14F-4D97-AF65-F5344CB8AC3E}">
+        <p14:creationId xmlns:p14="http://schemas.microsoft.com/office/powerpoint/2010/main" val="3877826343"/>
+      </p:ext>
+    </p:extLst>
+  </p:cSld>
+  <p:clrMapOvr>
+    <a:masterClrMapping/>
+  </p:clrMapOvr>
+</p:sld>
+</file>
+
+<file path=ppt/slides/slide15.xml><?xml version="1.0" encoding="utf-8"?>
+<p:sld xmlns:a="http://schemas.openxmlformats.org/drawingml/2006/main" xmlns:r="http://schemas.openxmlformats.org/officeDocument/2006/relationships" xmlns:p="http://schemas.openxmlformats.org/presentationml/2006/main">
+  <p:cSld>
+    <p:spTree>
+      <p:nvGrpSpPr>
+        <p:cNvPr id="1" name=""/>
+        <p:cNvGrpSpPr/>
+        <p:nvPr/>
+      </p:nvGrpSpPr>
+      <p:grpSpPr>
+        <a:xfrm>
+          <a:off x="0" y="0"/>
+          <a:ext cx="0" cy="0"/>
+          <a:chOff x="0" y="0"/>
+          <a:chExt cx="0" cy="0"/>
+        </a:xfrm>
+      </p:grpSpPr>
+      <p:sp>
+        <p:nvSpPr>
+          <p:cNvPr id="2" name="Title 1"/>
+          <p:cNvSpPr>
+            <a:spLocks noGrp="1"/>
+          </p:cNvSpPr>
+          <p:nvPr>
+            <p:ph type="title"/>
+          </p:nvPr>
+        </p:nvSpPr>
+        <p:spPr/>
+        <p:txBody>
+          <a:bodyPr/>
+          <a:lstStyle/>
+          <a:p>
+            <a:r>
+              <a:rPr lang="en-US" dirty="0" smtClean="0"/>
+              <a:t>Intermediate </a:t>
+            </a:r>
+            <a:r>
+              <a:rPr lang="en-US" dirty="0" err="1" smtClean="0"/>
+              <a:t>Git</a:t>
+            </a:r>
+            <a:r>
+              <a:rPr lang="en-US" dirty="0" smtClean="0"/>
+              <a:t> commands</a:t>
+            </a:r>
+            <a:endParaRPr lang="en-US" dirty="0"/>
+          </a:p>
+        </p:txBody>
+      </p:sp>
+      <p:sp>
+        <p:nvSpPr>
+          <p:cNvPr id="3" name="Content Placeholder 2"/>
+          <p:cNvSpPr>
+            <a:spLocks noGrp="1"/>
+          </p:cNvSpPr>
+          <p:nvPr>
+            <p:ph idx="1"/>
+          </p:nvPr>
+        </p:nvSpPr>
+        <p:spPr>
+          <a:xfrm>
+            <a:off x="1154954" y="2603500"/>
+            <a:ext cx="8903446" cy="3526844"/>
+          </a:xfrm>
+        </p:spPr>
+        <p:txBody>
+          <a:bodyPr>
+            <a:normAutofit lnSpcReduction="10000"/>
+          </a:bodyPr>
+          <a:lstStyle/>
+          <a:p>
+            <a:r>
+              <a:rPr lang="en-US" dirty="0" smtClean="0"/>
+              <a:t>Branching:</a:t>
+            </a:r>
+          </a:p>
+          <a:p>
+            <a:r>
+              <a:rPr lang="en-US" dirty="0" err="1" smtClean="0"/>
+              <a:t>git</a:t>
+            </a:r>
+            <a:r>
+              <a:rPr lang="en-US" dirty="0" smtClean="0"/>
+              <a:t> checkout &lt;branch name&gt;</a:t>
+            </a:r>
+          </a:p>
+          <a:p>
+            <a:pPr lvl="1"/>
+            <a:r>
+              <a:rPr lang="en-US" dirty="0" err="1" smtClean="0"/>
+              <a:t>git</a:t>
+            </a:r>
+            <a:r>
+              <a:rPr lang="en-US" dirty="0" smtClean="0"/>
+              <a:t> checkout lets you traverse between branches. When you switch branches, the code in your folders will change automatically. </a:t>
+            </a:r>
+          </a:p>
+          <a:p>
+            <a:pPr indent="-285750"/>
+            <a:r>
+              <a:rPr lang="en-US" dirty="0" err="1"/>
+              <a:t>g</a:t>
+            </a:r>
+            <a:r>
+              <a:rPr lang="en-US" dirty="0" err="1" smtClean="0"/>
+              <a:t>it</a:t>
+            </a:r>
+            <a:r>
+              <a:rPr lang="en-US" dirty="0" smtClean="0"/>
+              <a:t> checkout –b &lt;branch name&gt;</a:t>
+            </a:r>
+          </a:p>
+          <a:p>
+            <a:pPr lvl="1"/>
+            <a:r>
+              <a:rPr lang="en-US" dirty="0" smtClean="0"/>
+              <a:t>This command lets you create a new branch on your machine. When you create the new branch, it will automatically jump to the new branch. </a:t>
+            </a:r>
+            <a:endParaRPr lang="en-US" dirty="0"/>
+          </a:p>
+          <a:p>
+            <a:r>
+              <a:rPr lang="en-US" dirty="0" err="1"/>
+              <a:t>g</a:t>
+            </a:r>
+            <a:r>
+              <a:rPr lang="en-US" dirty="0" err="1" smtClean="0"/>
+              <a:t>it</a:t>
+            </a:r>
+            <a:r>
+              <a:rPr lang="en-US" dirty="0" smtClean="0"/>
+              <a:t> push –set-upstream origin &lt;branch you are appending to&gt;</a:t>
+            </a:r>
+          </a:p>
+          <a:p>
+            <a:pPr lvl="1"/>
+            <a:r>
+              <a:rPr lang="en-US" dirty="0" smtClean="0">
+                <a:solidFill>
+                  <a:schemeClr val="accent2"/>
+                </a:solidFill>
+              </a:rPr>
+              <a:t>When you create your branch, the remote repository doesn’t know about it. So we have to push the new branch to the remote repository. You’ll notice it says master at the end,.</a:t>
+            </a:r>
+            <a:endParaRPr lang="en-US" dirty="0">
+              <a:solidFill>
+                <a:schemeClr val="accent2"/>
+              </a:solidFill>
+            </a:endParaRPr>
+          </a:p>
+        </p:txBody>
+      </p:sp>
+    </p:spTree>
+    <p:extLst>
+      <p:ext uri="{BB962C8B-B14F-4D97-AF65-F5344CB8AC3E}">
+        <p14:creationId xmlns:p14="http://schemas.microsoft.com/office/powerpoint/2010/main" val="3947764904"/>
+      </p:ext>
+    </p:extLst>
+  </p:cSld>
+  <p:clrMapOvr>
+    <a:masterClrMapping/>
+  </p:clrMapOvr>
+</p:sld>
+</file>
+
 <file path=ppt/slides/slide2.xml><?xml version="1.0" encoding="utf-8"?>
 <p:sld xmlns:a="http://schemas.openxmlformats.org/drawingml/2006/main" xmlns:r="http://schemas.openxmlformats.org/officeDocument/2006/relationships" xmlns:p="http://schemas.openxmlformats.org/presentationml/2006/main">
   <p:cSld>
@@ -13475,8 +14100,12 @@
               <a:t>Brief overview and history of </a:t>
             </a:r>
             <a:r>
+              <a:rPr lang="en-US" dirty="0" err="1"/>
+              <a:t>G</a:t>
+            </a:r>
+            <a:r>
               <a:rPr lang="en-US" dirty="0" err="1" smtClean="0"/>
-              <a:t>git</a:t>
+              <a:t>it</a:t>
             </a:r>
             <a:endParaRPr lang="en-US" dirty="0" smtClean="0"/>
           </a:p>
@@ -13492,12 +14121,20 @@
               <a:t>Basic </a:t>
             </a:r>
             <a:r>
+              <a:rPr lang="en-US" dirty="0" err="1"/>
+              <a:t>G</a:t>
+            </a:r>
+            <a:r>
               <a:rPr lang="en-US" dirty="0" err="1" smtClean="0"/>
-              <a:t>git</a:t>
+              <a:t>it</a:t>
             </a:r>
             <a:r>
               <a:rPr lang="en-US" dirty="0" smtClean="0"/>
-              <a:t> commands and workflow (add, commit, and push)</a:t>
+              <a:t> </a:t>
+            </a:r>
+            <a:r>
+              <a:rPr lang="en-US" dirty="0" smtClean="0"/>
+              <a:t>commands and workflow (add, commit, and push)</a:t>
             </a:r>
           </a:p>
           <a:p>
@@ -13518,12 +14155,20 @@
               <a:t>Setup of </a:t>
             </a:r>
             <a:r>
+              <a:rPr lang="en-US" dirty="0" err="1"/>
+              <a:t>G</a:t>
+            </a:r>
+            <a:r>
               <a:rPr lang="en-US" dirty="0" err="1" smtClean="0"/>
-              <a:t>git</a:t>
+              <a:t>it</a:t>
             </a:r>
             <a:r>
               <a:rPr lang="en-US" dirty="0" smtClean="0"/>
-              <a:t> shell</a:t>
+              <a:t> </a:t>
+            </a:r>
+            <a:r>
+              <a:rPr lang="en-US" dirty="0" smtClean="0"/>
+              <a:t>shell</a:t>
             </a:r>
           </a:p>
           <a:p>
@@ -13915,12 +14560,20 @@
           <a:lstStyle/>
           <a:p>
             <a:r>
+              <a:rPr lang="en-US" dirty="0" err="1"/>
+              <a:t>g</a:t>
+            </a:r>
+            <a:r>
               <a:rPr lang="en-US" dirty="0" err="1" smtClean="0"/>
-              <a:t>Git</a:t>
+              <a:t>it</a:t>
             </a:r>
             <a:r>
               <a:rPr lang="en-US" dirty="0" smtClean="0"/>
-              <a:t> status</a:t>
+              <a:t> </a:t>
+            </a:r>
+            <a:r>
+              <a:rPr lang="en-US" dirty="0" smtClean="0"/>
+              <a:t>status</a:t>
             </a:r>
           </a:p>
           <a:p>
@@ -13940,12 +14593,20 @@
           </a:p>
           <a:p>
             <a:r>
+              <a:rPr lang="en-US" dirty="0" err="1"/>
+              <a:t>g</a:t>
+            </a:r>
+            <a:r>
               <a:rPr lang="en-US" dirty="0" err="1" smtClean="0"/>
-              <a:t>Git</a:t>
+              <a:t>it</a:t>
             </a:r>
             <a:r>
               <a:rPr lang="en-US" dirty="0" smtClean="0"/>
-              <a:t> add –A </a:t>
+              <a:t> </a:t>
+            </a:r>
+            <a:r>
+              <a:rPr lang="en-US" dirty="0" smtClean="0"/>
+              <a:t>add –A </a:t>
             </a:r>
           </a:p>
           <a:p>
@@ -14065,12 +14726,20 @@
           <a:lstStyle/>
           <a:p>
             <a:r>
+              <a:rPr lang="en-US" dirty="0" err="1"/>
+              <a:t>g</a:t>
+            </a:r>
+            <a:r>
               <a:rPr lang="en-US" dirty="0" err="1" smtClean="0"/>
-              <a:t>Git</a:t>
+              <a:t>it</a:t>
             </a:r>
             <a:r>
               <a:rPr lang="en-US" dirty="0" smtClean="0"/>
-              <a:t> commit –m “your message here”</a:t>
+              <a:t> </a:t>
+            </a:r>
+            <a:r>
+              <a:rPr lang="en-US" dirty="0" smtClean="0"/>
+              <a:t>commit –m “your message here”</a:t>
             </a:r>
           </a:p>
           <a:p>
@@ -14105,19 +14774,56 @@
           </a:p>
           <a:p>
             <a:r>
+              <a:rPr lang="en-US" dirty="0" err="1"/>
+              <a:t>g</a:t>
+            </a:r>
+            <a:r>
               <a:rPr lang="en-US" dirty="0" err="1" smtClean="0"/>
-              <a:t>Git</a:t>
+              <a:t>it</a:t>
             </a:r>
             <a:r>
               <a:rPr lang="en-US" dirty="0" smtClean="0"/>
-              <a:t> Push</a:t>
-            </a:r>
+              <a:t> </a:t>
+            </a:r>
+            <a:r>
+              <a:rPr lang="en-US" dirty="0"/>
+              <a:t>p</a:t>
+            </a:r>
+            <a:r>
+              <a:rPr lang="en-US" dirty="0" smtClean="0"/>
+              <a:t>ush</a:t>
+            </a:r>
+            <a:endParaRPr lang="en-US" dirty="0" smtClean="0"/>
           </a:p>
           <a:p>
             <a:pPr lvl="1"/>
             <a:r>
               <a:rPr lang="en-US" dirty="0" smtClean="0"/>
-              <a:t>This is the commands that will add your commit to the repository, making your local changes apart of the remote repository.  More simply put, it sends your commit into the cloud.</a:t>
+              <a:t>This is the </a:t>
+            </a:r>
+            <a:r>
+              <a:rPr lang="en-US" dirty="0" smtClean="0"/>
+              <a:t>command </a:t>
+            </a:r>
+            <a:r>
+              <a:rPr lang="en-US" dirty="0" smtClean="0"/>
+              <a:t>that will add your </a:t>
+            </a:r>
+            <a:r>
+              <a:rPr lang="en-US" dirty="0" smtClean="0"/>
+              <a:t>commit(s) </a:t>
+            </a:r>
+            <a:r>
+              <a:rPr lang="en-US" dirty="0" smtClean="0"/>
+              <a:t>to </a:t>
+            </a:r>
+            <a:r>
+              <a:rPr lang="en-US" dirty="0" smtClean="0"/>
+              <a:t>the repository</a:t>
+            </a:r>
+            <a:r>
+              <a:rPr lang="en-US" dirty="0" smtClean="0"/>
+              <a:t>, making your local changes apart of the remote repository.  More simply put, it sends your commit into the cloud.</a:t>
             </a:r>
             <a:endParaRPr lang="en-US" dirty="0"/>
           </a:p>
@@ -14127,6 +14833,262 @@
     <p:extLst>
       <p:ext uri="{BB962C8B-B14F-4D97-AF65-F5344CB8AC3E}">
         <p14:creationId xmlns:p14="http://schemas.microsoft.com/office/powerpoint/2010/main" val="2329690194"/>
+      </p:ext>
+    </p:extLst>
+  </p:cSld>
+  <p:clrMapOvr>
+    <a:masterClrMapping/>
+  </p:clrMapOvr>
+</p:sld>
+</file>
+
+<file path=ppt/slides/slide8.xml><?xml version="1.0" encoding="utf-8"?>
+<p:sld xmlns:a="http://schemas.openxmlformats.org/drawingml/2006/main" xmlns:r="http://schemas.openxmlformats.org/officeDocument/2006/relationships" xmlns:p="http://schemas.openxmlformats.org/presentationml/2006/main">
+  <p:cSld>
+    <p:spTree>
+      <p:nvGrpSpPr>
+        <p:cNvPr id="1" name=""/>
+        <p:cNvGrpSpPr/>
+        <p:nvPr/>
+      </p:nvGrpSpPr>
+      <p:grpSpPr>
+        <a:xfrm>
+          <a:off x="0" y="0"/>
+          <a:ext cx="0" cy="0"/>
+          <a:chOff x="0" y="0"/>
+          <a:chExt cx="0" cy="0"/>
+        </a:xfrm>
+      </p:grpSpPr>
+      <p:sp>
+        <p:nvSpPr>
+          <p:cNvPr id="2" name="Title 1"/>
+          <p:cNvSpPr>
+            <a:spLocks noGrp="1"/>
+          </p:cNvSpPr>
+          <p:nvPr>
+            <p:ph type="title"/>
+          </p:nvPr>
+        </p:nvSpPr>
+        <p:spPr/>
+        <p:txBody>
+          <a:bodyPr/>
+          <a:lstStyle/>
+          <a:p>
+            <a:r>
+              <a:rPr lang="en-US" dirty="0" smtClean="0"/>
+              <a:t>Examples of basic </a:t>
+            </a:r>
+            <a:r>
+              <a:rPr lang="en-US" dirty="0" err="1" smtClean="0"/>
+              <a:t>Git</a:t>
+            </a:r>
+            <a:r>
+              <a:rPr lang="en-US" dirty="0" smtClean="0"/>
+              <a:t> commands</a:t>
+            </a:r>
+            <a:endParaRPr lang="en-US" dirty="0"/>
+          </a:p>
+        </p:txBody>
+      </p:sp>
+      <p:sp>
+        <p:nvSpPr>
+          <p:cNvPr id="3" name="Content Placeholder 2"/>
+          <p:cNvSpPr>
+            <a:spLocks noGrp="1"/>
+          </p:cNvSpPr>
+          <p:nvPr>
+            <p:ph idx="1"/>
+          </p:nvPr>
+        </p:nvSpPr>
+        <p:spPr>
+          <a:xfrm>
+            <a:off x="1270864" y="2423196"/>
+            <a:ext cx="8825659" cy="603339"/>
+          </a:xfrm>
+        </p:spPr>
+        <p:txBody>
+          <a:bodyPr>
+            <a:normAutofit lnSpcReduction="10000"/>
+          </a:bodyPr>
+          <a:lstStyle/>
+          <a:p>
+            <a:r>
+              <a:rPr lang="en-US" dirty="0" smtClean="0"/>
+              <a:t>Repository already contains a text file version of Princess Foo. Examples show addition of .</a:t>
+            </a:r>
+            <a:r>
+              <a:rPr lang="en-US" dirty="0" err="1" smtClean="0"/>
+              <a:t>docx</a:t>
+            </a:r>
+            <a:r>
+              <a:rPr lang="en-US" dirty="0" smtClean="0"/>
+              <a:t> version of the same text.</a:t>
+            </a:r>
+            <a:endParaRPr lang="en-US" dirty="0"/>
+          </a:p>
+        </p:txBody>
+      </p:sp>
+      <p:pic>
+        <p:nvPicPr>
+          <p:cNvPr id="4" name="Picture 3"/>
+          <p:cNvPicPr>
+            <a:picLocks noChangeAspect="1"/>
+          </p:cNvPicPr>
+          <p:nvPr/>
+        </p:nvPicPr>
+        <p:blipFill>
+          <a:blip r:embed="rId2">
+            <a:extLst>
+              <a:ext uri="{28A0092B-C50C-407E-A947-70E740481C1C}">
+                <a14:useLocalDpi xmlns:a14="http://schemas.microsoft.com/office/drawing/2010/main" val="0"/>
+              </a:ext>
+            </a:extLst>
+          </a:blip>
+          <a:stretch>
+            <a:fillRect/>
+          </a:stretch>
+        </p:blipFill>
+        <p:spPr>
+          <a:xfrm>
+            <a:off x="1296818" y="3085574"/>
+            <a:ext cx="8773749" cy="3772426"/>
+          </a:xfrm>
+          <a:prstGeom prst="rect">
+            <a:avLst/>
+          </a:prstGeom>
+        </p:spPr>
+      </p:pic>
+    </p:spTree>
+    <p:extLst>
+      <p:ext uri="{BB962C8B-B14F-4D97-AF65-F5344CB8AC3E}">
+        <p14:creationId xmlns:p14="http://schemas.microsoft.com/office/powerpoint/2010/main" val="1160032541"/>
+      </p:ext>
+    </p:extLst>
+  </p:cSld>
+  <p:clrMapOvr>
+    <a:masterClrMapping/>
+  </p:clrMapOvr>
+</p:sld>
+</file>
+
+<file path=ppt/slides/slide9.xml><?xml version="1.0" encoding="utf-8"?>
+<p:sld xmlns:a="http://schemas.openxmlformats.org/drawingml/2006/main" xmlns:r="http://schemas.openxmlformats.org/officeDocument/2006/relationships" xmlns:p="http://schemas.openxmlformats.org/presentationml/2006/main">
+  <p:cSld>
+    <p:spTree>
+      <p:nvGrpSpPr>
+        <p:cNvPr id="1" name=""/>
+        <p:cNvGrpSpPr/>
+        <p:nvPr/>
+      </p:nvGrpSpPr>
+      <p:grpSpPr>
+        <a:xfrm>
+          <a:off x="0" y="0"/>
+          <a:ext cx="0" cy="0"/>
+          <a:chOff x="0" y="0"/>
+          <a:chExt cx="0" cy="0"/>
+        </a:xfrm>
+      </p:grpSpPr>
+      <p:sp>
+        <p:nvSpPr>
+          <p:cNvPr id="2" name="Title 1"/>
+          <p:cNvSpPr>
+            <a:spLocks noGrp="1"/>
+          </p:cNvSpPr>
+          <p:nvPr>
+            <p:ph type="title"/>
+          </p:nvPr>
+        </p:nvSpPr>
+        <p:spPr/>
+        <p:txBody>
+          <a:bodyPr/>
+          <a:lstStyle/>
+          <a:p>
+            <a:r>
+              <a:rPr lang="en-US" dirty="0" smtClean="0"/>
+              <a:t>Examples of basic </a:t>
+            </a:r>
+            <a:r>
+              <a:rPr lang="en-US" dirty="0" err="1" smtClean="0"/>
+              <a:t>git</a:t>
+            </a:r>
+            <a:r>
+              <a:rPr lang="en-US" dirty="0" smtClean="0"/>
+              <a:t> commands</a:t>
+            </a:r>
+            <a:endParaRPr lang="en-US" dirty="0"/>
+          </a:p>
+        </p:txBody>
+      </p:sp>
+      <p:sp>
+        <p:nvSpPr>
+          <p:cNvPr id="3" name="Content Placeholder 2"/>
+          <p:cNvSpPr>
+            <a:spLocks noGrp="1"/>
+          </p:cNvSpPr>
+          <p:nvPr>
+            <p:ph idx="1"/>
+          </p:nvPr>
+        </p:nvSpPr>
+        <p:spPr>
+          <a:xfrm>
+            <a:off x="1154954" y="2358801"/>
+            <a:ext cx="8825659" cy="757886"/>
+          </a:xfrm>
+        </p:spPr>
+        <p:txBody>
+          <a:bodyPr/>
+          <a:lstStyle/>
+          <a:p>
+            <a:r>
+              <a:rPr lang="en-US" dirty="0" smtClean="0"/>
+              <a:t>With the .</a:t>
+            </a:r>
+            <a:r>
+              <a:rPr lang="en-US" dirty="0" err="1" smtClean="0"/>
+              <a:t>docx</a:t>
+            </a:r>
+            <a:r>
+              <a:rPr lang="en-US" dirty="0" smtClean="0"/>
+              <a:t> version added, we can make a commit for it. Is it worth committing here?</a:t>
+            </a:r>
+            <a:endParaRPr lang="en-US" dirty="0"/>
+          </a:p>
+        </p:txBody>
+      </p:sp>
+      <p:pic>
+        <p:nvPicPr>
+          <p:cNvPr id="4" name="Picture 3"/>
+          <p:cNvPicPr>
+            <a:picLocks noChangeAspect="1"/>
+          </p:cNvPicPr>
+          <p:nvPr/>
+        </p:nvPicPr>
+        <p:blipFill>
+          <a:blip r:embed="rId2">
+            <a:extLst>
+              <a:ext uri="{28A0092B-C50C-407E-A947-70E740481C1C}">
+                <a14:useLocalDpi xmlns:a14="http://schemas.microsoft.com/office/drawing/2010/main" val="0"/>
+              </a:ext>
+            </a:extLst>
+          </a:blip>
+          <a:stretch>
+            <a:fillRect/>
+          </a:stretch>
+        </p:blipFill>
+        <p:spPr>
+          <a:xfrm>
+            <a:off x="868884" y="2995462"/>
+            <a:ext cx="10058400" cy="3703908"/>
+          </a:xfrm>
+          <a:prstGeom prst="rect">
+            <a:avLst/>
+          </a:prstGeom>
+        </p:spPr>
+      </p:pic>
+    </p:spTree>
+    <p:extLst>
+      <p:ext uri="{BB962C8B-B14F-4D97-AF65-F5344CB8AC3E}">
+        <p14:creationId xmlns:p14="http://schemas.microsoft.com/office/powerpoint/2010/main" val="3157428357"/>
       </p:ext>
     </p:extLst>
   </p:cSld>

</xml_diff>

<commit_message>
added intermediate git commands
</commit_message>
<xml_diff>
--- a/Intro to git.pptx
+++ b/Intro to git.pptx
@@ -20,6 +20,8 @@
     <p:sldId id="268" r:id="rId14"/>
     <p:sldId id="269" r:id="rId15"/>
     <p:sldId id="270" r:id="rId16"/>
+    <p:sldId id="271" r:id="rId17"/>
+    <p:sldId id="273" r:id="rId18"/>
   </p:sldIdLst>
   <p:sldSz cx="12192000" cy="6858000"/>
   <p:notesSz cx="6858000" cy="9144000"/>
@@ -14040,6 +14042,279 @@
 </p:sld>
 </file>
 
+<file path=ppt/slides/slide16.xml><?xml version="1.0" encoding="utf-8"?>
+<p:sld xmlns:a="http://schemas.openxmlformats.org/drawingml/2006/main" xmlns:r="http://schemas.openxmlformats.org/officeDocument/2006/relationships" xmlns:p="http://schemas.openxmlformats.org/presentationml/2006/main">
+  <p:cSld>
+    <p:spTree>
+      <p:nvGrpSpPr>
+        <p:cNvPr id="1" name=""/>
+        <p:cNvGrpSpPr/>
+        <p:nvPr/>
+      </p:nvGrpSpPr>
+      <p:grpSpPr>
+        <a:xfrm>
+          <a:off x="0" y="0"/>
+          <a:ext cx="0" cy="0"/>
+          <a:chOff x="0" y="0"/>
+          <a:chExt cx="0" cy="0"/>
+        </a:xfrm>
+      </p:grpSpPr>
+      <p:sp>
+        <p:nvSpPr>
+          <p:cNvPr id="2" name="Title 1"/>
+          <p:cNvSpPr>
+            <a:spLocks noGrp="1"/>
+          </p:cNvSpPr>
+          <p:nvPr>
+            <p:ph type="title"/>
+          </p:nvPr>
+        </p:nvSpPr>
+        <p:spPr/>
+        <p:txBody>
+          <a:bodyPr/>
+          <a:lstStyle/>
+          <a:p>
+            <a:r>
+              <a:rPr lang="en-US" dirty="0" smtClean="0"/>
+              <a:t>Intermediate </a:t>
+            </a:r>
+            <a:r>
+              <a:rPr lang="en-US" dirty="0" err="1" smtClean="0"/>
+              <a:t>Git</a:t>
+            </a:r>
+            <a:r>
+              <a:rPr lang="en-US" dirty="0" smtClean="0"/>
+              <a:t> commands	</a:t>
+            </a:r>
+            <a:endParaRPr lang="en-US" dirty="0"/>
+          </a:p>
+        </p:txBody>
+      </p:sp>
+      <p:sp>
+        <p:nvSpPr>
+          <p:cNvPr id="3" name="Content Placeholder 2"/>
+          <p:cNvSpPr>
+            <a:spLocks noGrp="1"/>
+          </p:cNvSpPr>
+          <p:nvPr>
+            <p:ph idx="1"/>
+          </p:nvPr>
+        </p:nvSpPr>
+        <p:spPr/>
+        <p:txBody>
+          <a:bodyPr/>
+          <a:lstStyle/>
+          <a:p>
+            <a:r>
+              <a:rPr lang="en-US" dirty="0" err="1"/>
+              <a:t>g</a:t>
+            </a:r>
+            <a:r>
+              <a:rPr lang="en-US" dirty="0" err="1" smtClean="0"/>
+              <a:t>it</a:t>
+            </a:r>
+            <a:r>
+              <a:rPr lang="en-US" dirty="0" smtClean="0"/>
+              <a:t> pull</a:t>
+            </a:r>
+          </a:p>
+          <a:p>
+            <a:pPr lvl="1"/>
+            <a:r>
+              <a:rPr lang="en-US" dirty="0" smtClean="0"/>
+              <a:t>Pull is more of a basic </a:t>
+            </a:r>
+            <a:r>
+              <a:rPr lang="en-US" dirty="0" err="1" smtClean="0"/>
+              <a:t>git</a:t>
+            </a:r>
+            <a:r>
+              <a:rPr lang="en-US" dirty="0" smtClean="0"/>
+              <a:t> command, but isn’t required. Pull is the opposite idea of push, think pulling something down. Pull simply updates your local repository based on what's in the remote repository. So if your team-mate tells you that they just pushed an update, you’ll want to run </a:t>
+            </a:r>
+            <a:r>
+              <a:rPr lang="en-US" dirty="0" err="1" smtClean="0"/>
+              <a:t>git</a:t>
+            </a:r>
+            <a:r>
+              <a:rPr lang="en-US" dirty="0" smtClean="0"/>
+              <a:t> pull. </a:t>
+            </a:r>
+          </a:p>
+          <a:p>
+            <a:pPr lvl="1"/>
+            <a:r>
+              <a:rPr lang="en-US" dirty="0" smtClean="0"/>
+              <a:t>Merge conflicts are disagreements in content based on the line of code. If user A changes a particular line, and user B pushes up a change to the same line, user A will encounter a merge conflict when pulling the changes made by user B.</a:t>
+            </a:r>
+          </a:p>
+          <a:p>
+            <a:pPr lvl="1"/>
+            <a:r>
+              <a:rPr lang="en-US" dirty="0" smtClean="0"/>
+              <a:t>It is worth noting that </a:t>
+            </a:r>
+            <a:r>
+              <a:rPr lang="en-US" dirty="0" err="1" smtClean="0"/>
+              <a:t>git</a:t>
+            </a:r>
+            <a:r>
+              <a:rPr lang="en-US" dirty="0" smtClean="0"/>
+              <a:t> pull is actually 2 commands in 1. It does the work of both </a:t>
+            </a:r>
+            <a:r>
+              <a:rPr lang="en-US" dirty="0" err="1" smtClean="0"/>
+              <a:t>git</a:t>
+            </a:r>
+            <a:r>
+              <a:rPr lang="en-US" dirty="0" smtClean="0"/>
+              <a:t> fetch and </a:t>
+            </a:r>
+            <a:r>
+              <a:rPr lang="en-US" dirty="0" err="1" smtClean="0"/>
+              <a:t>git</a:t>
+            </a:r>
+            <a:r>
+              <a:rPr lang="en-US" dirty="0" smtClean="0"/>
+              <a:t> merge.</a:t>
+            </a:r>
+            <a:endParaRPr lang="en-US" dirty="0"/>
+          </a:p>
+        </p:txBody>
+      </p:sp>
+    </p:spTree>
+    <p:extLst>
+      <p:ext uri="{BB962C8B-B14F-4D97-AF65-F5344CB8AC3E}">
+        <p14:creationId xmlns:p14="http://schemas.microsoft.com/office/powerpoint/2010/main" val="3476203000"/>
+      </p:ext>
+    </p:extLst>
+  </p:cSld>
+  <p:clrMapOvr>
+    <a:masterClrMapping/>
+  </p:clrMapOvr>
+</p:sld>
+</file>
+
+<file path=ppt/slides/slide17.xml><?xml version="1.0" encoding="utf-8"?>
+<p:sld xmlns:a="http://schemas.openxmlformats.org/drawingml/2006/main" xmlns:r="http://schemas.openxmlformats.org/officeDocument/2006/relationships" xmlns:p="http://schemas.openxmlformats.org/presentationml/2006/main">
+  <p:cSld>
+    <p:spTree>
+      <p:nvGrpSpPr>
+        <p:cNvPr id="1" name=""/>
+        <p:cNvGrpSpPr/>
+        <p:nvPr/>
+      </p:nvGrpSpPr>
+      <p:grpSpPr>
+        <a:xfrm>
+          <a:off x="0" y="0"/>
+          <a:ext cx="0" cy="0"/>
+          <a:chOff x="0" y="0"/>
+          <a:chExt cx="0" cy="0"/>
+        </a:xfrm>
+      </p:grpSpPr>
+      <p:pic>
+        <p:nvPicPr>
+          <p:cNvPr id="2" name="Content Placeholder 3"/>
+          <p:cNvPicPr>
+            <a:picLocks noChangeAspect="1"/>
+          </p:cNvPicPr>
+          <p:nvPr/>
+        </p:nvPicPr>
+        <p:blipFill>
+          <a:blip r:embed="rId2">
+            <a:extLst>
+              <a:ext uri="{28A0092B-C50C-407E-A947-70E740481C1C}">
+                <a14:useLocalDpi xmlns:a14="http://schemas.microsoft.com/office/drawing/2010/main" val="0"/>
+              </a:ext>
+            </a:extLst>
+          </a:blip>
+          <a:stretch>
+            <a:fillRect/>
+          </a:stretch>
+        </p:blipFill>
+        <p:spPr>
+          <a:xfrm>
+            <a:off x="3113288" y="0"/>
+            <a:ext cx="8824913" cy="3199599"/>
+          </a:xfrm>
+          <a:prstGeom prst="rect">
+            <a:avLst/>
+          </a:prstGeom>
+        </p:spPr>
+      </p:pic>
+      <p:pic>
+        <p:nvPicPr>
+          <p:cNvPr id="3" name="Picture 2"/>
+          <p:cNvPicPr>
+            <a:picLocks noChangeAspect="1"/>
+          </p:cNvPicPr>
+          <p:nvPr/>
+        </p:nvPicPr>
+        <p:blipFill>
+          <a:blip r:embed="rId3">
+            <a:extLst>
+              <a:ext uri="{28A0092B-C50C-407E-A947-70E740481C1C}">
+                <a14:useLocalDpi xmlns:a14="http://schemas.microsoft.com/office/drawing/2010/main" val="0"/>
+              </a:ext>
+            </a:extLst>
+          </a:blip>
+          <a:stretch>
+            <a:fillRect/>
+          </a:stretch>
+        </p:blipFill>
+        <p:spPr>
+          <a:xfrm>
+            <a:off x="1996225" y="3199599"/>
+            <a:ext cx="10058400" cy="3507544"/>
+          </a:xfrm>
+          <a:prstGeom prst="rect">
+            <a:avLst/>
+          </a:prstGeom>
+        </p:spPr>
+      </p:pic>
+      <p:sp>
+        <p:nvSpPr>
+          <p:cNvPr id="4" name="TextBox 3"/>
+          <p:cNvSpPr txBox="1"/>
+          <p:nvPr/>
+        </p:nvSpPr>
+        <p:spPr>
+          <a:xfrm>
+            <a:off x="0" y="180304"/>
+            <a:ext cx="3113288" cy="1477328"/>
+          </a:xfrm>
+          <a:prstGeom prst="rect">
+            <a:avLst/>
+          </a:prstGeom>
+          <a:noFill/>
+        </p:spPr>
+        <p:txBody>
+          <a:bodyPr wrap="square" rtlCol="0">
+            <a:spAutoFit/>
+          </a:bodyPr>
+          <a:lstStyle/>
+          <a:p>
+            <a:r>
+              <a:rPr lang="en-US" dirty="0" smtClean="0"/>
+              <a:t>These two images demonstrate that the content of your files physically changes when you switch branches.</a:t>
+            </a:r>
+            <a:endParaRPr lang="en-US" dirty="0"/>
+          </a:p>
+        </p:txBody>
+      </p:sp>
+    </p:spTree>
+    <p:extLst>
+      <p:ext uri="{BB962C8B-B14F-4D97-AF65-F5344CB8AC3E}">
+        <p14:creationId xmlns:p14="http://schemas.microsoft.com/office/powerpoint/2010/main" val="2041730259"/>
+      </p:ext>
+    </p:extLst>
+  </p:cSld>
+  <p:clrMapOvr>
+    <a:masterClrMapping/>
+  </p:clrMapOvr>
+</p:sld>
+</file>
+
 <file path=ppt/slides/slide2.xml><?xml version="1.0" encoding="utf-8"?>
 <p:sld xmlns:a="http://schemas.openxmlformats.org/drawingml/2006/main" xmlns:r="http://schemas.openxmlformats.org/officeDocument/2006/relationships" xmlns:p="http://schemas.openxmlformats.org/presentationml/2006/main">
   <p:cSld>
@@ -14130,11 +14405,7 @@
             </a:r>
             <a:r>
               <a:rPr lang="en-US" dirty="0" smtClean="0"/>
-              <a:t> </a:t>
-            </a:r>
-            <a:r>
-              <a:rPr lang="en-US" dirty="0" smtClean="0"/>
-              <a:t>commands and workflow (add, commit, and push)</a:t>
+              <a:t> commands and workflow (add, commit, and push)</a:t>
             </a:r>
           </a:p>
           <a:p>
@@ -14164,11 +14435,7 @@
             </a:r>
             <a:r>
               <a:rPr lang="en-US" dirty="0" smtClean="0"/>
-              <a:t> </a:t>
-            </a:r>
-            <a:r>
-              <a:rPr lang="en-US" dirty="0" smtClean="0"/>
-              <a:t>shell</a:t>
+              <a:t> shell</a:t>
             </a:r>
           </a:p>
           <a:p>
@@ -14569,11 +14836,7 @@
             </a:r>
             <a:r>
               <a:rPr lang="en-US" dirty="0" smtClean="0"/>
-              <a:t> </a:t>
-            </a:r>
-            <a:r>
-              <a:rPr lang="en-US" dirty="0" smtClean="0"/>
-              <a:t>status</a:t>
+              <a:t> status</a:t>
             </a:r>
           </a:p>
           <a:p>
@@ -14602,11 +14865,7 @@
             </a:r>
             <a:r>
               <a:rPr lang="en-US" dirty="0" smtClean="0"/>
-              <a:t> </a:t>
-            </a:r>
-            <a:r>
-              <a:rPr lang="en-US" dirty="0" smtClean="0"/>
-              <a:t>add –A </a:t>
+              <a:t> add –A </a:t>
             </a:r>
           </a:p>
           <a:p>
@@ -14735,11 +14994,7 @@
             </a:r>
             <a:r>
               <a:rPr lang="en-US" dirty="0" smtClean="0"/>
-              <a:t> </a:t>
-            </a:r>
-            <a:r>
-              <a:rPr lang="en-US" dirty="0" smtClean="0"/>
-              <a:t>commit –m “your message here”</a:t>
+              <a:t> commit –m “your message here”</a:t>
             </a:r>
           </a:p>
           <a:p>
@@ -14793,37 +15048,12 @@
               <a:rPr lang="en-US" dirty="0" smtClean="0"/>
               <a:t>ush</a:t>
             </a:r>
-            <a:endParaRPr lang="en-US" dirty="0" smtClean="0"/>
           </a:p>
           <a:p>
             <a:pPr lvl="1"/>
             <a:r>
               <a:rPr lang="en-US" dirty="0" smtClean="0"/>
-              <a:t>This is the </a:t>
-            </a:r>
-            <a:r>
-              <a:rPr lang="en-US" dirty="0" smtClean="0"/>
-              <a:t>command </a:t>
-            </a:r>
-            <a:r>
-              <a:rPr lang="en-US" dirty="0" smtClean="0"/>
-              <a:t>that will add your </a:t>
-            </a:r>
-            <a:r>
-              <a:rPr lang="en-US" dirty="0" smtClean="0"/>
-              <a:t>commit(s) </a:t>
-            </a:r>
-            <a:r>
-              <a:rPr lang="en-US" dirty="0" smtClean="0"/>
-              <a:t>to </a:t>
-            </a:r>
-            <a:r>
-              <a:rPr lang="en-US" dirty="0" smtClean="0"/>
-              <a:t>the repository</a:t>
-            </a:r>
-            <a:r>
-              <a:rPr lang="en-US" dirty="0" smtClean="0"/>
-              <a:t>, making your local changes apart of the remote repository.  More simply put, it sends your commit into the cloud.</a:t>
+              <a:t>This is the command that will add your commit(s) to the repository, making your local changes apart of the remote repository.  More simply put, it sends your commit into the cloud.</a:t>
             </a:r>
             <a:endParaRPr lang="en-US" dirty="0"/>
           </a:p>

</xml_diff>

<commit_message>
added some detail to the history of git
</commit_message>
<xml_diff>
--- a/Intro to git.pptx
+++ b/Intro to git.pptx
@@ -13297,8 +13297,12 @@
               <a:t>Intro to </a:t>
             </a:r>
             <a:r>
+              <a:rPr lang="en-US" dirty="0" err="1"/>
+              <a:t>G</a:t>
+            </a:r>
+            <a:r>
               <a:rPr lang="en-US" dirty="0" err="1" smtClean="0"/>
-              <a:t>git</a:t>
+              <a:t>it</a:t>
             </a:r>
             <a:r>
               <a:rPr lang="en-US" dirty="0" smtClean="0"/>
@@ -14499,8 +14503,12 @@
               <a:t>What is </a:t>
             </a:r>
             <a:r>
+              <a:rPr lang="en-US" dirty="0" err="1"/>
+              <a:t>G</a:t>
+            </a:r>
+            <a:r>
               <a:rPr lang="en-US" dirty="0" err="1" smtClean="0"/>
-              <a:t>git</a:t>
+              <a:t>it</a:t>
             </a:r>
             <a:r>
               <a:rPr lang="en-US" dirty="0" smtClean="0"/>
@@ -14537,20 +14545,47 @@
           <a:p>
             <a:r>
               <a:rPr lang="en-US" dirty="0" smtClean="0"/>
-              <a:t>What is source control</a:t>
+              <a:t>What is source </a:t>
+            </a:r>
+            <a:r>
+              <a:rPr lang="en-US" dirty="0" smtClean="0"/>
+              <a:t>control</a:t>
             </a:r>
           </a:p>
           <a:p>
             <a:pPr lvl="1"/>
             <a:r>
               <a:rPr lang="en-US" dirty="0" smtClean="0"/>
-              <a:t>Good definition of source control.</a:t>
-            </a:r>
-          </a:p>
-          <a:p>
-            <a:pPr marL="457200" lvl="1" indent="0">
-              <a:buNone/>
-            </a:pPr>
+              <a:t>“…is </a:t>
+            </a:r>
+            <a:r>
+              <a:rPr lang="en-US" dirty="0"/>
+              <a:t>the management of changes to documents</a:t>
+            </a:r>
+            <a:r>
+              <a:rPr lang="en-US" dirty="0" smtClean="0"/>
+              <a:t>, computer </a:t>
+            </a:r>
+            <a:r>
+              <a:rPr lang="en-US" dirty="0"/>
+              <a:t>programs, large web sites, and other collections of </a:t>
+            </a:r>
+            <a:r>
+              <a:rPr lang="en-US" dirty="0" smtClean="0"/>
+              <a:t>information”. –Wikipedia</a:t>
+            </a:r>
+          </a:p>
+          <a:p>
+            <a:r>
+              <a:rPr lang="en-US" dirty="0" smtClean="0"/>
+              <a:t>Also called version control and revision control.</a:t>
+            </a:r>
+          </a:p>
+          <a:p>
+            <a:r>
+              <a:rPr lang="en-US" dirty="0" smtClean="0"/>
+              <a:t>Older source control methods allowed users to check out a file from a file server, but that file become locked while it was checked out. This prevented 2 developers from modifying the same file at the same time. </a:t>
+            </a:r>
             <a:endParaRPr lang="en-US" dirty="0" smtClean="0"/>
           </a:p>
           <a:p>
@@ -14643,7 +14678,33 @@
             </a:r>
             <a:r>
               <a:rPr lang="en-US" dirty="0" smtClean="0"/>
-              <a:t> was invented by Linus Torvalds (inventor of Linux)</a:t>
+              <a:t> was invented by Linus Torvalds (inventor of Linux</a:t>
+            </a:r>
+            <a:r>
+              <a:rPr lang="en-US" dirty="0" smtClean="0"/>
+              <a:t>)</a:t>
+            </a:r>
+          </a:p>
+          <a:p>
+            <a:r>
+              <a:rPr lang="en-US" dirty="0" smtClean="0"/>
+              <a:t>Prior to 2005, the Linux community used </a:t>
+            </a:r>
+            <a:r>
+              <a:rPr lang="en-US" dirty="0" err="1" smtClean="0"/>
+              <a:t>BitKeeper</a:t>
+            </a:r>
+            <a:r>
+              <a:rPr lang="en-US" dirty="0" smtClean="0"/>
+              <a:t> as their source control tool. </a:t>
+            </a:r>
+            <a:r>
+              <a:rPr lang="en-US" dirty="0" err="1" smtClean="0"/>
+              <a:t>BitKeeper</a:t>
+            </a:r>
+            <a:r>
+              <a:rPr lang="en-US" dirty="0" smtClean="0"/>
+              <a:t> was stopped being free to use. This prompted the Linux community to make their own source control tool.</a:t>
             </a:r>
             <a:endParaRPr lang="en-US" dirty="0"/>
           </a:p>

</xml_diff>

<commit_message>
added to definition of basic commands
</commit_message>
<xml_diff>
--- a/Intro to git.pptx
+++ b/Intro to git.pptx
@@ -464,7 +464,7 @@
             <a:fld id="{5923F103-BC34-4FE4-A40E-EDDEECFDA5D0}" type="datetimeFigureOut">
               <a:rPr lang="en-US" dirty="0"/>
               <a:pPr/>
-              <a:t>4/2/2016</a:t>
+              <a:t>4/3/2016</a:t>
             </a:fld>
             <a:endParaRPr lang="en-US" dirty="0"/>
           </a:p>
@@ -1552,7 +1552,7 @@
           <a:p>
             <a:fld id="{923A1CC3-2375-41D4-9E03-427CAF2A4C1A}" type="datetimeFigureOut">
               <a:rPr lang="en-US" dirty="0"/>
-              <a:t>4/2/2016</a:t>
+              <a:t>4/3/2016</a:t>
             </a:fld>
             <a:endParaRPr lang="en-US" dirty="0"/>
           </a:p>
@@ -2532,7 +2532,7 @@
           <a:p>
             <a:fld id="{AFF16868-8199-4C2C-A5B1-63AEE139F88E}" type="datetimeFigureOut">
               <a:rPr lang="en-US" dirty="0"/>
-              <a:t>4/2/2016</a:t>
+              <a:t>4/3/2016</a:t>
             </a:fld>
             <a:endParaRPr lang="en-US" dirty="0"/>
           </a:p>
@@ -3666,7 +3666,7 @@
           <a:p>
             <a:fld id="{AAD9FF7F-6988-44CC-821B-644E70CD2F73}" type="datetimeFigureOut">
               <a:rPr lang="en-US" dirty="0"/>
-              <a:t>4/2/2016</a:t>
+              <a:t>4/3/2016</a:t>
             </a:fld>
             <a:endParaRPr lang="en-US" dirty="0"/>
           </a:p>
@@ -4699,7 +4699,7 @@
           <a:p>
             <a:fld id="{5C12C299-16B2-4475-990D-751901EACC14}" type="datetimeFigureOut">
               <a:rPr lang="en-US" dirty="0"/>
-              <a:t>4/2/2016</a:t>
+              <a:t>4/3/2016</a:t>
             </a:fld>
             <a:endParaRPr lang="en-US" dirty="0"/>
           </a:p>
@@ -5359,7 +5359,7 @@
           <a:p>
             <a:fld id="{9FE86839-B9D8-4651-8783-F325ECE74E65}" type="datetimeFigureOut">
               <a:rPr lang="en-US" dirty="0"/>
-              <a:t>4/2/2016</a:t>
+              <a:t>4/3/2016</a:t>
             </a:fld>
             <a:endParaRPr lang="en-US" dirty="0"/>
           </a:p>
@@ -6220,7 +6220,7 @@
           <a:p>
             <a:fld id="{FD484F64-32F6-45C5-931F-ADC1662401D0}" type="datetimeFigureOut">
               <a:rPr lang="en-US" dirty="0"/>
-              <a:t>4/2/2016</a:t>
+              <a:t>4/3/2016</a:t>
             </a:fld>
             <a:endParaRPr lang="en-US" dirty="0"/>
           </a:p>
@@ -6410,7 +6410,7 @@
           <a:p>
             <a:fld id="{53086D93-FCAC-47E0-A2EE-787E62CA814C}" type="datetimeFigureOut">
               <a:rPr lang="en-US" dirty="0"/>
-              <a:t>4/2/2016</a:t>
+              <a:t>4/3/2016</a:t>
             </a:fld>
             <a:endParaRPr lang="en-US" dirty="0"/>
           </a:p>
@@ -7382,7 +7382,7 @@
           <a:p>
             <a:fld id="{CDA879A6-0FD0-4734-A311-86BFCA472E6E}" type="datetimeFigureOut">
               <a:rPr lang="en-US" dirty="0"/>
-              <a:t>4/2/2016</a:t>
+              <a:t>4/3/2016</a:t>
             </a:fld>
             <a:endParaRPr lang="en-US" dirty="0"/>
           </a:p>
@@ -7593,7 +7593,7 @@
           <a:p>
             <a:fld id="{19C9CA7B-DFD4-44B5-8C60-D14B8CD1FB59}" type="datetimeFigureOut">
               <a:rPr lang="en-US" dirty="0"/>
-              <a:t>4/2/2016</a:t>
+              <a:t>4/3/2016</a:t>
             </a:fld>
             <a:endParaRPr lang="en-US" dirty="0"/>
           </a:p>
@@ -8627,7 +8627,7 @@
           <a:p>
             <a:fld id="{F34E6425-0181-43F2-84FC-787E803FD2F8}" type="datetimeFigureOut">
               <a:rPr lang="en-US" dirty="0"/>
-              <a:t>4/2/2016</a:t>
+              <a:t>4/3/2016</a:t>
             </a:fld>
             <a:endParaRPr lang="en-US" dirty="0"/>
           </a:p>
@@ -8899,7 +8899,7 @@
           <a:p>
             <a:fld id="{3BDB8791-F1B0-41E7-B7FD-A781E65C4266}" type="datetimeFigureOut">
               <a:rPr lang="en-US" dirty="0"/>
-              <a:t>4/2/2016</a:t>
+              <a:t>4/3/2016</a:t>
             </a:fld>
             <a:endParaRPr lang="en-US" dirty="0"/>
           </a:p>
@@ -9309,7 +9309,7 @@
           <a:p>
             <a:fld id="{5FDD63B2-E120-4ED8-B27B-C685F510A5FE}" type="datetimeFigureOut">
               <a:rPr lang="en-US" dirty="0"/>
-              <a:t>4/2/2016</a:t>
+              <a:t>4/3/2016</a:t>
             </a:fld>
             <a:endParaRPr lang="en-US" dirty="0"/>
           </a:p>
@@ -9436,7 +9436,7 @@
           <a:p>
             <a:fld id="{7AA18ACC-A947-437B-A130-35BD54FDF1E9}" type="datetimeFigureOut">
               <a:rPr lang="en-US" dirty="0"/>
-              <a:t>4/2/2016</a:t>
+              <a:t>4/3/2016</a:t>
             </a:fld>
             <a:endParaRPr lang="en-US" dirty="0"/>
           </a:p>
@@ -9531,7 +9531,7 @@
           <a:p>
             <a:fld id="{7C8D7E02-BCB8-4D50-A234-369438C08659}" type="datetimeFigureOut">
               <a:rPr lang="en-US" dirty="0"/>
-              <a:t>4/2/2016</a:t>
+              <a:t>4/3/2016</a:t>
             </a:fld>
             <a:endParaRPr lang="en-US" dirty="0"/>
           </a:p>
@@ -10612,7 +10612,7 @@
           <a:p>
             <a:fld id="{76E86A4C-8E40-4F87-A4F0-01A0687C5742}" type="datetimeFigureOut">
               <a:rPr lang="en-US" dirty="0"/>
-              <a:t>4/2/2016</a:t>
+              <a:t>4/3/2016</a:t>
             </a:fld>
             <a:endParaRPr lang="en-US" dirty="0"/>
           </a:p>
@@ -11720,7 +11720,7 @@
           <a:p>
             <a:fld id="{35E72C73-2D91-4E12-BA25-F0AA0C03599B}" type="datetimeFigureOut">
               <a:rPr lang="en-US" dirty="0"/>
-              <a:t>4/2/2016</a:t>
+              <a:t>4/3/2016</a:t>
             </a:fld>
             <a:endParaRPr lang="en-US" dirty="0"/>
           </a:p>
@@ -12717,7 +12717,7 @@
           <a:p>
             <a:fld id="{2BE451C3-0FF4-47C4-B829-773ADF60F88C}" type="datetimeFigureOut">
               <a:rPr lang="en-US" dirty="0"/>
-              <a:t>4/2/2016</a:t>
+              <a:t>4/3/2016</a:t>
             </a:fld>
             <a:endParaRPr lang="en-US" dirty="0"/>
           </a:p>
@@ -13333,7 +13333,11 @@
             </a:r>
             <a:r>
               <a:rPr lang="en-US" dirty="0" smtClean="0"/>
-              <a:t>, and how to</a:t>
+              <a:t> </a:t>
+            </a:r>
+            <a:r>
+              <a:rPr lang="en-US" dirty="0" smtClean="0"/>
+              <a:t>and how to</a:t>
             </a:r>
             <a:endParaRPr lang="en-US" dirty="0"/>
           </a:p>
@@ -14430,17 +14434,14 @@
               <a:t>Setup of </a:t>
             </a:r>
             <a:r>
-              <a:rPr lang="en-US" dirty="0" err="1"/>
-              <a:t>G</a:t>
-            </a:r>
-            <a:r>
-              <a:rPr lang="en-US" dirty="0" err="1" smtClean="0"/>
-              <a:t>it</a:t>
-            </a:r>
-            <a:r>
               <a:rPr lang="en-US" dirty="0" smtClean="0"/>
-              <a:t> shell</a:t>
-            </a:r>
+              <a:t>Git</a:t>
+            </a:r>
+            <a:r>
+              <a:rPr lang="en-US" dirty="0" smtClean="0"/>
+              <a:t>Hub app</a:t>
+            </a:r>
+            <a:endParaRPr lang="en-US" dirty="0" smtClean="0"/>
           </a:p>
           <a:p>
             <a:r>
@@ -14545,11 +14546,7 @@
           <a:p>
             <a:r>
               <a:rPr lang="en-US" dirty="0" smtClean="0"/>
-              <a:t>What is source </a:t>
-            </a:r>
-            <a:r>
-              <a:rPr lang="en-US" dirty="0" smtClean="0"/>
-              <a:t>control</a:t>
+              <a:t>What is source control</a:t>
             </a:r>
           </a:p>
           <a:p>
@@ -14578,7 +14575,15 @@
           <a:p>
             <a:r>
               <a:rPr lang="en-US" dirty="0" smtClean="0"/>
-              <a:t>Also called version control and revision control.</a:t>
+              <a:t>Source control is a</a:t>
+            </a:r>
+            <a:r>
+              <a:rPr lang="en-US" dirty="0" smtClean="0"/>
+              <a:t>lso </a:t>
+            </a:r>
+            <a:r>
+              <a:rPr lang="en-US" dirty="0" smtClean="0"/>
+              <a:t>called version control and revision control.</a:t>
             </a:r>
           </a:p>
           <a:p>
@@ -14586,7 +14591,6 @@
               <a:rPr lang="en-US" dirty="0" smtClean="0"/>
               <a:t>Older source control methods allowed users to check out a file from a file server, but that file become locked while it was checked out. This prevented 2 developers from modifying the same file at the same time. </a:t>
             </a:r>
-            <a:endParaRPr lang="en-US" dirty="0" smtClean="0"/>
           </a:p>
           <a:p>
             <a:pPr marL="457200" lvl="1" indent="0">
@@ -14646,8 +14650,12 @@
               <a:t>What is </a:t>
             </a:r>
             <a:r>
+              <a:rPr lang="en-US" dirty="0" err="1"/>
+              <a:t>G</a:t>
+            </a:r>
+            <a:r>
               <a:rPr lang="en-US" dirty="0" err="1" smtClean="0"/>
-              <a:t>git</a:t>
+              <a:t>it</a:t>
             </a:r>
             <a:r>
               <a:rPr lang="en-US" dirty="0" smtClean="0"/>
@@ -14678,11 +14686,7 @@
             </a:r>
             <a:r>
               <a:rPr lang="en-US" dirty="0" smtClean="0"/>
-              <a:t> was invented by Linus Torvalds (inventor of Linux</a:t>
-            </a:r>
-            <a:r>
-              <a:rPr lang="en-US" dirty="0" smtClean="0"/>
-              <a:t>)</a:t>
+              <a:t> was invented by Linus Torvalds (inventor of Linux)</a:t>
             </a:r>
           </a:p>
           <a:p>
@@ -14957,7 +14961,19 @@
             </a:r>
             <a:r>
               <a:rPr lang="en-US" dirty="0" smtClean="0"/>
-              <a:t> (but only locally).</a:t>
+              <a:t> (but only locally</a:t>
+            </a:r>
+            <a:r>
+              <a:rPr lang="en-US" dirty="0" smtClean="0"/>
+              <a:t>). When you use </a:t>
+            </a:r>
+            <a:r>
+              <a:rPr lang="en-US" dirty="0" err="1" smtClean="0"/>
+              <a:t>git</a:t>
+            </a:r>
+            <a:r>
+              <a:rPr lang="en-US" dirty="0" smtClean="0"/>
+              <a:t> add –A, any new files added to the project become tracked.</a:t>
             </a:r>
             <a:endParaRPr lang="en-US" dirty="0"/>
           </a:p>

</xml_diff>

<commit_message>
added images for intermediate commands
</commit_message>
<xml_diff>
--- a/Intro to git.pptx
+++ b/Intro to git.pptx
@@ -12,16 +12,21 @@
     <p:sldId id="260" r:id="rId6"/>
     <p:sldId id="261" r:id="rId7"/>
     <p:sldId id="262" r:id="rId8"/>
-    <p:sldId id="263" r:id="rId9"/>
-    <p:sldId id="264" r:id="rId10"/>
-    <p:sldId id="265" r:id="rId11"/>
-    <p:sldId id="266" r:id="rId12"/>
-    <p:sldId id="267" r:id="rId13"/>
-    <p:sldId id="268" r:id="rId14"/>
-    <p:sldId id="269" r:id="rId15"/>
-    <p:sldId id="270" r:id="rId16"/>
-    <p:sldId id="271" r:id="rId17"/>
-    <p:sldId id="273" r:id="rId18"/>
+    <p:sldId id="278" r:id="rId9"/>
+    <p:sldId id="263" r:id="rId10"/>
+    <p:sldId id="264" r:id="rId11"/>
+    <p:sldId id="265" r:id="rId12"/>
+    <p:sldId id="266" r:id="rId13"/>
+    <p:sldId id="267" r:id="rId14"/>
+    <p:sldId id="268" r:id="rId15"/>
+    <p:sldId id="269" r:id="rId16"/>
+    <p:sldId id="270" r:id="rId17"/>
+    <p:sldId id="271" r:id="rId18"/>
+    <p:sldId id="274" r:id="rId19"/>
+    <p:sldId id="275" r:id="rId20"/>
+    <p:sldId id="273" r:id="rId21"/>
+    <p:sldId id="276" r:id="rId22"/>
+    <p:sldId id="277" r:id="rId23"/>
   </p:sldIdLst>
   <p:sldSz cx="12192000" cy="6858000"/>
   <p:notesSz cx="6858000" cy="9144000"/>
@@ -13333,11 +13338,7 @@
             </a:r>
             <a:r>
               <a:rPr lang="en-US" dirty="0" smtClean="0"/>
-              <a:t> </a:t>
-            </a:r>
-            <a:r>
-              <a:rPr lang="en-US" dirty="0" smtClean="0"/>
-              <a:t>and how to</a:t>
+              <a:t> and how to</a:t>
             </a:r>
             <a:endParaRPr lang="en-US" dirty="0"/>
           </a:p>
@@ -13476,6 +13477,133 @@
             </a:r>
             <a:r>
               <a:rPr lang="en-US" dirty="0" err="1" smtClean="0"/>
+              <a:t>git</a:t>
+            </a:r>
+            <a:r>
+              <a:rPr lang="en-US" dirty="0" smtClean="0"/>
+              <a:t> commands</a:t>
+            </a:r>
+            <a:endParaRPr lang="en-US" dirty="0"/>
+          </a:p>
+        </p:txBody>
+      </p:sp>
+      <p:sp>
+        <p:nvSpPr>
+          <p:cNvPr id="3" name="Content Placeholder 2"/>
+          <p:cNvSpPr>
+            <a:spLocks noGrp="1"/>
+          </p:cNvSpPr>
+          <p:nvPr>
+            <p:ph idx="1"/>
+          </p:nvPr>
+        </p:nvSpPr>
+        <p:spPr>
+          <a:xfrm>
+            <a:off x="1154954" y="2358801"/>
+            <a:ext cx="8825659" cy="757886"/>
+          </a:xfrm>
+        </p:spPr>
+        <p:txBody>
+          <a:bodyPr/>
+          <a:lstStyle/>
+          <a:p>
+            <a:r>
+              <a:rPr lang="en-US" dirty="0" smtClean="0"/>
+              <a:t>With the .</a:t>
+            </a:r>
+            <a:r>
+              <a:rPr lang="en-US" dirty="0" err="1" smtClean="0"/>
+              <a:t>docx</a:t>
+            </a:r>
+            <a:r>
+              <a:rPr lang="en-US" dirty="0" smtClean="0"/>
+              <a:t> version added, we can make a commit for it. Is it worth committing here?</a:t>
+            </a:r>
+            <a:endParaRPr lang="en-US" dirty="0"/>
+          </a:p>
+        </p:txBody>
+      </p:sp>
+      <p:pic>
+        <p:nvPicPr>
+          <p:cNvPr id="4" name="Picture 3"/>
+          <p:cNvPicPr>
+            <a:picLocks noChangeAspect="1"/>
+          </p:cNvPicPr>
+          <p:nvPr/>
+        </p:nvPicPr>
+        <p:blipFill>
+          <a:blip r:embed="rId2">
+            <a:extLst>
+              <a:ext uri="{28A0092B-C50C-407E-A947-70E740481C1C}">
+                <a14:useLocalDpi xmlns:a14="http://schemas.microsoft.com/office/drawing/2010/main" val="0"/>
+              </a:ext>
+            </a:extLst>
+          </a:blip>
+          <a:stretch>
+            <a:fillRect/>
+          </a:stretch>
+        </p:blipFill>
+        <p:spPr>
+          <a:xfrm>
+            <a:off x="868884" y="2995462"/>
+            <a:ext cx="10058400" cy="3703908"/>
+          </a:xfrm>
+          <a:prstGeom prst="rect">
+            <a:avLst/>
+          </a:prstGeom>
+        </p:spPr>
+      </p:pic>
+    </p:spTree>
+    <p:extLst>
+      <p:ext uri="{BB962C8B-B14F-4D97-AF65-F5344CB8AC3E}">
+        <p14:creationId xmlns:p14="http://schemas.microsoft.com/office/powerpoint/2010/main" val="3157428357"/>
+      </p:ext>
+    </p:extLst>
+  </p:cSld>
+  <p:clrMapOvr>
+    <a:masterClrMapping/>
+  </p:clrMapOvr>
+</p:sld>
+</file>
+
+<file path=ppt/slides/slide11.xml><?xml version="1.0" encoding="utf-8"?>
+<p:sld xmlns:a="http://schemas.openxmlformats.org/drawingml/2006/main" xmlns:r="http://schemas.openxmlformats.org/officeDocument/2006/relationships" xmlns:p="http://schemas.openxmlformats.org/presentationml/2006/main">
+  <p:cSld>
+    <p:spTree>
+      <p:nvGrpSpPr>
+        <p:cNvPr id="1" name=""/>
+        <p:cNvGrpSpPr/>
+        <p:nvPr/>
+      </p:nvGrpSpPr>
+      <p:grpSpPr>
+        <a:xfrm>
+          <a:off x="0" y="0"/>
+          <a:ext cx="0" cy="0"/>
+          <a:chOff x="0" y="0"/>
+          <a:chExt cx="0" cy="0"/>
+        </a:xfrm>
+      </p:grpSpPr>
+      <p:sp>
+        <p:nvSpPr>
+          <p:cNvPr id="2" name="Title 1"/>
+          <p:cNvSpPr>
+            <a:spLocks noGrp="1"/>
+          </p:cNvSpPr>
+          <p:nvPr>
+            <p:ph type="title"/>
+          </p:nvPr>
+        </p:nvSpPr>
+        <p:spPr/>
+        <p:txBody>
+          <a:bodyPr/>
+          <a:lstStyle/>
+          <a:p>
+            <a:r>
+              <a:rPr lang="en-US" dirty="0" smtClean="0"/>
+              <a:t>Examples of basic </a:t>
+            </a:r>
+            <a:r>
+              <a:rPr lang="en-US" dirty="0" err="1" smtClean="0"/>
               <a:t>Git</a:t>
             </a:r>
             <a:r>
@@ -13527,7 +13655,7 @@
 </p:sld>
 </file>
 
-<file path=ppt/slides/slide11.xml><?xml version="1.0" encoding="utf-8"?>
+<file path=ppt/slides/slide12.xml><?xml version="1.0" encoding="utf-8"?>
 <p:sld xmlns:a="http://schemas.openxmlformats.org/drawingml/2006/main" xmlns:r="http://schemas.openxmlformats.org/officeDocument/2006/relationships" xmlns:p="http://schemas.openxmlformats.org/presentationml/2006/main">
   <p:cSld>
     <p:spTree>
@@ -13586,7 +13714,7 @@
 </p:sld>
 </file>
 
-<file path=ppt/slides/slide12.xml><?xml version="1.0" encoding="utf-8"?>
+<file path=ppt/slides/slide13.xml><?xml version="1.0" encoding="utf-8"?>
 <p:sld xmlns:a="http://schemas.openxmlformats.org/drawingml/2006/main" xmlns:r="http://schemas.openxmlformats.org/officeDocument/2006/relationships" xmlns:p="http://schemas.openxmlformats.org/presentationml/2006/main">
   <p:cSld>
     <p:spTree>
@@ -13679,7 +13807,7 @@
 </p:sld>
 </file>
 
-<file path=ppt/slides/slide13.xml><?xml version="1.0" encoding="utf-8"?>
+<file path=ppt/slides/slide14.xml><?xml version="1.0" encoding="utf-8"?>
 <p:sld xmlns:a="http://schemas.openxmlformats.org/drawingml/2006/main" xmlns:r="http://schemas.openxmlformats.org/officeDocument/2006/relationships" xmlns:p="http://schemas.openxmlformats.org/presentationml/2006/main">
   <p:cSld>
     <p:spTree>
@@ -13738,154 +13866,6 @@
 </p:sld>
 </file>
 
-<file path=ppt/slides/slide14.xml><?xml version="1.0" encoding="utf-8"?>
-<p:sld xmlns:a="http://schemas.openxmlformats.org/drawingml/2006/main" xmlns:r="http://schemas.openxmlformats.org/officeDocument/2006/relationships" xmlns:p="http://schemas.openxmlformats.org/presentationml/2006/main">
-  <p:cSld>
-    <p:spTree>
-      <p:nvGrpSpPr>
-        <p:cNvPr id="1" name=""/>
-        <p:cNvGrpSpPr/>
-        <p:nvPr/>
-      </p:nvGrpSpPr>
-      <p:grpSpPr>
-        <a:xfrm>
-          <a:off x="0" y="0"/>
-          <a:ext cx="0" cy="0"/>
-          <a:chOff x="0" y="0"/>
-          <a:chExt cx="0" cy="0"/>
-        </a:xfrm>
-      </p:grpSpPr>
-      <p:sp>
-        <p:nvSpPr>
-          <p:cNvPr id="2" name="Title 1"/>
-          <p:cNvSpPr>
-            <a:spLocks noGrp="1"/>
-          </p:cNvSpPr>
-          <p:nvPr>
-            <p:ph type="title"/>
-          </p:nvPr>
-        </p:nvSpPr>
-        <p:spPr/>
-        <p:txBody>
-          <a:bodyPr/>
-          <a:lstStyle/>
-          <a:p>
-            <a:r>
-              <a:rPr lang="en-US" dirty="0" smtClean="0"/>
-              <a:t>Intermediate </a:t>
-            </a:r>
-            <a:r>
-              <a:rPr lang="en-US" dirty="0" err="1" smtClean="0"/>
-              <a:t>Git</a:t>
-            </a:r>
-            <a:r>
-              <a:rPr lang="en-US" dirty="0" smtClean="0"/>
-              <a:t> commands</a:t>
-            </a:r>
-            <a:endParaRPr lang="en-US" dirty="0"/>
-          </a:p>
-        </p:txBody>
-      </p:sp>
-      <p:sp>
-        <p:nvSpPr>
-          <p:cNvPr id="3" name="Content Placeholder 2"/>
-          <p:cNvSpPr>
-            <a:spLocks noGrp="1"/>
-          </p:cNvSpPr>
-          <p:nvPr>
-            <p:ph idx="1"/>
-          </p:nvPr>
-        </p:nvSpPr>
-        <p:spPr/>
-        <p:txBody>
-          <a:bodyPr>
-            <a:normAutofit fontScale="92500" lnSpcReduction="20000"/>
-          </a:bodyPr>
-          <a:lstStyle/>
-          <a:p>
-            <a:r>
-              <a:rPr lang="en-US" dirty="0" smtClean="0"/>
-              <a:t>Add, commit and push are the basics commands of </a:t>
-            </a:r>
-            <a:r>
-              <a:rPr lang="en-US" dirty="0" err="1" smtClean="0"/>
-              <a:t>Git</a:t>
-            </a:r>
-            <a:r>
-              <a:rPr lang="en-US" dirty="0"/>
-              <a:t> </a:t>
-            </a:r>
-            <a:r>
-              <a:rPr lang="en-US" dirty="0" smtClean="0"/>
-              <a:t>and represent just the bare minimum needed to use </a:t>
-            </a:r>
-            <a:r>
-              <a:rPr lang="en-US" dirty="0" err="1" smtClean="0"/>
-              <a:t>Git</a:t>
-            </a:r>
-            <a:r>
-              <a:rPr lang="en-US" dirty="0" smtClean="0"/>
-              <a:t>.</a:t>
-            </a:r>
-          </a:p>
-          <a:p>
-            <a:r>
-              <a:rPr lang="en-US" dirty="0" smtClean="0"/>
-              <a:t>Branching</a:t>
-            </a:r>
-          </a:p>
-          <a:p>
-            <a:pPr lvl="1"/>
-            <a:r>
-              <a:rPr lang="en-US" dirty="0" smtClean="0"/>
-              <a:t>Code can be branched off, so that changes on one branch do not effect another branch. This is useful for adding new functionality or attempting to debug a major problem without destroying your current version of code.</a:t>
-            </a:r>
-          </a:p>
-          <a:p>
-            <a:r>
-              <a:rPr lang="en-US" dirty="0" err="1" smtClean="0"/>
-              <a:t>git</a:t>
-            </a:r>
-            <a:r>
-              <a:rPr lang="en-US" dirty="0" smtClean="0"/>
-              <a:t> pull</a:t>
-            </a:r>
-          </a:p>
-          <a:p>
-            <a:pPr lvl="1"/>
-            <a:r>
-              <a:rPr lang="en-US" dirty="0" smtClean="0"/>
-              <a:t>This command brings down any changes to from the remote repository and adds it to the local repository. Be aware of merge conflicts here.</a:t>
-            </a:r>
-          </a:p>
-          <a:p>
-            <a:r>
-              <a:rPr lang="en-US" dirty="0" smtClean="0"/>
-              <a:t>Cloning:</a:t>
-            </a:r>
-          </a:p>
-          <a:p>
-            <a:pPr lvl="1"/>
-            <a:r>
-              <a:rPr lang="en-US" dirty="0" smtClean="0"/>
-              <a:t>This is the act of pulling down an existing repository. This can be more easily done using the GitHub app.</a:t>
-            </a:r>
-          </a:p>
-        </p:txBody>
-      </p:sp>
-    </p:spTree>
-    <p:extLst>
-      <p:ext uri="{BB962C8B-B14F-4D97-AF65-F5344CB8AC3E}">
-        <p14:creationId xmlns:p14="http://schemas.microsoft.com/office/powerpoint/2010/main" val="3877826343"/>
-      </p:ext>
-    </p:extLst>
-  </p:cSld>
-  <p:clrMapOvr>
-    <a:masterClrMapping/>
-  </p:clrMapOvr>
-</p:sld>
-</file>
-
 <file path=ppt/slides/slide15.xml><?xml version="1.0" encoding="utf-8"?>
 <p:sld xmlns:a="http://schemas.openxmlformats.org/drawingml/2006/main" xmlns:r="http://schemas.openxmlformats.org/officeDocument/2006/relationships" xmlns:p="http://schemas.openxmlformats.org/presentationml/2006/main">
   <p:cSld>
@@ -13944,103 +13924,87 @@
             <p:ph idx="1"/>
           </p:nvPr>
         </p:nvSpPr>
-        <p:spPr>
-          <a:xfrm>
-            <a:off x="1154954" y="2603500"/>
-            <a:ext cx="8903446" cy="3526844"/>
-          </a:xfrm>
-        </p:spPr>
+        <p:spPr/>
         <p:txBody>
           <a:bodyPr>
-            <a:normAutofit lnSpcReduction="10000"/>
+            <a:normAutofit fontScale="92500" lnSpcReduction="20000"/>
           </a:bodyPr>
           <a:lstStyle/>
           <a:p>
             <a:r>
               <a:rPr lang="en-US" dirty="0" smtClean="0"/>
-              <a:t>Branching:</a:t>
-            </a:r>
-          </a:p>
-          <a:p>
+              <a:t>Add, commit and push are the basics commands of </a:t>
+            </a:r>
             <a:r>
               <a:rPr lang="en-US" dirty="0" err="1" smtClean="0"/>
-              <a:t>git</a:t>
+              <a:t>Git</a:t>
+            </a:r>
+            <a:r>
+              <a:rPr lang="en-US" dirty="0"/>
+              <a:t> </a:t>
             </a:r>
             <a:r>
               <a:rPr lang="en-US" dirty="0" smtClean="0"/>
-              <a:t> checkout &lt;branch name&gt;</a:t>
+              <a:t>and represent just the bare minimum needed to use </a:t>
+            </a:r>
+            <a:r>
+              <a:rPr lang="en-US" dirty="0" err="1" smtClean="0"/>
+              <a:t>Git</a:t>
+            </a:r>
+            <a:r>
+              <a:rPr lang="en-US" dirty="0" smtClean="0"/>
+              <a:t>.</a:t>
+            </a:r>
+          </a:p>
+          <a:p>
+            <a:r>
+              <a:rPr lang="en-US" dirty="0" smtClean="0"/>
+              <a:t>Branching</a:t>
             </a:r>
           </a:p>
           <a:p>
             <a:pPr lvl="1"/>
             <a:r>
-              <a:rPr lang="en-US" dirty="0" err="1" smtClean="0"/>
-              <a:t>git</a:t>
-            </a:r>
-            <a:r>
               <a:rPr lang="en-US" dirty="0" smtClean="0"/>
-              <a:t> checkout lets you traverse between branches. When you switch branches, the code in your folders will change automatically. </a:t>
-            </a:r>
-          </a:p>
-          <a:p>
-            <a:pPr indent="-285750"/>
-            <a:r>
-              <a:rPr lang="en-US" dirty="0" err="1"/>
-              <a:t>g</a:t>
-            </a:r>
-            <a:r>
-              <a:rPr lang="en-US" dirty="0" err="1" smtClean="0"/>
-              <a:t>it</a:t>
+              <a:t>Code can be branched off, so that changes on one branch do not effect another branch. This is useful for adding new functionality or attempting to debug a major problem without destroying your current version of code</a:t>
             </a:r>
             <a:r>
               <a:rPr lang="en-US" dirty="0" smtClean="0"/>
-              <a:t> checkout –b &lt;branch name&gt;</a:t>
+              <a:t>.</a:t>
+            </a:r>
+          </a:p>
+          <a:p>
+            <a:r>
+              <a:rPr lang="en-US" dirty="0" smtClean="0"/>
+              <a:t>Merging</a:t>
             </a:r>
           </a:p>
           <a:p>
             <a:pPr lvl="1"/>
             <a:r>
               <a:rPr lang="en-US" dirty="0" smtClean="0"/>
-              <a:t>This command lets you create a new branch on your machine. When you create the new branch, it will automatically jump to the new branch. </a:t>
-            </a:r>
-            <a:endParaRPr lang="en-US" dirty="0"/>
-          </a:p>
-          <a:p>
-            <a:r>
-              <a:rPr lang="en-US" dirty="0" err="1"/>
-              <a:t>g</a:t>
-            </a:r>
-            <a:r>
-              <a:rPr lang="en-US" dirty="0" err="1" smtClean="0"/>
-              <a:t>it</a:t>
-            </a:r>
+              <a:t>Merging is the act of rectifying the history of 2 separate branches. When 2 braches are merged, the code from one branch is added to the code of another. </a:t>
+            </a:r>
+          </a:p>
+          <a:p>
             <a:r>
               <a:rPr lang="en-US" dirty="0" smtClean="0"/>
-              <a:t> push –set-upstream origin &lt;branch you are appending to&gt;</a:t>
+              <a:t>Cloning:</a:t>
             </a:r>
           </a:p>
           <a:p>
             <a:pPr lvl="1"/>
             <a:r>
-              <a:rPr lang="en-US" dirty="0" smtClean="0">
-                <a:solidFill>
-                  <a:schemeClr val="accent2"/>
-                </a:solidFill>
-              </a:rPr>
-              <a:t>When you create your branch, the remote repository doesn’t know about it. So we have to push the new branch to the remote repository. You’ll notice it says master at the end,.</a:t>
-            </a:r>
-            <a:endParaRPr lang="en-US" dirty="0">
-              <a:solidFill>
-                <a:schemeClr val="accent2"/>
-              </a:solidFill>
-            </a:endParaRPr>
+              <a:rPr lang="en-US" dirty="0" smtClean="0"/>
+              <a:t>This is the act of pulling down an existing repository. This can be more easily done using the GitHub app.</a:t>
+            </a:r>
           </a:p>
         </p:txBody>
       </p:sp>
     </p:spTree>
     <p:extLst>
       <p:ext uri="{BB962C8B-B14F-4D97-AF65-F5344CB8AC3E}">
-        <p14:creationId xmlns:p14="http://schemas.microsoft.com/office/powerpoint/2010/main" val="3947764904"/>
+        <p14:creationId xmlns:p14="http://schemas.microsoft.com/office/powerpoint/2010/main" val="3877826343"/>
       </p:ext>
     </p:extLst>
   </p:cSld>
@@ -14092,6 +14056,183 @@
             </a:r>
             <a:r>
               <a:rPr lang="en-US" dirty="0" smtClean="0"/>
+              <a:t> commands</a:t>
+            </a:r>
+            <a:endParaRPr lang="en-US" dirty="0"/>
+          </a:p>
+        </p:txBody>
+      </p:sp>
+      <p:sp>
+        <p:nvSpPr>
+          <p:cNvPr id="3" name="Content Placeholder 2"/>
+          <p:cNvSpPr>
+            <a:spLocks noGrp="1"/>
+          </p:cNvSpPr>
+          <p:nvPr>
+            <p:ph idx="1"/>
+          </p:nvPr>
+        </p:nvSpPr>
+        <p:spPr>
+          <a:xfrm>
+            <a:off x="1154954" y="2603500"/>
+            <a:ext cx="8903446" cy="3526844"/>
+          </a:xfrm>
+        </p:spPr>
+        <p:txBody>
+          <a:bodyPr>
+            <a:normAutofit/>
+          </a:bodyPr>
+          <a:lstStyle/>
+          <a:p>
+            <a:r>
+              <a:rPr lang="en-US" dirty="0" smtClean="0"/>
+              <a:t>Branching:</a:t>
+            </a:r>
+          </a:p>
+          <a:p>
+            <a:r>
+              <a:rPr lang="en-US" dirty="0" err="1" smtClean="0"/>
+              <a:t>git</a:t>
+            </a:r>
+            <a:r>
+              <a:rPr lang="en-US" dirty="0" smtClean="0"/>
+              <a:t> checkout &lt;branch name&gt;</a:t>
+            </a:r>
+          </a:p>
+          <a:p>
+            <a:pPr lvl="1"/>
+            <a:r>
+              <a:rPr lang="en-US" dirty="0" err="1" smtClean="0"/>
+              <a:t>git</a:t>
+            </a:r>
+            <a:r>
+              <a:rPr lang="en-US" dirty="0" smtClean="0"/>
+              <a:t> checkout lets you traverse between branches. When you switch branches, the code in your folders will change automatically. </a:t>
+            </a:r>
+          </a:p>
+          <a:p>
+            <a:pPr indent="-285750"/>
+            <a:r>
+              <a:rPr lang="en-US" dirty="0" err="1"/>
+              <a:t>g</a:t>
+            </a:r>
+            <a:r>
+              <a:rPr lang="en-US" dirty="0" err="1" smtClean="0"/>
+              <a:t>it</a:t>
+            </a:r>
+            <a:r>
+              <a:rPr lang="en-US" dirty="0" smtClean="0"/>
+              <a:t> checkout –b &lt;branch name&gt;</a:t>
+            </a:r>
+          </a:p>
+          <a:p>
+            <a:pPr lvl="1"/>
+            <a:r>
+              <a:rPr lang="en-US" dirty="0" smtClean="0"/>
+              <a:t>This command lets you create a new branch on your machine. When you create the new branch, it will automatically jump to the new branch. </a:t>
+            </a:r>
+            <a:endParaRPr lang="en-US" dirty="0"/>
+          </a:p>
+          <a:p>
+            <a:r>
+              <a:rPr lang="en-US" dirty="0" err="1"/>
+              <a:t>g</a:t>
+            </a:r>
+            <a:r>
+              <a:rPr lang="en-US" dirty="0" err="1" smtClean="0"/>
+              <a:t>it</a:t>
+            </a:r>
+            <a:r>
+              <a:rPr lang="en-US" dirty="0" smtClean="0"/>
+              <a:t> push –set-upstream origin &lt;branch </a:t>
+            </a:r>
+            <a:r>
+              <a:rPr lang="en-US" dirty="0" smtClean="0"/>
+              <a:t>name&gt;</a:t>
+            </a:r>
+            <a:endParaRPr lang="en-US" dirty="0" smtClean="0"/>
+          </a:p>
+          <a:p>
+            <a:pPr lvl="1"/>
+            <a:r>
+              <a:rPr lang="en-US" dirty="0" smtClean="0">
+                <a:solidFill>
+                  <a:schemeClr val="tx1"/>
+                </a:solidFill>
+              </a:rPr>
+              <a:t>When you create your branch, the remote repository doesn’t know about it. So we have to push the new branch to the remote </a:t>
+            </a:r>
+            <a:r>
+              <a:rPr lang="en-US" dirty="0" smtClean="0">
+                <a:solidFill>
+                  <a:schemeClr val="tx1"/>
+                </a:solidFill>
+              </a:rPr>
+              <a:t>repository.</a:t>
+            </a:r>
+            <a:endParaRPr lang="en-US" dirty="0">
+              <a:solidFill>
+                <a:schemeClr val="tx1"/>
+              </a:solidFill>
+            </a:endParaRPr>
+          </a:p>
+        </p:txBody>
+      </p:sp>
+    </p:spTree>
+    <p:extLst>
+      <p:ext uri="{BB962C8B-B14F-4D97-AF65-F5344CB8AC3E}">
+        <p14:creationId xmlns:p14="http://schemas.microsoft.com/office/powerpoint/2010/main" val="3947764904"/>
+      </p:ext>
+    </p:extLst>
+  </p:cSld>
+  <p:clrMapOvr>
+    <a:masterClrMapping/>
+  </p:clrMapOvr>
+</p:sld>
+</file>
+
+<file path=ppt/slides/slide17.xml><?xml version="1.0" encoding="utf-8"?>
+<p:sld xmlns:a="http://schemas.openxmlformats.org/drawingml/2006/main" xmlns:r="http://schemas.openxmlformats.org/officeDocument/2006/relationships" xmlns:p="http://schemas.openxmlformats.org/presentationml/2006/main">
+  <p:cSld>
+    <p:spTree>
+      <p:nvGrpSpPr>
+        <p:cNvPr id="1" name=""/>
+        <p:cNvGrpSpPr/>
+        <p:nvPr/>
+      </p:nvGrpSpPr>
+      <p:grpSpPr>
+        <a:xfrm>
+          <a:off x="0" y="0"/>
+          <a:ext cx="0" cy="0"/>
+          <a:chOff x="0" y="0"/>
+          <a:chExt cx="0" cy="0"/>
+        </a:xfrm>
+      </p:grpSpPr>
+      <p:sp>
+        <p:nvSpPr>
+          <p:cNvPr id="2" name="Title 1"/>
+          <p:cNvSpPr>
+            <a:spLocks noGrp="1"/>
+          </p:cNvSpPr>
+          <p:nvPr>
+            <p:ph type="title"/>
+          </p:nvPr>
+        </p:nvSpPr>
+        <p:spPr/>
+        <p:txBody>
+          <a:bodyPr/>
+          <a:lstStyle/>
+          <a:p>
+            <a:r>
+              <a:rPr lang="en-US" dirty="0" smtClean="0"/>
+              <a:t>Intermediate </a:t>
+            </a:r>
+            <a:r>
+              <a:rPr lang="en-US" dirty="0" err="1" smtClean="0"/>
+              <a:t>Git</a:t>
+            </a:r>
+            <a:r>
+              <a:rPr lang="en-US" dirty="0" smtClean="0"/>
               <a:t> commands	</a:t>
             </a:r>
             <a:endParaRPr lang="en-US" dirty="0"/>
@@ -14203,7 +14344,446 @@
 </p:sld>
 </file>
 
-<file path=ppt/slides/slide17.xml><?xml version="1.0" encoding="utf-8"?>
+<file path=ppt/slides/slide18.xml><?xml version="1.0" encoding="utf-8"?>
+<p:sld xmlns:a="http://schemas.openxmlformats.org/drawingml/2006/main" xmlns:r="http://schemas.openxmlformats.org/officeDocument/2006/relationships" xmlns:p="http://schemas.openxmlformats.org/presentationml/2006/main">
+  <p:cSld>
+    <p:spTree>
+      <p:nvGrpSpPr>
+        <p:cNvPr id="1" name=""/>
+        <p:cNvGrpSpPr/>
+        <p:nvPr/>
+      </p:nvGrpSpPr>
+      <p:grpSpPr>
+        <a:xfrm>
+          <a:off x="0" y="0"/>
+          <a:ext cx="0" cy="0"/>
+          <a:chOff x="0" y="0"/>
+          <a:chExt cx="0" cy="0"/>
+        </a:xfrm>
+      </p:grpSpPr>
+      <p:sp>
+        <p:nvSpPr>
+          <p:cNvPr id="2" name="Title 1"/>
+          <p:cNvSpPr>
+            <a:spLocks noGrp="1"/>
+          </p:cNvSpPr>
+          <p:nvPr>
+            <p:ph type="title"/>
+          </p:nvPr>
+        </p:nvSpPr>
+        <p:spPr/>
+        <p:txBody>
+          <a:bodyPr/>
+          <a:lstStyle/>
+          <a:p>
+            <a:r>
+              <a:rPr lang="en-US" dirty="0" smtClean="0"/>
+              <a:t>Intermediate </a:t>
+            </a:r>
+            <a:r>
+              <a:rPr lang="en-US" dirty="0" err="1" smtClean="0"/>
+              <a:t>Git</a:t>
+            </a:r>
+            <a:r>
+              <a:rPr lang="en-US" dirty="0" smtClean="0"/>
+              <a:t> commands</a:t>
+            </a:r>
+            <a:endParaRPr lang="en-US" dirty="0"/>
+          </a:p>
+        </p:txBody>
+      </p:sp>
+      <p:sp>
+        <p:nvSpPr>
+          <p:cNvPr id="3" name="Content Placeholder 2"/>
+          <p:cNvSpPr>
+            <a:spLocks noGrp="1"/>
+          </p:cNvSpPr>
+          <p:nvPr>
+            <p:ph idx="1"/>
+          </p:nvPr>
+        </p:nvSpPr>
+        <p:spPr/>
+        <p:txBody>
+          <a:bodyPr>
+            <a:normAutofit fontScale="92500"/>
+          </a:bodyPr>
+          <a:lstStyle/>
+          <a:p>
+            <a:r>
+              <a:rPr lang="en-US" dirty="0" smtClean="0"/>
+              <a:t>The act of merging 2 branches must be done carefully. Merge conflicts can easily occur.</a:t>
+            </a:r>
+          </a:p>
+          <a:p>
+            <a:r>
+              <a:rPr lang="en-US" dirty="0" err="1"/>
+              <a:t>g</a:t>
+            </a:r>
+            <a:r>
+              <a:rPr lang="en-US" dirty="0" err="1" smtClean="0"/>
+              <a:t>it</a:t>
+            </a:r>
+            <a:r>
+              <a:rPr lang="en-US" dirty="0" smtClean="0"/>
+              <a:t> merge &lt;branch to merge in&gt;</a:t>
+            </a:r>
+          </a:p>
+          <a:p>
+            <a:pPr lvl="1"/>
+            <a:r>
+              <a:rPr lang="en-US" dirty="0" smtClean="0"/>
+              <a:t>When you are on a branch, you can merge in another branch by using </a:t>
+            </a:r>
+            <a:r>
+              <a:rPr lang="en-US" dirty="0" err="1" smtClean="0"/>
+              <a:t>git</a:t>
+            </a:r>
+            <a:r>
+              <a:rPr lang="en-US" dirty="0" smtClean="0"/>
+              <a:t> merge. </a:t>
+            </a:r>
+          </a:p>
+          <a:p>
+            <a:pPr lvl="1"/>
+            <a:r>
+              <a:rPr lang="en-US" dirty="0" smtClean="0"/>
+              <a:t>When merging it is best to merge the higher level branch into the lower level branch first before merging the lower level into the higher level branch. </a:t>
+            </a:r>
+          </a:p>
+          <a:p>
+            <a:r>
+              <a:rPr lang="en-US" dirty="0" smtClean="0"/>
+              <a:t>Pull Requests are formal merges. This can be done in the shell but is best done on GitHub. When working on a group project, it is best to pull request into master instead of merging. A Pull Request allows you to describe changes made in a branch to that they can be reviewed before the request is accepted and the branches merged.</a:t>
+            </a:r>
+            <a:endParaRPr lang="en-US" dirty="0"/>
+          </a:p>
+          <a:p>
+            <a:pPr marL="457200" lvl="1" indent="0">
+              <a:buNone/>
+            </a:pPr>
+            <a:endParaRPr lang="en-US" dirty="0"/>
+          </a:p>
+        </p:txBody>
+      </p:sp>
+    </p:spTree>
+    <p:extLst>
+      <p:ext uri="{BB962C8B-B14F-4D97-AF65-F5344CB8AC3E}">
+        <p14:creationId xmlns:p14="http://schemas.microsoft.com/office/powerpoint/2010/main" val="4022598986"/>
+      </p:ext>
+    </p:extLst>
+  </p:cSld>
+  <p:clrMapOvr>
+    <a:masterClrMapping/>
+  </p:clrMapOvr>
+</p:sld>
+</file>
+
+<file path=ppt/slides/slide19.xml><?xml version="1.0" encoding="utf-8"?>
+<p:sld xmlns:a="http://schemas.openxmlformats.org/drawingml/2006/main" xmlns:r="http://schemas.openxmlformats.org/officeDocument/2006/relationships" xmlns:p="http://schemas.openxmlformats.org/presentationml/2006/main">
+  <p:cSld>
+    <p:spTree>
+      <p:nvGrpSpPr>
+        <p:cNvPr id="1" name=""/>
+        <p:cNvGrpSpPr/>
+        <p:nvPr/>
+      </p:nvGrpSpPr>
+      <p:grpSpPr>
+        <a:xfrm>
+          <a:off x="0" y="0"/>
+          <a:ext cx="0" cy="0"/>
+          <a:chOff x="0" y="0"/>
+          <a:chExt cx="0" cy="0"/>
+        </a:xfrm>
+      </p:grpSpPr>
+      <p:sp>
+        <p:nvSpPr>
+          <p:cNvPr id="2" name="Title 1"/>
+          <p:cNvSpPr>
+            <a:spLocks noGrp="1"/>
+          </p:cNvSpPr>
+          <p:nvPr>
+            <p:ph type="title"/>
+          </p:nvPr>
+        </p:nvSpPr>
+        <p:spPr/>
+        <p:txBody>
+          <a:bodyPr/>
+          <a:lstStyle/>
+          <a:p>
+            <a:r>
+              <a:rPr lang="en-US" dirty="0" smtClean="0"/>
+              <a:t>Intermediate </a:t>
+            </a:r>
+            <a:r>
+              <a:rPr lang="en-US" dirty="0" err="1" smtClean="0"/>
+              <a:t>Git</a:t>
+            </a:r>
+            <a:r>
+              <a:rPr lang="en-US" dirty="0" smtClean="0"/>
+              <a:t> commands</a:t>
+            </a:r>
+            <a:endParaRPr lang="en-US" dirty="0"/>
+          </a:p>
+        </p:txBody>
+      </p:sp>
+      <p:sp>
+        <p:nvSpPr>
+          <p:cNvPr id="3" name="Content Placeholder 2"/>
+          <p:cNvSpPr>
+            <a:spLocks noGrp="1"/>
+          </p:cNvSpPr>
+          <p:nvPr>
+            <p:ph idx="1"/>
+          </p:nvPr>
+        </p:nvSpPr>
+        <p:spPr/>
+        <p:txBody>
+          <a:bodyPr>
+            <a:normAutofit fontScale="77500" lnSpcReduction="20000"/>
+          </a:bodyPr>
+          <a:lstStyle/>
+          <a:p>
+            <a:r>
+              <a:rPr lang="en-US" dirty="0" smtClean="0"/>
+              <a:t>Deleting a branch</a:t>
+            </a:r>
+          </a:p>
+          <a:p>
+            <a:pPr lvl="1"/>
+            <a:r>
+              <a:rPr lang="en-US" dirty="0" smtClean="0"/>
+              <a:t>Branches aren’t typically permanent. So once you are done with a branch, you can delete it. You can do a local delete which won’t remove it from the remote repository. You can also do a remote delete (tread lightly).</a:t>
+            </a:r>
+          </a:p>
+          <a:p>
+            <a:r>
+              <a:rPr lang="en-US" dirty="0" err="1"/>
+              <a:t>g</a:t>
+            </a:r>
+            <a:r>
+              <a:rPr lang="en-US" dirty="0" err="1" smtClean="0"/>
+              <a:t>it</a:t>
+            </a:r>
+            <a:r>
+              <a:rPr lang="en-US" dirty="0" smtClean="0"/>
+              <a:t> push origin –delete &lt;branch name&gt;</a:t>
+            </a:r>
+          </a:p>
+          <a:p>
+            <a:pPr lvl="1"/>
+            <a:r>
+              <a:rPr lang="en-US" dirty="0" smtClean="0"/>
+              <a:t>This allows you to delete a remote branch, there are other commands that allow this as well, but this is the most simplified version. Deleting a remote branch will also delete the local branch.</a:t>
+            </a:r>
+          </a:p>
+          <a:p>
+            <a:r>
+              <a:rPr lang="en-US" dirty="0" err="1"/>
+              <a:t>g</a:t>
+            </a:r>
+            <a:r>
+              <a:rPr lang="en-US" dirty="0" err="1" smtClean="0"/>
+              <a:t>it</a:t>
+            </a:r>
+            <a:r>
+              <a:rPr lang="en-US" dirty="0" smtClean="0"/>
+              <a:t> branch –d &lt;branch name&gt;</a:t>
+            </a:r>
+          </a:p>
+          <a:p>
+            <a:pPr lvl="1"/>
+            <a:r>
+              <a:rPr lang="en-US" dirty="0" smtClean="0"/>
+              <a:t>This will do a local delete of a branch. Using the lower case d switch will cause </a:t>
+            </a:r>
+            <a:r>
+              <a:rPr lang="en-US" dirty="0" err="1" smtClean="0"/>
+              <a:t>git</a:t>
+            </a:r>
+            <a:r>
+              <a:rPr lang="en-US" dirty="0" smtClean="0"/>
+              <a:t> to check if your branch has been merged or not and warn you if it hasn’t.</a:t>
+            </a:r>
+          </a:p>
+          <a:p>
+            <a:r>
+              <a:rPr lang="en-US" dirty="0" err="1" smtClean="0"/>
+              <a:t>git</a:t>
+            </a:r>
+            <a:r>
+              <a:rPr lang="en-US" dirty="0" smtClean="0"/>
+              <a:t> branch –D &lt;branch name&gt;</a:t>
+            </a:r>
+          </a:p>
+          <a:p>
+            <a:pPr lvl="1"/>
+            <a:r>
+              <a:rPr lang="en-US" dirty="0" smtClean="0"/>
+              <a:t>This will do a local delete of a branch. Using the uppercase d switch will cause </a:t>
+            </a:r>
+            <a:r>
+              <a:rPr lang="en-US" dirty="0" err="1" smtClean="0"/>
+              <a:t>git</a:t>
+            </a:r>
+            <a:r>
+              <a:rPr lang="en-US" dirty="0" smtClean="0"/>
+              <a:t> to NOT check if you branch has been merged. This means that you are doing a forced delete of the branch. </a:t>
+            </a:r>
+          </a:p>
+          <a:p>
+            <a:endParaRPr lang="en-US" dirty="0"/>
+          </a:p>
+        </p:txBody>
+      </p:sp>
+    </p:spTree>
+    <p:extLst>
+      <p:ext uri="{BB962C8B-B14F-4D97-AF65-F5344CB8AC3E}">
+        <p14:creationId xmlns:p14="http://schemas.microsoft.com/office/powerpoint/2010/main" val="1048222897"/>
+      </p:ext>
+    </p:extLst>
+  </p:cSld>
+  <p:clrMapOvr>
+    <a:masterClrMapping/>
+  </p:clrMapOvr>
+</p:sld>
+</file>
+
+<file path=ppt/slides/slide2.xml><?xml version="1.0" encoding="utf-8"?>
+<p:sld xmlns:a="http://schemas.openxmlformats.org/drawingml/2006/main" xmlns:r="http://schemas.openxmlformats.org/officeDocument/2006/relationships" xmlns:p="http://schemas.openxmlformats.org/presentationml/2006/main">
+  <p:cSld>
+    <p:spTree>
+      <p:nvGrpSpPr>
+        <p:cNvPr id="1" name=""/>
+        <p:cNvGrpSpPr/>
+        <p:nvPr/>
+      </p:nvGrpSpPr>
+      <p:grpSpPr>
+        <a:xfrm>
+          <a:off x="0" y="0"/>
+          <a:ext cx="0" cy="0"/>
+          <a:chOff x="0" y="0"/>
+          <a:chExt cx="0" cy="0"/>
+        </a:xfrm>
+      </p:grpSpPr>
+      <p:sp>
+        <p:nvSpPr>
+          <p:cNvPr id="2" name="Title 1"/>
+          <p:cNvSpPr>
+            <a:spLocks noGrp="1"/>
+          </p:cNvSpPr>
+          <p:nvPr>
+            <p:ph type="title"/>
+          </p:nvPr>
+        </p:nvSpPr>
+        <p:spPr/>
+        <p:txBody>
+          <a:bodyPr/>
+          <a:lstStyle/>
+          <a:p>
+            <a:r>
+              <a:rPr lang="en-US" dirty="0" smtClean="0"/>
+              <a:t>Overview</a:t>
+            </a:r>
+            <a:endParaRPr lang="en-US" dirty="0"/>
+          </a:p>
+        </p:txBody>
+      </p:sp>
+      <p:sp>
+        <p:nvSpPr>
+          <p:cNvPr id="3" name="Content Placeholder 2"/>
+          <p:cNvSpPr>
+            <a:spLocks noGrp="1"/>
+          </p:cNvSpPr>
+          <p:nvPr>
+            <p:ph idx="1"/>
+          </p:nvPr>
+        </p:nvSpPr>
+        <p:spPr/>
+        <p:txBody>
+          <a:bodyPr/>
+          <a:lstStyle/>
+          <a:p>
+            <a:r>
+              <a:rPr lang="en-US" dirty="0" smtClean="0"/>
+              <a:t>Brief overview and history of </a:t>
+            </a:r>
+            <a:r>
+              <a:rPr lang="en-US" dirty="0" err="1"/>
+              <a:t>G</a:t>
+            </a:r>
+            <a:r>
+              <a:rPr lang="en-US" dirty="0" err="1" smtClean="0"/>
+              <a:t>it</a:t>
+            </a:r>
+            <a:endParaRPr lang="en-US" dirty="0" smtClean="0"/>
+          </a:p>
+          <a:p>
+            <a:r>
+              <a:rPr lang="en-US" dirty="0" smtClean="0"/>
+              <a:t>Intro to problems solved by source control</a:t>
+            </a:r>
+          </a:p>
+          <a:p>
+            <a:r>
+              <a:rPr lang="en-US" dirty="0" smtClean="0"/>
+              <a:t>Basic </a:t>
+            </a:r>
+            <a:r>
+              <a:rPr lang="en-US" dirty="0" err="1"/>
+              <a:t>G</a:t>
+            </a:r>
+            <a:r>
+              <a:rPr lang="en-US" dirty="0" err="1" smtClean="0"/>
+              <a:t>it</a:t>
+            </a:r>
+            <a:r>
+              <a:rPr lang="en-US" dirty="0" smtClean="0"/>
+              <a:t> commands and workflow (add, commit, and push)</a:t>
+            </a:r>
+          </a:p>
+          <a:p>
+            <a:r>
+              <a:rPr lang="en-US" dirty="0" smtClean="0"/>
+              <a:t>Overview of expanded ideas (clone, merging and conflicts, branching)</a:t>
+            </a:r>
+          </a:p>
+          <a:p>
+            <a:r>
+              <a:rPr lang="en-US" dirty="0" smtClean="0"/>
+              <a:t>Practical examples</a:t>
+            </a:r>
+          </a:p>
+          <a:p>
+            <a:r>
+              <a:rPr lang="en-US" dirty="0" smtClean="0"/>
+              <a:t>Setup of GitHub app</a:t>
+            </a:r>
+          </a:p>
+          <a:p>
+            <a:r>
+              <a:rPr lang="en-US" dirty="0" smtClean="0"/>
+              <a:t>Hands on experience</a:t>
+            </a:r>
+          </a:p>
+          <a:p>
+            <a:endParaRPr lang="en-US" dirty="0"/>
+          </a:p>
+        </p:txBody>
+      </p:sp>
+    </p:spTree>
+    <p:extLst>
+      <p:ext uri="{BB962C8B-B14F-4D97-AF65-F5344CB8AC3E}">
+        <p14:creationId xmlns:p14="http://schemas.microsoft.com/office/powerpoint/2010/main" val="1450765654"/>
+      </p:ext>
+    </p:extLst>
+  </p:cSld>
+  <p:clrMapOvr>
+    <a:masterClrMapping/>
+  </p:clrMapOvr>
+</p:sld>
+</file>
+
+<file path=ppt/slides/slide20.xml><?xml version="1.0" encoding="utf-8"?>
 <p:sld xmlns:a="http://schemas.openxmlformats.org/drawingml/2006/main" xmlns:r="http://schemas.openxmlformats.org/officeDocument/2006/relationships" xmlns:p="http://schemas.openxmlformats.org/presentationml/2006/main">
   <p:cSld>
     <p:spTree>
@@ -14289,7 +14869,7 @@
         <p:spPr>
           <a:xfrm>
             <a:off x="0" y="180304"/>
-            <a:ext cx="3113288" cy="1477328"/>
+            <a:ext cx="3113288" cy="2308324"/>
           </a:xfrm>
           <a:prstGeom prst="rect">
             <a:avLst/>
@@ -14304,7 +14884,11 @@
           <a:p>
             <a:r>
               <a:rPr lang="en-US" dirty="0" smtClean="0"/>
-              <a:t>These two images demonstrate that the content of your files physically changes when you switch branches.</a:t>
+              <a:t>These two images demonstrate that the content of your files physically changes when you switch branches</a:t>
+            </a:r>
+            <a:r>
+              <a:rPr lang="en-US" dirty="0" smtClean="0"/>
+              <a:t>. On the left you can see the folder where the project is housed.</a:t>
             </a:r>
             <a:endParaRPr lang="en-US" dirty="0"/>
           </a:p>
@@ -14323,7 +14907,7 @@
 </p:sld>
 </file>
 
-<file path=ppt/slides/slide2.xml><?xml version="1.0" encoding="utf-8"?>
+<file path=ppt/slides/slide21.xml><?xml version="1.0" encoding="utf-8"?>
 <p:sld xmlns:a="http://schemas.openxmlformats.org/drawingml/2006/main" xmlns:r="http://schemas.openxmlformats.org/officeDocument/2006/relationships" xmlns:p="http://schemas.openxmlformats.org/presentationml/2006/main">
   <p:cSld>
     <p:spTree>
@@ -14340,116 +14924,79 @@
           <a:chExt cx="0" cy="0"/>
         </a:xfrm>
       </p:grpSpPr>
+      <p:pic>
+        <p:nvPicPr>
+          <p:cNvPr id="3" name="Picture 2"/>
+          <p:cNvPicPr>
+            <a:picLocks noChangeAspect="1"/>
+          </p:cNvPicPr>
+          <p:nvPr/>
+        </p:nvPicPr>
+        <p:blipFill>
+          <a:blip r:embed="rId2">
+            <a:extLst>
+              <a:ext uri="{28A0092B-C50C-407E-A947-70E740481C1C}">
+                <a14:useLocalDpi xmlns:a14="http://schemas.microsoft.com/office/drawing/2010/main" val="0"/>
+              </a:ext>
+            </a:extLst>
+          </a:blip>
+          <a:stretch>
+            <a:fillRect/>
+          </a:stretch>
+        </p:blipFill>
+        <p:spPr>
+          <a:xfrm>
+            <a:off x="1647639" y="123568"/>
+            <a:ext cx="8221222" cy="2781688"/>
+          </a:xfrm>
+          <a:prstGeom prst="rect">
+            <a:avLst/>
+          </a:prstGeom>
+        </p:spPr>
+      </p:pic>
       <p:sp>
         <p:nvSpPr>
-          <p:cNvPr id="2" name="Title 1"/>
-          <p:cNvSpPr>
-            <a:spLocks noGrp="1"/>
-          </p:cNvSpPr>
-          <p:nvPr>
-            <p:ph type="title"/>
-          </p:nvPr>
+          <p:cNvPr id="5" name="TextBox 4"/>
+          <p:cNvSpPr txBox="1"/>
+          <p:nvPr/>
         </p:nvSpPr>
-        <p:spPr/>
+        <p:spPr>
+          <a:xfrm>
+            <a:off x="1573427" y="3097427"/>
+            <a:ext cx="8756822" cy="2031325"/>
+          </a:xfrm>
+          <a:prstGeom prst="rect">
+            <a:avLst/>
+          </a:prstGeom>
+          <a:noFill/>
+        </p:spPr>
         <p:txBody>
-          <a:bodyPr/>
+          <a:bodyPr wrap="square" rtlCol="0">
+            <a:spAutoFit/>
+          </a:bodyPr>
           <a:lstStyle/>
           <a:p>
             <a:r>
               <a:rPr lang="en-US" dirty="0" smtClean="0"/>
-              <a:t>Overview</a:t>
-            </a:r>
+              <a:t>Using the repository for all my CSE projects. I made a branch for a project called </a:t>
+            </a:r>
+            <a:r>
+              <a:rPr lang="en-US" dirty="0" err="1" smtClean="0"/>
+              <a:t>avl-rbt</a:t>
+            </a:r>
+            <a:r>
+              <a:rPr lang="en-US" dirty="0" smtClean="0"/>
+              <a:t>. Once I turned in the project, I merged the branch into master. First I merged master into my branch. It was already up to date with master, so nothing happened. I switched to master and merged in my branch. </a:t>
+            </a:r>
+          </a:p>
+          <a:p>
             <a:endParaRPr lang="en-US" dirty="0"/>
           </a:p>
-        </p:txBody>
-      </p:sp>
-      <p:sp>
-        <p:nvSpPr>
-          <p:cNvPr id="3" name="Content Placeholder 2"/>
-          <p:cNvSpPr>
-            <a:spLocks noGrp="1"/>
-          </p:cNvSpPr>
-          <p:nvPr>
-            <p:ph idx="1"/>
-          </p:nvPr>
-        </p:nvSpPr>
-        <p:spPr/>
-        <p:txBody>
-          <a:bodyPr/>
-          <a:lstStyle/>
           <a:p>
             <a:r>
               <a:rPr lang="en-US" dirty="0" smtClean="0"/>
-              <a:t>Brief overview and history of </a:t>
-            </a:r>
-            <a:r>
-              <a:rPr lang="en-US" dirty="0" err="1"/>
-              <a:t>G</a:t>
-            </a:r>
-            <a:r>
-              <a:rPr lang="en-US" dirty="0" err="1" smtClean="0"/>
-              <a:t>it</a:t>
-            </a:r>
-            <a:endParaRPr lang="en-US" dirty="0" smtClean="0"/>
-          </a:p>
-          <a:p>
-            <a:r>
-              <a:rPr lang="en-US" dirty="0" smtClean="0"/>
-              <a:t>Intro to problems solved by source control</a:t>
-            </a:r>
-          </a:p>
-          <a:p>
-            <a:r>
-              <a:rPr lang="en-US" dirty="0" smtClean="0"/>
-              <a:t>Basic </a:t>
-            </a:r>
-            <a:r>
-              <a:rPr lang="en-US" dirty="0" err="1"/>
-              <a:t>G</a:t>
-            </a:r>
-            <a:r>
-              <a:rPr lang="en-US" dirty="0" err="1" smtClean="0"/>
-              <a:t>it</a:t>
-            </a:r>
-            <a:r>
-              <a:rPr lang="en-US" dirty="0" smtClean="0"/>
-              <a:t> commands and workflow (add, commit, and push)</a:t>
-            </a:r>
-          </a:p>
-          <a:p>
-            <a:r>
-              <a:rPr lang="en-US" dirty="0" smtClean="0"/>
-              <a:t>Overview of expanded ideas (clone, merging and conflicts, branching)</a:t>
-            </a:r>
-          </a:p>
-          <a:p>
-            <a:r>
-              <a:rPr lang="en-US" dirty="0" smtClean="0"/>
-              <a:t>Practical examples</a:t>
-            </a:r>
-          </a:p>
-          <a:p>
-            <a:r>
-              <a:rPr lang="en-US" dirty="0" smtClean="0"/>
-              <a:t>Setup of </a:t>
-            </a:r>
-            <a:r>
-              <a:rPr lang="en-US" dirty="0" smtClean="0"/>
-              <a:t>Git</a:t>
-            </a:r>
-            <a:r>
-              <a:rPr lang="en-US" dirty="0" smtClean="0"/>
-              <a:t>Hub app</a:t>
-            </a:r>
-            <a:endParaRPr lang="en-US" dirty="0" smtClean="0"/>
-          </a:p>
-          <a:p>
-            <a:r>
-              <a:rPr lang="en-US" dirty="0" smtClean="0"/>
-              <a:t>Hands on experience</a:t>
-            </a:r>
-          </a:p>
-          <a:p>
+              <a:t>If this were a work related project. I would have merged master into my branch and then made a pull request to merge my branch into master.</a:t>
+            </a:r>
             <a:endParaRPr lang="en-US" dirty="0"/>
           </a:p>
         </p:txBody>
@@ -14457,7 +15004,135 @@
     </p:spTree>
     <p:extLst>
       <p:ext uri="{BB962C8B-B14F-4D97-AF65-F5344CB8AC3E}">
-        <p14:creationId xmlns:p14="http://schemas.microsoft.com/office/powerpoint/2010/main" val="1450765654"/>
+        <p14:creationId xmlns:p14="http://schemas.microsoft.com/office/powerpoint/2010/main" val="4045241719"/>
+      </p:ext>
+    </p:extLst>
+  </p:cSld>
+  <p:clrMapOvr>
+    <a:masterClrMapping/>
+  </p:clrMapOvr>
+</p:sld>
+</file>
+
+<file path=ppt/slides/slide22.xml><?xml version="1.0" encoding="utf-8"?>
+<p:sld xmlns:a="http://schemas.openxmlformats.org/drawingml/2006/main" xmlns:r="http://schemas.openxmlformats.org/officeDocument/2006/relationships" xmlns:p="http://schemas.openxmlformats.org/presentationml/2006/main">
+  <p:cSld>
+    <p:spTree>
+      <p:nvGrpSpPr>
+        <p:cNvPr id="1" name=""/>
+        <p:cNvGrpSpPr/>
+        <p:nvPr/>
+      </p:nvGrpSpPr>
+      <p:grpSpPr>
+        <a:xfrm>
+          <a:off x="0" y="0"/>
+          <a:ext cx="0" cy="0"/>
+          <a:chOff x="0" y="0"/>
+          <a:chExt cx="0" cy="0"/>
+        </a:xfrm>
+      </p:grpSpPr>
+      <p:pic>
+        <p:nvPicPr>
+          <p:cNvPr id="2" name="Picture 1"/>
+          <p:cNvPicPr>
+            <a:picLocks noChangeAspect="1"/>
+          </p:cNvPicPr>
+          <p:nvPr/>
+        </p:nvPicPr>
+        <p:blipFill>
+          <a:blip r:embed="rId2">
+            <a:extLst>
+              <a:ext uri="{28A0092B-C50C-407E-A947-70E740481C1C}">
+                <a14:useLocalDpi xmlns:a14="http://schemas.microsoft.com/office/drawing/2010/main" val="0"/>
+              </a:ext>
+            </a:extLst>
+          </a:blip>
+          <a:stretch>
+            <a:fillRect/>
+          </a:stretch>
+        </p:blipFill>
+        <p:spPr>
+          <a:xfrm>
+            <a:off x="1079158" y="65903"/>
+            <a:ext cx="10058400" cy="4518065"/>
+          </a:xfrm>
+          <a:prstGeom prst="rect">
+            <a:avLst/>
+          </a:prstGeom>
+        </p:spPr>
+      </p:pic>
+      <p:sp>
+        <p:nvSpPr>
+          <p:cNvPr id="3" name="TextBox 2"/>
+          <p:cNvSpPr txBox="1"/>
+          <p:nvPr/>
+        </p:nvSpPr>
+        <p:spPr>
+          <a:xfrm>
+            <a:off x="1079158" y="4682821"/>
+            <a:ext cx="10000735" cy="1754326"/>
+          </a:xfrm>
+          <a:prstGeom prst="rect">
+            <a:avLst/>
+          </a:prstGeom>
+          <a:noFill/>
+        </p:spPr>
+        <p:txBody>
+          <a:bodyPr wrap="square" rtlCol="0">
+            <a:spAutoFit/>
+          </a:bodyPr>
+          <a:lstStyle/>
+          <a:p>
+            <a:r>
+              <a:rPr lang="en-US" dirty="0" smtClean="0"/>
+              <a:t>Once I merged my branch into master, I no longer needed the branch. I wanted to delete the branch, but first I felt it was important to push my merge first. Since the repository didn’t know about the local merge, I had to use </a:t>
+            </a:r>
+            <a:r>
+              <a:rPr lang="en-US" dirty="0" err="1" smtClean="0"/>
+              <a:t>git</a:t>
+            </a:r>
+            <a:r>
+              <a:rPr lang="en-US" dirty="0" smtClean="0"/>
+              <a:t> push.</a:t>
+            </a:r>
+          </a:p>
+          <a:p>
+            <a:endParaRPr lang="en-US" dirty="0"/>
+          </a:p>
+          <a:p>
+            <a:r>
+              <a:rPr lang="en-US" dirty="0" smtClean="0"/>
+              <a:t>With the merger pushed up I felt better about deleting my remote branch. So I used</a:t>
+            </a:r>
+          </a:p>
+          <a:p>
+            <a:r>
+              <a:rPr lang="en-US" dirty="0" err="1"/>
+              <a:t>g</a:t>
+            </a:r>
+            <a:r>
+              <a:rPr lang="en-US" dirty="0" err="1" smtClean="0"/>
+              <a:t>it</a:t>
+            </a:r>
+            <a:r>
+              <a:rPr lang="en-US" dirty="0" smtClean="0"/>
+              <a:t> push origin –delete </a:t>
+            </a:r>
+            <a:r>
+              <a:rPr lang="en-US" dirty="0" err="1" smtClean="0"/>
+              <a:t>avl-rbt</a:t>
+            </a:r>
+            <a:r>
+              <a:rPr lang="en-US" dirty="0"/>
+              <a:t>.</a:t>
+            </a:r>
+          </a:p>
+        </p:txBody>
+      </p:sp>
+    </p:spTree>
+    <p:extLst>
+      <p:ext uri="{BB962C8B-B14F-4D97-AF65-F5344CB8AC3E}">
+        <p14:creationId xmlns:p14="http://schemas.microsoft.com/office/powerpoint/2010/main" val="1245217097"/>
       </p:ext>
     </p:extLst>
   </p:cSld>
@@ -14575,15 +15250,7 @@
           <a:p>
             <a:r>
               <a:rPr lang="en-US" dirty="0" smtClean="0"/>
-              <a:t>Source control is a</a:t>
-            </a:r>
-            <a:r>
-              <a:rPr lang="en-US" dirty="0" smtClean="0"/>
-              <a:t>lso </a:t>
-            </a:r>
-            <a:r>
-              <a:rPr lang="en-US" dirty="0" smtClean="0"/>
-              <a:t>called version control and revision control.</a:t>
+              <a:t>Source control is also called version control and revision control.</a:t>
             </a:r>
           </a:p>
           <a:p>
@@ -14961,11 +15628,7 @@
             </a:r>
             <a:r>
               <a:rPr lang="en-US" dirty="0" smtClean="0"/>
-              <a:t> (but only locally</a:t>
-            </a:r>
-            <a:r>
-              <a:rPr lang="en-US" dirty="0" smtClean="0"/>
-              <a:t>). When you use </a:t>
+              <a:t> (but only locally). When you use </a:t>
             </a:r>
             <a:r>
               <a:rPr lang="en-US" dirty="0" err="1" smtClean="0"/>
@@ -15166,78 +15829,9 @@
           <a:chExt cx="0" cy="0"/>
         </a:xfrm>
       </p:grpSpPr>
-      <p:sp>
-        <p:nvSpPr>
-          <p:cNvPr id="2" name="Title 1"/>
-          <p:cNvSpPr>
-            <a:spLocks noGrp="1"/>
-          </p:cNvSpPr>
-          <p:nvPr>
-            <p:ph type="title"/>
-          </p:nvPr>
-        </p:nvSpPr>
-        <p:spPr/>
-        <p:txBody>
-          <a:bodyPr/>
-          <a:lstStyle/>
-          <a:p>
-            <a:r>
-              <a:rPr lang="en-US" dirty="0" smtClean="0"/>
-              <a:t>Examples of basic </a:t>
-            </a:r>
-            <a:r>
-              <a:rPr lang="en-US" dirty="0" err="1" smtClean="0"/>
-              <a:t>Git</a:t>
-            </a:r>
-            <a:r>
-              <a:rPr lang="en-US" dirty="0" smtClean="0"/>
-              <a:t> commands</a:t>
-            </a:r>
-            <a:endParaRPr lang="en-US" dirty="0"/>
-          </a:p>
-        </p:txBody>
-      </p:sp>
-      <p:sp>
-        <p:nvSpPr>
-          <p:cNvPr id="3" name="Content Placeholder 2"/>
-          <p:cNvSpPr>
-            <a:spLocks noGrp="1"/>
-          </p:cNvSpPr>
-          <p:nvPr>
-            <p:ph idx="1"/>
-          </p:nvPr>
-        </p:nvSpPr>
-        <p:spPr>
-          <a:xfrm>
-            <a:off x="1270864" y="2423196"/>
-            <a:ext cx="8825659" cy="603339"/>
-          </a:xfrm>
-        </p:spPr>
-        <p:txBody>
-          <a:bodyPr>
-            <a:normAutofit lnSpcReduction="10000"/>
-          </a:bodyPr>
-          <a:lstStyle/>
-          <a:p>
-            <a:r>
-              <a:rPr lang="en-US" dirty="0" smtClean="0"/>
-              <a:t>Repository already contains a text file version of Princess Foo. Examples show addition of .</a:t>
-            </a:r>
-            <a:r>
-              <a:rPr lang="en-US" dirty="0" err="1" smtClean="0"/>
-              <a:t>docx</a:t>
-            </a:r>
-            <a:r>
-              <a:rPr lang="en-US" dirty="0" smtClean="0"/>
-              <a:t> version of the same text.</a:t>
-            </a:r>
-            <a:endParaRPr lang="en-US" dirty="0"/>
-          </a:p>
-        </p:txBody>
-      </p:sp>
       <p:pic>
         <p:nvPicPr>
-          <p:cNvPr id="4" name="Picture 3"/>
+          <p:cNvPr id="2" name="Picture 1"/>
           <p:cNvPicPr>
             <a:picLocks noChangeAspect="1"/>
           </p:cNvPicPr>
@@ -15257,18 +15851,73 @@
         </p:blipFill>
         <p:spPr>
           <a:xfrm>
-            <a:off x="1296818" y="3085574"/>
-            <a:ext cx="8773749" cy="3772426"/>
+            <a:off x="865928" y="0"/>
+            <a:ext cx="10058400" cy="4017767"/>
           </a:xfrm>
           <a:prstGeom prst="rect">
             <a:avLst/>
           </a:prstGeom>
         </p:spPr>
       </p:pic>
+      <p:sp>
+        <p:nvSpPr>
+          <p:cNvPr id="4" name="TextBox 3"/>
+          <p:cNvSpPr txBox="1"/>
+          <p:nvPr/>
+        </p:nvSpPr>
+        <p:spPr>
+          <a:xfrm>
+            <a:off x="1095632" y="4017767"/>
+            <a:ext cx="9275806" cy="1477328"/>
+          </a:xfrm>
+          <a:prstGeom prst="rect">
+            <a:avLst/>
+          </a:prstGeom>
+          <a:noFill/>
+        </p:spPr>
+        <p:txBody>
+          <a:bodyPr wrap="square" rtlCol="0">
+            <a:spAutoFit/>
+          </a:bodyPr>
+          <a:lstStyle/>
+          <a:p>
+            <a:r>
+              <a:rPr lang="en-US" dirty="0" smtClean="0"/>
+              <a:t>The commit history of the </a:t>
+            </a:r>
+            <a:r>
+              <a:rPr lang="en-US" dirty="0" err="1" smtClean="0"/>
+              <a:t>git_session</a:t>
+            </a:r>
+            <a:r>
+              <a:rPr lang="en-US" dirty="0" smtClean="0"/>
+              <a:t> repository as seen from GitHub. The same history can be viewed from the shell using </a:t>
+            </a:r>
+            <a:r>
+              <a:rPr lang="en-US" dirty="0" err="1" smtClean="0"/>
+              <a:t>git</a:t>
+            </a:r>
+            <a:r>
+              <a:rPr lang="en-US" dirty="0" smtClean="0"/>
+              <a:t> log. </a:t>
+            </a:r>
+          </a:p>
+          <a:p>
+            <a:endParaRPr lang="en-US" dirty="0"/>
+          </a:p>
+          <a:p>
+            <a:r>
+              <a:rPr lang="en-US" dirty="0" smtClean="0"/>
+              <a:t>The numbers on the right side of the commit can be used to send your repository back in time and view the code as it did with this commit.</a:t>
+            </a:r>
+            <a:endParaRPr lang="en-US" dirty="0"/>
+          </a:p>
+        </p:txBody>
+      </p:sp>
     </p:spTree>
     <p:extLst>
       <p:ext uri="{BB962C8B-B14F-4D97-AF65-F5344CB8AC3E}">
-        <p14:creationId xmlns:p14="http://schemas.microsoft.com/office/powerpoint/2010/main" val="1160032541"/>
+        <p14:creationId xmlns:p14="http://schemas.microsoft.com/office/powerpoint/2010/main" val="2519998681"/>
       </p:ext>
     </p:extLst>
   </p:cSld>
@@ -15316,7 +15965,7 @@
             </a:r>
             <a:r>
               <a:rPr lang="en-US" dirty="0" err="1" smtClean="0"/>
-              <a:t>git</a:t>
+              <a:t>Git</a:t>
             </a:r>
             <a:r>
               <a:rPr lang="en-US" dirty="0" smtClean="0"/>
@@ -15338,17 +15987,19 @@
         </p:nvSpPr>
         <p:spPr>
           <a:xfrm>
-            <a:off x="1154954" y="2358801"/>
-            <a:ext cx="8825659" cy="757886"/>
+            <a:off x="1270864" y="2423196"/>
+            <a:ext cx="8825659" cy="603339"/>
           </a:xfrm>
         </p:spPr>
         <p:txBody>
-          <a:bodyPr/>
+          <a:bodyPr>
+            <a:normAutofit lnSpcReduction="10000"/>
+          </a:bodyPr>
           <a:lstStyle/>
           <a:p>
             <a:r>
               <a:rPr lang="en-US" dirty="0" smtClean="0"/>
-              <a:t>With the .</a:t>
+              <a:t>Repository already contains a text file version of Princess Foo. Examples show addition of .</a:t>
             </a:r>
             <a:r>
               <a:rPr lang="en-US" dirty="0" err="1" smtClean="0"/>
@@ -15356,7 +16007,7 @@
             </a:r>
             <a:r>
               <a:rPr lang="en-US" dirty="0" smtClean="0"/>
-              <a:t> version added, we can make a commit for it. Is it worth committing here?</a:t>
+              <a:t> version of the same text.</a:t>
             </a:r>
             <a:endParaRPr lang="en-US" dirty="0"/>
           </a:p>
@@ -15384,8 +16035,8 @@
         </p:blipFill>
         <p:spPr>
           <a:xfrm>
-            <a:off x="868884" y="2995462"/>
-            <a:ext cx="10058400" cy="3703908"/>
+            <a:off x="1296818" y="3085574"/>
+            <a:ext cx="8773749" cy="3772426"/>
           </a:xfrm>
           <a:prstGeom prst="rect">
             <a:avLst/>
@@ -15395,7 +16046,7 @@
     </p:spTree>
     <p:extLst>
       <p:ext uri="{BB962C8B-B14F-4D97-AF65-F5344CB8AC3E}">
-        <p14:creationId xmlns:p14="http://schemas.microsoft.com/office/powerpoint/2010/main" val="3157428357"/>
+        <p14:creationId xmlns:p14="http://schemas.microsoft.com/office/powerpoint/2010/main" val="1160032541"/>
       </p:ext>
     </p:extLst>
   </p:cSld>

</xml_diff>

<commit_message>
cleanup and added github setup
</commit_message>
<xml_diff>
--- a/Intro to git.pptx
+++ b/Intro to git.pptx
@@ -7,26 +7,26 @@
   <p:sldIdLst>
     <p:sldId id="256" r:id="rId2"/>
     <p:sldId id="257" r:id="rId3"/>
-    <p:sldId id="258" r:id="rId4"/>
-    <p:sldId id="259" r:id="rId5"/>
-    <p:sldId id="260" r:id="rId6"/>
+    <p:sldId id="260" r:id="rId4"/>
+    <p:sldId id="258" r:id="rId5"/>
+    <p:sldId id="259" r:id="rId6"/>
     <p:sldId id="261" r:id="rId7"/>
     <p:sldId id="262" r:id="rId8"/>
     <p:sldId id="278" r:id="rId9"/>
     <p:sldId id="263" r:id="rId10"/>
     <p:sldId id="264" r:id="rId11"/>
-    <p:sldId id="265" r:id="rId12"/>
-    <p:sldId id="266" r:id="rId13"/>
-    <p:sldId id="267" r:id="rId14"/>
-    <p:sldId id="268" r:id="rId15"/>
-    <p:sldId id="269" r:id="rId16"/>
-    <p:sldId id="270" r:id="rId17"/>
-    <p:sldId id="271" r:id="rId18"/>
-    <p:sldId id="274" r:id="rId19"/>
-    <p:sldId id="275" r:id="rId20"/>
-    <p:sldId id="273" r:id="rId21"/>
-    <p:sldId id="276" r:id="rId22"/>
-    <p:sldId id="277" r:id="rId23"/>
+    <p:sldId id="267" r:id="rId12"/>
+    <p:sldId id="279" r:id="rId13"/>
+    <p:sldId id="269" r:id="rId14"/>
+    <p:sldId id="270" r:id="rId15"/>
+    <p:sldId id="271" r:id="rId16"/>
+    <p:sldId id="274" r:id="rId17"/>
+    <p:sldId id="275" r:id="rId18"/>
+    <p:sldId id="273" r:id="rId19"/>
+    <p:sldId id="276" r:id="rId20"/>
+    <p:sldId id="277" r:id="rId21"/>
+    <p:sldId id="281" r:id="rId22"/>
+    <p:sldId id="280" r:id="rId23"/>
   </p:sldIdLst>
   <p:sldSz cx="12192000" cy="6858000"/>
   <p:notesSz cx="6858000" cy="9144000"/>
@@ -13607,8 +13607,12 @@
               <a:t>Git</a:t>
             </a:r>
             <a:r>
+              <a:rPr lang="en-US" dirty="0"/>
+              <a:t> </a:t>
+            </a:r>
+            <a:r>
               <a:rPr lang="en-US" dirty="0" smtClean="0"/>
-              <a:t> commands</a:t>
+              <a:t>commands</a:t>
             </a:r>
             <a:endParaRPr lang="en-US" dirty="0"/>
           </a:p>
@@ -13626,8 +13630,8 @@
         </p:nvSpPr>
         <p:spPr>
           <a:xfrm>
-            <a:off x="1154954" y="2603500"/>
-            <a:ext cx="8825659" cy="435914"/>
+            <a:off x="1296622" y="2448953"/>
+            <a:ext cx="8825659" cy="757886"/>
           </a:xfrm>
         </p:spPr>
         <p:txBody>
@@ -13636,7 +13640,7 @@
           <a:p>
             <a:r>
               <a:rPr lang="en-US" dirty="0" smtClean="0"/>
-              <a:t>Once we have a commit, we can push or we can add more commits.</a:t>
+              <a:t>When we feel compelled that our changes should be added to the remote repository, we push our commit(s).</a:t>
             </a:r>
             <a:endParaRPr lang="en-US" dirty="0"/>
           </a:p>
@@ -13645,7 +13649,7 @@
     </p:spTree>
     <p:extLst>
       <p:ext uri="{BB962C8B-B14F-4D97-AF65-F5344CB8AC3E}">
-        <p14:creationId xmlns:p14="http://schemas.microsoft.com/office/powerpoint/2010/main" val="463719291"/>
+        <p14:creationId xmlns:p14="http://schemas.microsoft.com/office/powerpoint/2010/main" val="67755914"/>
       </p:ext>
     </p:extLst>
   </p:cSld>
@@ -13674,13 +13678,11 @@
       </p:grpSpPr>
       <p:pic>
         <p:nvPicPr>
-          <p:cNvPr id="4" name="Content Placeholder 3"/>
+          <p:cNvPr id="2" name="Content Placeholder 3"/>
           <p:cNvPicPr>
-            <a:picLocks noGrp="1" noChangeAspect="1"/>
+            <a:picLocks noChangeAspect="1"/>
           </p:cNvPicPr>
-          <p:nvPr>
-            <p:ph idx="1"/>
-          </p:nvPr>
+          <p:nvPr/>
         </p:nvPicPr>
         <p:blipFill>
           <a:blip r:embed="rId2">
@@ -13696,15 +13698,18 @@
         </p:blipFill>
         <p:spPr>
           <a:xfrm>
-            <a:off x="995256" y="1108657"/>
-            <a:ext cx="9153296" cy="5678653"/>
+            <a:off x="1041923" y="80754"/>
+            <a:ext cx="9188543" cy="5909849"/>
           </a:xfrm>
+          <a:prstGeom prst="rect">
+            <a:avLst/>
+          </a:prstGeom>
         </p:spPr>
       </p:pic>
     </p:spTree>
     <p:extLst>
       <p:ext uri="{BB962C8B-B14F-4D97-AF65-F5344CB8AC3E}">
-        <p14:creationId xmlns:p14="http://schemas.microsoft.com/office/powerpoint/2010/main" val="3925122114"/>
+        <p14:creationId xmlns:p14="http://schemas.microsoft.com/office/powerpoint/2010/main" val="1329231379"/>
       </p:ext>
     </p:extLst>
   </p:cSld>
@@ -13748,19 +13753,15 @@
           <a:p>
             <a:r>
               <a:rPr lang="en-US" dirty="0" smtClean="0"/>
-              <a:t>Examples of basic </a:t>
+              <a:t>Intermediate </a:t>
             </a:r>
             <a:r>
               <a:rPr lang="en-US" dirty="0" err="1" smtClean="0"/>
               <a:t>Git</a:t>
             </a:r>
             <a:r>
-              <a:rPr lang="en-US" dirty="0"/>
-              <a:t> </a:t>
-            </a:r>
-            <a:r>
               <a:rPr lang="en-US" dirty="0" smtClean="0"/>
-              <a:t>commands</a:t>
+              <a:t> commands</a:t>
             </a:r>
             <a:endParaRPr lang="en-US" dirty="0"/>
           </a:p>
@@ -13776,28 +13777,83 @@
             <p:ph idx="1"/>
           </p:nvPr>
         </p:nvSpPr>
-        <p:spPr>
-          <a:xfrm>
-            <a:off x="1296622" y="2448953"/>
-            <a:ext cx="8825659" cy="757886"/>
-          </a:xfrm>
-        </p:spPr>
+        <p:spPr/>
         <p:txBody>
-          <a:bodyPr/>
+          <a:bodyPr>
+            <a:normAutofit fontScale="92500" lnSpcReduction="20000"/>
+          </a:bodyPr>
           <a:lstStyle/>
           <a:p>
             <a:r>
               <a:rPr lang="en-US" dirty="0" smtClean="0"/>
-              <a:t>When we feel compelled that our changes should be added to the remote repository, we push our commit(s).</a:t>
-            </a:r>
-            <a:endParaRPr lang="en-US" dirty="0"/>
+              <a:t>Add, commit and push are the basics commands of </a:t>
+            </a:r>
+            <a:r>
+              <a:rPr lang="en-US" dirty="0" err="1" smtClean="0"/>
+              <a:t>Git</a:t>
+            </a:r>
+            <a:r>
+              <a:rPr lang="en-US" dirty="0"/>
+              <a:t> </a:t>
+            </a:r>
+            <a:r>
+              <a:rPr lang="en-US" dirty="0" smtClean="0"/>
+              <a:t>and represent just the bare minimum needed to use </a:t>
+            </a:r>
+            <a:r>
+              <a:rPr lang="en-US" dirty="0" err="1" smtClean="0"/>
+              <a:t>Git</a:t>
+            </a:r>
+            <a:r>
+              <a:rPr lang="en-US" dirty="0" smtClean="0"/>
+              <a:t>.</a:t>
+            </a:r>
+          </a:p>
+          <a:p>
+            <a:r>
+              <a:rPr lang="en-US" dirty="0" smtClean="0"/>
+              <a:t>Branching</a:t>
+            </a:r>
+          </a:p>
+          <a:p>
+            <a:pPr lvl="1"/>
+            <a:r>
+              <a:rPr lang="en-US" dirty="0" smtClean="0"/>
+              <a:t>Code can be branched off, so that changes on one branch do not effect another branch. This is useful for adding new functionality or attempting to debug a major problem without destroying your current version of code.</a:t>
+            </a:r>
+          </a:p>
+          <a:p>
+            <a:r>
+              <a:rPr lang="en-US" dirty="0" smtClean="0"/>
+              <a:t>Merging</a:t>
+            </a:r>
+          </a:p>
+          <a:p>
+            <a:pPr lvl="1"/>
+            <a:r>
+              <a:rPr lang="en-US" dirty="0" smtClean="0"/>
+              <a:t>Merging is the act of rectifying the history of 2 separate branches. When 2 braches are merged, the code from one branch is added to the code of another. </a:t>
+            </a:r>
+          </a:p>
+          <a:p>
+            <a:r>
+              <a:rPr lang="en-US" dirty="0" smtClean="0"/>
+              <a:t>Cloning:</a:t>
+            </a:r>
+          </a:p>
+          <a:p>
+            <a:pPr lvl="1"/>
+            <a:r>
+              <a:rPr lang="en-US" dirty="0" smtClean="0"/>
+              <a:t>This is the act of pulling down an existing repository. This can be more easily done using the GitHub app.</a:t>
+            </a:r>
           </a:p>
         </p:txBody>
       </p:sp>
     </p:spTree>
     <p:extLst>
       <p:ext uri="{BB962C8B-B14F-4D97-AF65-F5344CB8AC3E}">
-        <p14:creationId xmlns:p14="http://schemas.microsoft.com/office/powerpoint/2010/main" val="67755914"/>
+        <p14:creationId xmlns:p14="http://schemas.microsoft.com/office/powerpoint/2010/main" val="3877826343"/>
       </p:ext>
     </p:extLst>
   </p:cSld>
@@ -13824,39 +13880,176 @@
           <a:chExt cx="0" cy="0"/>
         </a:xfrm>
       </p:grpSpPr>
-      <p:pic>
-        <p:nvPicPr>
-          <p:cNvPr id="4" name="Content Placeholder 3"/>
-          <p:cNvPicPr>
-            <a:picLocks noGrp="1" noChangeAspect="1"/>
-          </p:cNvPicPr>
+      <p:sp>
+        <p:nvSpPr>
+          <p:cNvPr id="2" name="Title 1"/>
+          <p:cNvSpPr>
+            <a:spLocks noGrp="1"/>
+          </p:cNvSpPr>
+          <p:nvPr>
+            <p:ph type="title"/>
+          </p:nvPr>
+        </p:nvSpPr>
+        <p:spPr/>
+        <p:txBody>
+          <a:bodyPr/>
+          <a:lstStyle/>
+          <a:p>
+            <a:r>
+              <a:rPr lang="en-US" dirty="0" smtClean="0"/>
+              <a:t>Intermediate </a:t>
+            </a:r>
+            <a:r>
+              <a:rPr lang="en-US" dirty="0" err="1" smtClean="0"/>
+              <a:t>Git</a:t>
+            </a:r>
+            <a:r>
+              <a:rPr lang="en-US" dirty="0" smtClean="0"/>
+              <a:t> commands</a:t>
+            </a:r>
+            <a:endParaRPr lang="en-US" dirty="0"/>
+          </a:p>
+        </p:txBody>
+      </p:sp>
+      <p:sp>
+        <p:nvSpPr>
+          <p:cNvPr id="3" name="Content Placeholder 2"/>
+          <p:cNvSpPr>
+            <a:spLocks noGrp="1"/>
+          </p:cNvSpPr>
           <p:nvPr>
             <p:ph idx="1"/>
           </p:nvPr>
-        </p:nvPicPr>
-        <p:blipFill>
-          <a:blip r:embed="rId2">
-            <a:extLst>
-              <a:ext uri="{28A0092B-C50C-407E-A947-70E740481C1C}">
-                <a14:useLocalDpi xmlns:a14="http://schemas.microsoft.com/office/drawing/2010/main" val="0"/>
-              </a:ext>
-            </a:extLst>
-          </a:blip>
-          <a:stretch>
-            <a:fillRect/>
-          </a:stretch>
-        </p:blipFill>
+        </p:nvSpPr>
         <p:spPr>
           <a:xfrm>
-            <a:off x="1050161" y="772732"/>
-            <a:ext cx="9188543" cy="5909849"/>
+            <a:off x="1154954" y="2603500"/>
+            <a:ext cx="8903446" cy="3526844"/>
           </a:xfrm>
         </p:spPr>
-      </p:pic>
+        <p:txBody>
+          <a:bodyPr>
+            <a:normAutofit/>
+          </a:bodyPr>
+          <a:lstStyle/>
+          <a:p>
+            <a:r>
+              <a:rPr lang="en-US" dirty="0" smtClean="0"/>
+              <a:t>Branching:</a:t>
+            </a:r>
+          </a:p>
+          <a:p>
+            <a:r>
+              <a:rPr lang="en-US" b="1" dirty="0" err="1" smtClean="0">
+                <a:solidFill>
+                  <a:srgbClr val="0070C0"/>
+                </a:solidFill>
+              </a:rPr>
+              <a:t>git</a:t>
+            </a:r>
+            <a:r>
+              <a:rPr lang="en-US" b="1" dirty="0" smtClean="0">
+                <a:solidFill>
+                  <a:srgbClr val="0070C0"/>
+                </a:solidFill>
+              </a:rPr>
+              <a:t> checkout &lt;branch name&gt;</a:t>
+            </a:r>
+          </a:p>
+          <a:p>
+            <a:pPr lvl="1"/>
+            <a:r>
+              <a:rPr lang="en-US" dirty="0" err="1" smtClean="0"/>
+              <a:t>git</a:t>
+            </a:r>
+            <a:r>
+              <a:rPr lang="en-US" dirty="0" smtClean="0"/>
+              <a:t> checkout lets you traverse between branches. When you switch branches, the code in your folders will change automatically. </a:t>
+            </a:r>
+          </a:p>
+          <a:p>
+            <a:pPr indent="-285750"/>
+            <a:r>
+              <a:rPr lang="en-US" b="1" dirty="0" err="1">
+                <a:solidFill>
+                  <a:srgbClr val="0070C0"/>
+                </a:solidFill>
+              </a:rPr>
+              <a:t>g</a:t>
+            </a:r>
+            <a:r>
+              <a:rPr lang="en-US" b="1" dirty="0" err="1" smtClean="0">
+                <a:solidFill>
+                  <a:srgbClr val="0070C0"/>
+                </a:solidFill>
+              </a:rPr>
+              <a:t>it</a:t>
+            </a:r>
+            <a:r>
+              <a:rPr lang="en-US" b="1" dirty="0" smtClean="0">
+                <a:solidFill>
+                  <a:srgbClr val="0070C0"/>
+                </a:solidFill>
+              </a:rPr>
+              <a:t> checkout –b &lt;branch name&gt;</a:t>
+            </a:r>
+          </a:p>
+          <a:p>
+            <a:pPr lvl="1"/>
+            <a:r>
+              <a:rPr lang="en-US" dirty="0" smtClean="0"/>
+              <a:t>This command lets you create a new branch on your machine. When you create the new branch, it will automatically jump to the new branch. </a:t>
+            </a:r>
+            <a:endParaRPr lang="en-US" dirty="0"/>
+          </a:p>
+          <a:p>
+            <a:r>
+              <a:rPr lang="en-US" b="1" dirty="0" err="1">
+                <a:solidFill>
+                  <a:srgbClr val="0070C0"/>
+                </a:solidFill>
+              </a:rPr>
+              <a:t>g</a:t>
+            </a:r>
+            <a:r>
+              <a:rPr lang="en-US" b="1" dirty="0" err="1" smtClean="0">
+                <a:solidFill>
+                  <a:srgbClr val="0070C0"/>
+                </a:solidFill>
+              </a:rPr>
+              <a:t>it</a:t>
+            </a:r>
+            <a:r>
+              <a:rPr lang="en-US" b="1" dirty="0" smtClean="0">
+                <a:solidFill>
+                  <a:srgbClr val="0070C0"/>
+                </a:solidFill>
+              </a:rPr>
+              <a:t> push –set-upstream origin &lt;branch name&gt;</a:t>
+            </a:r>
+          </a:p>
+          <a:p>
+            <a:pPr lvl="1"/>
+            <a:r>
+              <a:rPr lang="en-US" dirty="0" smtClean="0">
+                <a:solidFill>
+                  <a:schemeClr val="tx1"/>
+                </a:solidFill>
+              </a:rPr>
+              <a:t>When you create your branch, the remote repository doesn’t know about it. So we have to push the new branch to the remote repository.</a:t>
+            </a:r>
+            <a:endParaRPr lang="en-US" dirty="0">
+              <a:solidFill>
+                <a:schemeClr val="tx1"/>
+              </a:solidFill>
+            </a:endParaRPr>
+          </a:p>
+        </p:txBody>
+      </p:sp>
     </p:spTree>
     <p:extLst>
       <p:ext uri="{BB962C8B-B14F-4D97-AF65-F5344CB8AC3E}">
-        <p14:creationId xmlns:p14="http://schemas.microsoft.com/office/powerpoint/2010/main" val="1427423542"/>
+        <p14:creationId xmlns:p14="http://schemas.microsoft.com/office/powerpoint/2010/main" val="3947764904"/>
       </p:ext>
     </p:extLst>
   </p:cSld>
@@ -13908,7 +14101,7 @@
             </a:r>
             <a:r>
               <a:rPr lang="en-US" dirty="0" smtClean="0"/>
-              <a:t> commands</a:t>
+              <a:t> commands	</a:t>
             </a:r>
             <a:endParaRPr lang="en-US" dirty="0"/>
           </a:p>
@@ -13926,85 +14119,150 @@
         </p:nvSpPr>
         <p:spPr/>
         <p:txBody>
-          <a:bodyPr>
-            <a:normAutofit fontScale="92500" lnSpcReduction="20000"/>
-          </a:bodyPr>
+          <a:bodyPr/>
           <a:lstStyle/>
           <a:p>
             <a:r>
+              <a:rPr lang="en-US" b="1" dirty="0" err="1">
+                <a:solidFill>
+                  <a:srgbClr val="0070C0"/>
+                </a:solidFill>
+              </a:rPr>
+              <a:t>g</a:t>
+            </a:r>
+            <a:r>
+              <a:rPr lang="en-US" b="1" dirty="0" err="1" smtClean="0">
+                <a:solidFill>
+                  <a:srgbClr val="0070C0"/>
+                </a:solidFill>
+              </a:rPr>
+              <a:t>it</a:t>
+            </a:r>
+            <a:r>
+              <a:rPr lang="en-US" b="1" dirty="0" smtClean="0">
+                <a:solidFill>
+                  <a:srgbClr val="0070C0"/>
+                </a:solidFill>
+              </a:rPr>
+              <a:t> pull</a:t>
+            </a:r>
+          </a:p>
+          <a:p>
+            <a:pPr lvl="1"/>
+            <a:r>
               <a:rPr lang="en-US" dirty="0" smtClean="0"/>
-              <a:t>Add, commit and push are the basics commands of </a:t>
+              <a:t>Pull is more of a basic </a:t>
             </a:r>
             <a:r>
               <a:rPr lang="en-US" dirty="0" err="1" smtClean="0"/>
-              <a:t>Git</a:t>
-            </a:r>
-            <a:r>
-              <a:rPr lang="en-US" dirty="0"/>
-              <a:t> </a:t>
+              <a:t>git</a:t>
             </a:r>
             <a:r>
               <a:rPr lang="en-US" dirty="0" smtClean="0"/>
-              <a:t>and represent just the bare minimum needed to use </a:t>
-            </a:r>
-            <a:r>
-              <a:rPr lang="en-US" dirty="0" err="1" smtClean="0"/>
-              <a:t>Git</a:t>
+              <a:t> command, but isn’t required. Pull is the opposite idea of push, think pulling something down. Pull simply updates your local repository based on what's in the remote repository. So if your team-mate tells you that they just pushed an update, you’ll want to run </a:t>
+            </a:r>
+            <a:r>
+              <a:rPr lang="en-US" b="1" dirty="0" err="1" smtClean="0">
+                <a:solidFill>
+                  <a:srgbClr val="0070C0"/>
+                </a:solidFill>
+              </a:rPr>
+              <a:t>git</a:t>
+            </a:r>
+            <a:r>
+              <a:rPr lang="en-US" b="1" dirty="0" smtClean="0">
+                <a:solidFill>
+                  <a:srgbClr val="0070C0"/>
+                </a:solidFill>
+              </a:rPr>
+              <a:t> pull</a:t>
+            </a:r>
+            <a:r>
+              <a:rPr lang="en-US" dirty="0" smtClean="0"/>
+              <a:t>. </a:t>
+            </a:r>
+          </a:p>
+          <a:p>
+            <a:pPr lvl="1"/>
+            <a:r>
+              <a:rPr lang="en-US" dirty="0" smtClean="0"/>
+              <a:t>Merge conflicts are disagreements in content based on the line of code. If user A changes a particular line, and user B pushes up a change to the same line, user A will encounter a merge conflict when pulling the changes made by user B.</a:t>
+            </a:r>
+          </a:p>
+          <a:p>
+            <a:pPr lvl="1"/>
+            <a:r>
+              <a:rPr lang="en-US" dirty="0" smtClean="0"/>
+              <a:t>It is worth noting that </a:t>
+            </a:r>
+            <a:r>
+              <a:rPr lang="en-US" b="1" dirty="0" err="1" smtClean="0">
+                <a:solidFill>
+                  <a:srgbClr val="0070C0"/>
+                </a:solidFill>
+              </a:rPr>
+              <a:t>git</a:t>
+            </a:r>
+            <a:r>
+              <a:rPr lang="en-US" b="1" dirty="0" smtClean="0">
+                <a:solidFill>
+                  <a:srgbClr val="0070C0"/>
+                </a:solidFill>
+              </a:rPr>
+              <a:t> pull </a:t>
+            </a:r>
+            <a:r>
+              <a:rPr lang="en-US" dirty="0" smtClean="0"/>
+              <a:t>is actually 2 commands in 1. It does the work of both </a:t>
+            </a:r>
+            <a:r>
+              <a:rPr lang="en-US" b="1" dirty="0" err="1" smtClean="0">
+                <a:solidFill>
+                  <a:srgbClr val="0070C0"/>
+                </a:solidFill>
+              </a:rPr>
+              <a:t>git</a:t>
+            </a:r>
+            <a:r>
+              <a:rPr lang="en-US" b="1" dirty="0" smtClean="0">
+                <a:solidFill>
+                  <a:srgbClr val="0070C0"/>
+                </a:solidFill>
+              </a:rPr>
+              <a:t> fetch </a:t>
+            </a:r>
+            <a:r>
+              <a:rPr lang="en-US" dirty="0" smtClean="0"/>
+              <a:t>and </a:t>
+            </a:r>
+            <a:r>
+              <a:rPr lang="en-US" b="1" dirty="0" err="1" smtClean="0">
+                <a:solidFill>
+                  <a:srgbClr val="0070C0"/>
+                </a:solidFill>
+              </a:rPr>
+              <a:t>git</a:t>
+            </a:r>
+            <a:r>
+              <a:rPr lang="en-US" b="1" dirty="0" smtClean="0">
+                <a:solidFill>
+                  <a:srgbClr val="0070C0"/>
+                </a:solidFill>
+              </a:rPr>
+              <a:t> merge</a:t>
             </a:r>
             <a:r>
               <a:rPr lang="en-US" dirty="0" smtClean="0"/>
               <a:t>.</a:t>
             </a:r>
-          </a:p>
-          <a:p>
-            <a:r>
-              <a:rPr lang="en-US" dirty="0" smtClean="0"/>
-              <a:t>Branching</a:t>
-            </a:r>
-          </a:p>
-          <a:p>
-            <a:pPr lvl="1"/>
-            <a:r>
-              <a:rPr lang="en-US" dirty="0" smtClean="0"/>
-              <a:t>Code can be branched off, so that changes on one branch do not effect another branch. This is useful for adding new functionality or attempting to debug a major problem without destroying your current version of code</a:t>
-            </a:r>
-            <a:r>
-              <a:rPr lang="en-US" dirty="0" smtClean="0"/>
-              <a:t>.</a:t>
-            </a:r>
-          </a:p>
-          <a:p>
-            <a:r>
-              <a:rPr lang="en-US" dirty="0" smtClean="0"/>
-              <a:t>Merging</a:t>
-            </a:r>
-          </a:p>
-          <a:p>
-            <a:pPr lvl="1"/>
-            <a:r>
-              <a:rPr lang="en-US" dirty="0" smtClean="0"/>
-              <a:t>Merging is the act of rectifying the history of 2 separate branches. When 2 braches are merged, the code from one branch is added to the code of another. </a:t>
-            </a:r>
-          </a:p>
-          <a:p>
-            <a:r>
-              <a:rPr lang="en-US" dirty="0" smtClean="0"/>
-              <a:t>Cloning:</a:t>
-            </a:r>
-          </a:p>
-          <a:p>
-            <a:pPr lvl="1"/>
-            <a:r>
-              <a:rPr lang="en-US" dirty="0" smtClean="0"/>
-              <a:t>This is the act of pulling down an existing repository. This can be more easily done using the GitHub app.</a:t>
-            </a:r>
+            <a:endParaRPr lang="en-US" dirty="0"/>
           </a:p>
         </p:txBody>
       </p:sp>
     </p:spTree>
     <p:extLst>
       <p:ext uri="{BB962C8B-B14F-4D97-AF65-F5344CB8AC3E}">
-        <p14:creationId xmlns:p14="http://schemas.microsoft.com/office/powerpoint/2010/main" val="3877826343"/>
+        <p14:creationId xmlns:p14="http://schemas.microsoft.com/office/powerpoint/2010/main" val="3476203000"/>
       </p:ext>
     </p:extLst>
   </p:cSld>
@@ -14072,116 +14330,85 @@
             <p:ph idx="1"/>
           </p:nvPr>
         </p:nvSpPr>
-        <p:spPr>
-          <a:xfrm>
-            <a:off x="1154954" y="2603500"/>
-            <a:ext cx="8903446" cy="3526844"/>
-          </a:xfrm>
-        </p:spPr>
+        <p:spPr/>
         <p:txBody>
           <a:bodyPr>
-            <a:normAutofit/>
+            <a:normAutofit fontScale="92500"/>
           </a:bodyPr>
           <a:lstStyle/>
           <a:p>
             <a:r>
               <a:rPr lang="en-US" dirty="0" smtClean="0"/>
-              <a:t>Branching:</a:t>
-            </a:r>
-          </a:p>
-          <a:p>
+              <a:t>The act of merging 2 branches must be done carefully. Merge conflicts can easily occur.</a:t>
+            </a:r>
+          </a:p>
+          <a:p>
+            <a:r>
+              <a:rPr lang="en-US" b="1" dirty="0" err="1">
+                <a:solidFill>
+                  <a:srgbClr val="0070C0"/>
+                </a:solidFill>
+              </a:rPr>
+              <a:t>g</a:t>
+            </a:r>
+            <a:r>
+              <a:rPr lang="en-US" b="1" dirty="0" err="1" smtClean="0">
+                <a:solidFill>
+                  <a:srgbClr val="0070C0"/>
+                </a:solidFill>
+              </a:rPr>
+              <a:t>it</a:t>
+            </a:r>
+            <a:r>
+              <a:rPr lang="en-US" b="1" dirty="0" smtClean="0">
+                <a:solidFill>
+                  <a:srgbClr val="0070C0"/>
+                </a:solidFill>
+              </a:rPr>
+              <a:t> merge &lt;branch to merge in&gt;</a:t>
+            </a:r>
+          </a:p>
+          <a:p>
+            <a:pPr lvl="1"/>
+            <a:r>
+              <a:rPr lang="en-US" dirty="0" smtClean="0"/>
+              <a:t>When you are on a branch, you can merge in another branch by using </a:t>
+            </a:r>
             <a:r>
               <a:rPr lang="en-US" dirty="0" err="1" smtClean="0"/>
               <a:t>git</a:t>
             </a:r>
             <a:r>
               <a:rPr lang="en-US" dirty="0" smtClean="0"/>
-              <a:t> checkout &lt;branch name&gt;</a:t>
+              <a:t> merge. </a:t>
             </a:r>
           </a:p>
           <a:p>
             <a:pPr lvl="1"/>
             <a:r>
-              <a:rPr lang="en-US" dirty="0" err="1" smtClean="0"/>
-              <a:t>git</a:t>
-            </a:r>
-            <a:r>
               <a:rPr lang="en-US" dirty="0" smtClean="0"/>
-              <a:t> checkout lets you traverse between branches. When you switch branches, the code in your folders will change automatically. </a:t>
-            </a:r>
-          </a:p>
-          <a:p>
-            <a:pPr indent="-285750"/>
-            <a:r>
-              <a:rPr lang="en-US" dirty="0" err="1"/>
-              <a:t>g</a:t>
-            </a:r>
-            <a:r>
-              <a:rPr lang="en-US" dirty="0" err="1" smtClean="0"/>
-              <a:t>it</a:t>
-            </a:r>
+              <a:t>When merging it is best to merge the higher level branch into the lower level branch first before merging the lower level into the higher level branch. </a:t>
+            </a:r>
+          </a:p>
+          <a:p>
             <a:r>
               <a:rPr lang="en-US" dirty="0" smtClean="0"/>
-              <a:t> checkout –b &lt;branch name&gt;</a:t>
-            </a:r>
-          </a:p>
-          <a:p>
-            <a:pPr lvl="1"/>
-            <a:r>
-              <a:rPr lang="en-US" dirty="0" smtClean="0"/>
-              <a:t>This command lets you create a new branch on your machine. When you create the new branch, it will automatically jump to the new branch. </a:t>
+              <a:t>Pull Requests are formal merges. This can be done in the shell but is best done on GitHub. When working on a group project, it is best to pull request into master instead of merging. A Pull Request allows you to describe changes made in a branch to that they can be reviewed before the request is accepted and the branches merged.</a:t>
             </a:r>
             <a:endParaRPr lang="en-US" dirty="0"/>
           </a:p>
           <a:p>
-            <a:r>
-              <a:rPr lang="en-US" dirty="0" err="1"/>
-              <a:t>g</a:t>
-            </a:r>
-            <a:r>
-              <a:rPr lang="en-US" dirty="0" err="1" smtClean="0"/>
-              <a:t>it</a:t>
-            </a:r>
-            <a:r>
-              <a:rPr lang="en-US" dirty="0" smtClean="0"/>
-              <a:t> push –set-upstream origin &lt;branch </a:t>
-            </a:r>
-            <a:r>
-              <a:rPr lang="en-US" dirty="0" smtClean="0"/>
-              <a:t>name&gt;</a:t>
-            </a:r>
-            <a:endParaRPr lang="en-US" dirty="0" smtClean="0"/>
-          </a:p>
-          <a:p>
-            <a:pPr lvl="1"/>
-            <a:r>
-              <a:rPr lang="en-US" dirty="0" smtClean="0">
-                <a:solidFill>
-                  <a:schemeClr val="tx1"/>
-                </a:solidFill>
-              </a:rPr>
-              <a:t>When you create your branch, the remote repository doesn’t know about it. So we have to push the new branch to the remote </a:t>
-            </a:r>
-            <a:r>
-              <a:rPr lang="en-US" dirty="0" smtClean="0">
-                <a:solidFill>
-                  <a:schemeClr val="tx1"/>
-                </a:solidFill>
-              </a:rPr>
-              <a:t>repository.</a:t>
-            </a:r>
-            <a:endParaRPr lang="en-US" dirty="0">
-              <a:solidFill>
-                <a:schemeClr val="tx1"/>
-              </a:solidFill>
-            </a:endParaRPr>
+            <a:pPr marL="457200" lvl="1" indent="0">
+              <a:buNone/>
+            </a:pPr>
+            <a:endParaRPr lang="en-US" dirty="0"/>
           </a:p>
         </p:txBody>
       </p:sp>
     </p:spTree>
     <p:extLst>
       <p:ext uri="{BB962C8B-B14F-4D97-AF65-F5344CB8AC3E}">
-        <p14:creationId xmlns:p14="http://schemas.microsoft.com/office/powerpoint/2010/main" val="3947764904"/>
+        <p14:creationId xmlns:p14="http://schemas.microsoft.com/office/powerpoint/2010/main" val="4022598986"/>
       </p:ext>
     </p:extLst>
   </p:cSld>
@@ -14233,293 +14460,6 @@
             </a:r>
             <a:r>
               <a:rPr lang="en-US" dirty="0" smtClean="0"/>
-              <a:t> commands	</a:t>
-            </a:r>
-            <a:endParaRPr lang="en-US" dirty="0"/>
-          </a:p>
-        </p:txBody>
-      </p:sp>
-      <p:sp>
-        <p:nvSpPr>
-          <p:cNvPr id="3" name="Content Placeholder 2"/>
-          <p:cNvSpPr>
-            <a:spLocks noGrp="1"/>
-          </p:cNvSpPr>
-          <p:nvPr>
-            <p:ph idx="1"/>
-          </p:nvPr>
-        </p:nvSpPr>
-        <p:spPr/>
-        <p:txBody>
-          <a:bodyPr/>
-          <a:lstStyle/>
-          <a:p>
-            <a:r>
-              <a:rPr lang="en-US" dirty="0" err="1"/>
-              <a:t>g</a:t>
-            </a:r>
-            <a:r>
-              <a:rPr lang="en-US" dirty="0" err="1" smtClean="0"/>
-              <a:t>it</a:t>
-            </a:r>
-            <a:r>
-              <a:rPr lang="en-US" dirty="0" smtClean="0"/>
-              <a:t> pull</a:t>
-            </a:r>
-          </a:p>
-          <a:p>
-            <a:pPr lvl="1"/>
-            <a:r>
-              <a:rPr lang="en-US" dirty="0" smtClean="0"/>
-              <a:t>Pull is more of a basic </a:t>
-            </a:r>
-            <a:r>
-              <a:rPr lang="en-US" dirty="0" err="1" smtClean="0"/>
-              <a:t>git</a:t>
-            </a:r>
-            <a:r>
-              <a:rPr lang="en-US" dirty="0" smtClean="0"/>
-              <a:t> command, but isn’t required. Pull is the opposite idea of push, think pulling something down. Pull simply updates your local repository based on what's in the remote repository. So if your team-mate tells you that they just pushed an update, you’ll want to run </a:t>
-            </a:r>
-            <a:r>
-              <a:rPr lang="en-US" dirty="0" err="1" smtClean="0"/>
-              <a:t>git</a:t>
-            </a:r>
-            <a:r>
-              <a:rPr lang="en-US" dirty="0" smtClean="0"/>
-              <a:t> pull. </a:t>
-            </a:r>
-          </a:p>
-          <a:p>
-            <a:pPr lvl="1"/>
-            <a:r>
-              <a:rPr lang="en-US" dirty="0" smtClean="0"/>
-              <a:t>Merge conflicts are disagreements in content based on the line of code. If user A changes a particular line, and user B pushes up a change to the same line, user A will encounter a merge conflict when pulling the changes made by user B.</a:t>
-            </a:r>
-          </a:p>
-          <a:p>
-            <a:pPr lvl="1"/>
-            <a:r>
-              <a:rPr lang="en-US" dirty="0" smtClean="0"/>
-              <a:t>It is worth noting that </a:t>
-            </a:r>
-            <a:r>
-              <a:rPr lang="en-US" dirty="0" err="1" smtClean="0"/>
-              <a:t>git</a:t>
-            </a:r>
-            <a:r>
-              <a:rPr lang="en-US" dirty="0" smtClean="0"/>
-              <a:t> pull is actually 2 commands in 1. It does the work of both </a:t>
-            </a:r>
-            <a:r>
-              <a:rPr lang="en-US" dirty="0" err="1" smtClean="0"/>
-              <a:t>git</a:t>
-            </a:r>
-            <a:r>
-              <a:rPr lang="en-US" dirty="0" smtClean="0"/>
-              <a:t> fetch and </a:t>
-            </a:r>
-            <a:r>
-              <a:rPr lang="en-US" dirty="0" err="1" smtClean="0"/>
-              <a:t>git</a:t>
-            </a:r>
-            <a:r>
-              <a:rPr lang="en-US" dirty="0" smtClean="0"/>
-              <a:t> merge.</a:t>
-            </a:r>
-            <a:endParaRPr lang="en-US" dirty="0"/>
-          </a:p>
-        </p:txBody>
-      </p:sp>
-    </p:spTree>
-    <p:extLst>
-      <p:ext uri="{BB962C8B-B14F-4D97-AF65-F5344CB8AC3E}">
-        <p14:creationId xmlns:p14="http://schemas.microsoft.com/office/powerpoint/2010/main" val="3476203000"/>
-      </p:ext>
-    </p:extLst>
-  </p:cSld>
-  <p:clrMapOvr>
-    <a:masterClrMapping/>
-  </p:clrMapOvr>
-</p:sld>
-</file>
-
-<file path=ppt/slides/slide18.xml><?xml version="1.0" encoding="utf-8"?>
-<p:sld xmlns:a="http://schemas.openxmlformats.org/drawingml/2006/main" xmlns:r="http://schemas.openxmlformats.org/officeDocument/2006/relationships" xmlns:p="http://schemas.openxmlformats.org/presentationml/2006/main">
-  <p:cSld>
-    <p:spTree>
-      <p:nvGrpSpPr>
-        <p:cNvPr id="1" name=""/>
-        <p:cNvGrpSpPr/>
-        <p:nvPr/>
-      </p:nvGrpSpPr>
-      <p:grpSpPr>
-        <a:xfrm>
-          <a:off x="0" y="0"/>
-          <a:ext cx="0" cy="0"/>
-          <a:chOff x="0" y="0"/>
-          <a:chExt cx="0" cy="0"/>
-        </a:xfrm>
-      </p:grpSpPr>
-      <p:sp>
-        <p:nvSpPr>
-          <p:cNvPr id="2" name="Title 1"/>
-          <p:cNvSpPr>
-            <a:spLocks noGrp="1"/>
-          </p:cNvSpPr>
-          <p:nvPr>
-            <p:ph type="title"/>
-          </p:nvPr>
-        </p:nvSpPr>
-        <p:spPr/>
-        <p:txBody>
-          <a:bodyPr/>
-          <a:lstStyle/>
-          <a:p>
-            <a:r>
-              <a:rPr lang="en-US" dirty="0" smtClean="0"/>
-              <a:t>Intermediate </a:t>
-            </a:r>
-            <a:r>
-              <a:rPr lang="en-US" dirty="0" err="1" smtClean="0"/>
-              <a:t>Git</a:t>
-            </a:r>
-            <a:r>
-              <a:rPr lang="en-US" dirty="0" smtClean="0"/>
-              <a:t> commands</a:t>
-            </a:r>
-            <a:endParaRPr lang="en-US" dirty="0"/>
-          </a:p>
-        </p:txBody>
-      </p:sp>
-      <p:sp>
-        <p:nvSpPr>
-          <p:cNvPr id="3" name="Content Placeholder 2"/>
-          <p:cNvSpPr>
-            <a:spLocks noGrp="1"/>
-          </p:cNvSpPr>
-          <p:nvPr>
-            <p:ph idx="1"/>
-          </p:nvPr>
-        </p:nvSpPr>
-        <p:spPr/>
-        <p:txBody>
-          <a:bodyPr>
-            <a:normAutofit fontScale="92500"/>
-          </a:bodyPr>
-          <a:lstStyle/>
-          <a:p>
-            <a:r>
-              <a:rPr lang="en-US" dirty="0" smtClean="0"/>
-              <a:t>The act of merging 2 branches must be done carefully. Merge conflicts can easily occur.</a:t>
-            </a:r>
-          </a:p>
-          <a:p>
-            <a:r>
-              <a:rPr lang="en-US" dirty="0" err="1"/>
-              <a:t>g</a:t>
-            </a:r>
-            <a:r>
-              <a:rPr lang="en-US" dirty="0" err="1" smtClean="0"/>
-              <a:t>it</a:t>
-            </a:r>
-            <a:r>
-              <a:rPr lang="en-US" dirty="0" smtClean="0"/>
-              <a:t> merge &lt;branch to merge in&gt;</a:t>
-            </a:r>
-          </a:p>
-          <a:p>
-            <a:pPr lvl="1"/>
-            <a:r>
-              <a:rPr lang="en-US" dirty="0" smtClean="0"/>
-              <a:t>When you are on a branch, you can merge in another branch by using </a:t>
-            </a:r>
-            <a:r>
-              <a:rPr lang="en-US" dirty="0" err="1" smtClean="0"/>
-              <a:t>git</a:t>
-            </a:r>
-            <a:r>
-              <a:rPr lang="en-US" dirty="0" smtClean="0"/>
-              <a:t> merge. </a:t>
-            </a:r>
-          </a:p>
-          <a:p>
-            <a:pPr lvl="1"/>
-            <a:r>
-              <a:rPr lang="en-US" dirty="0" smtClean="0"/>
-              <a:t>When merging it is best to merge the higher level branch into the lower level branch first before merging the lower level into the higher level branch. </a:t>
-            </a:r>
-          </a:p>
-          <a:p>
-            <a:r>
-              <a:rPr lang="en-US" dirty="0" smtClean="0"/>
-              <a:t>Pull Requests are formal merges. This can be done in the shell but is best done on GitHub. When working on a group project, it is best to pull request into master instead of merging. A Pull Request allows you to describe changes made in a branch to that they can be reviewed before the request is accepted and the branches merged.</a:t>
-            </a:r>
-            <a:endParaRPr lang="en-US" dirty="0"/>
-          </a:p>
-          <a:p>
-            <a:pPr marL="457200" lvl="1" indent="0">
-              <a:buNone/>
-            </a:pPr>
-            <a:endParaRPr lang="en-US" dirty="0"/>
-          </a:p>
-        </p:txBody>
-      </p:sp>
-    </p:spTree>
-    <p:extLst>
-      <p:ext uri="{BB962C8B-B14F-4D97-AF65-F5344CB8AC3E}">
-        <p14:creationId xmlns:p14="http://schemas.microsoft.com/office/powerpoint/2010/main" val="4022598986"/>
-      </p:ext>
-    </p:extLst>
-  </p:cSld>
-  <p:clrMapOvr>
-    <a:masterClrMapping/>
-  </p:clrMapOvr>
-</p:sld>
-</file>
-
-<file path=ppt/slides/slide19.xml><?xml version="1.0" encoding="utf-8"?>
-<p:sld xmlns:a="http://schemas.openxmlformats.org/drawingml/2006/main" xmlns:r="http://schemas.openxmlformats.org/officeDocument/2006/relationships" xmlns:p="http://schemas.openxmlformats.org/presentationml/2006/main">
-  <p:cSld>
-    <p:spTree>
-      <p:nvGrpSpPr>
-        <p:cNvPr id="1" name=""/>
-        <p:cNvGrpSpPr/>
-        <p:nvPr/>
-      </p:nvGrpSpPr>
-      <p:grpSpPr>
-        <a:xfrm>
-          <a:off x="0" y="0"/>
-          <a:ext cx="0" cy="0"/>
-          <a:chOff x="0" y="0"/>
-          <a:chExt cx="0" cy="0"/>
-        </a:xfrm>
-      </p:grpSpPr>
-      <p:sp>
-        <p:nvSpPr>
-          <p:cNvPr id="2" name="Title 1"/>
-          <p:cNvSpPr>
-            <a:spLocks noGrp="1"/>
-          </p:cNvSpPr>
-          <p:nvPr>
-            <p:ph type="title"/>
-          </p:nvPr>
-        </p:nvSpPr>
-        <p:spPr/>
-        <p:txBody>
-          <a:bodyPr/>
-          <a:lstStyle/>
-          <a:p>
-            <a:r>
-              <a:rPr lang="en-US" dirty="0" smtClean="0"/>
-              <a:t>Intermediate </a:t>
-            </a:r>
-            <a:r>
-              <a:rPr lang="en-US" dirty="0" err="1" smtClean="0"/>
-              <a:t>Git</a:t>
-            </a:r>
-            <a:r>
-              <a:rPr lang="en-US" dirty="0" smtClean="0"/>
               <a:t> commands</a:t>
             </a:r>
             <a:endParaRPr lang="en-US" dirty="0"/>
@@ -14557,15 +14497,27 @@
           </a:p>
           <a:p>
             <a:r>
-              <a:rPr lang="en-US" dirty="0" err="1"/>
+              <a:rPr lang="en-US" b="1" dirty="0" err="1">
+                <a:solidFill>
+                  <a:srgbClr val="0070C0"/>
+                </a:solidFill>
+              </a:rPr>
               <a:t>g</a:t>
             </a:r>
             <a:r>
-              <a:rPr lang="en-US" dirty="0" err="1" smtClean="0"/>
+              <a:rPr lang="en-US" b="1" dirty="0" err="1" smtClean="0">
+                <a:solidFill>
+                  <a:srgbClr val="0070C0"/>
+                </a:solidFill>
+              </a:rPr>
               <a:t>it</a:t>
             </a:r>
             <a:r>
-              <a:rPr lang="en-US" dirty="0" smtClean="0"/>
+              <a:rPr lang="en-US" b="1" dirty="0" smtClean="0">
+                <a:solidFill>
+                  <a:srgbClr val="0070C0"/>
+                </a:solidFill>
+              </a:rPr>
               <a:t> push origin –delete &lt;branch name&gt;</a:t>
             </a:r>
           </a:p>
@@ -14578,15 +14530,27 @@
           </a:p>
           <a:p>
             <a:r>
-              <a:rPr lang="en-US" dirty="0" err="1"/>
+              <a:rPr lang="en-US" b="1" dirty="0" err="1">
+                <a:solidFill>
+                  <a:srgbClr val="0070C0"/>
+                </a:solidFill>
+              </a:rPr>
               <a:t>g</a:t>
             </a:r>
             <a:r>
-              <a:rPr lang="en-US" dirty="0" err="1" smtClean="0"/>
+              <a:rPr lang="en-US" b="1" dirty="0" err="1" smtClean="0">
+                <a:solidFill>
+                  <a:srgbClr val="0070C0"/>
+                </a:solidFill>
+              </a:rPr>
               <a:t>it</a:t>
             </a:r>
             <a:r>
-              <a:rPr lang="en-US" dirty="0" smtClean="0"/>
+              <a:rPr lang="en-US" b="1" dirty="0" smtClean="0">
+                <a:solidFill>
+                  <a:srgbClr val="0070C0"/>
+                </a:solidFill>
+              </a:rPr>
               <a:t> branch –d &lt;branch name&gt;</a:t>
             </a:r>
           </a:p>
@@ -14607,11 +14571,19 @@
           </a:p>
           <a:p>
             <a:r>
-              <a:rPr lang="en-US" dirty="0" err="1" smtClean="0"/>
+              <a:rPr lang="en-US" b="1" dirty="0" err="1" smtClean="0">
+                <a:solidFill>
+                  <a:srgbClr val="0070C0"/>
+                </a:solidFill>
+              </a:rPr>
               <a:t>git</a:t>
             </a:r>
             <a:r>
-              <a:rPr lang="en-US" dirty="0" smtClean="0"/>
+              <a:rPr lang="en-US" b="1" dirty="0" smtClean="0">
+                <a:solidFill>
+                  <a:srgbClr val="0070C0"/>
+                </a:solidFill>
+              </a:rPr>
               <a:t> branch –D &lt;branch name&gt;</a:t>
             </a:r>
           </a:p>
@@ -14648,142 +14620,7 @@
 </p:sld>
 </file>
 
-<file path=ppt/slides/slide2.xml><?xml version="1.0" encoding="utf-8"?>
-<p:sld xmlns:a="http://schemas.openxmlformats.org/drawingml/2006/main" xmlns:r="http://schemas.openxmlformats.org/officeDocument/2006/relationships" xmlns:p="http://schemas.openxmlformats.org/presentationml/2006/main">
-  <p:cSld>
-    <p:spTree>
-      <p:nvGrpSpPr>
-        <p:cNvPr id="1" name=""/>
-        <p:cNvGrpSpPr/>
-        <p:nvPr/>
-      </p:nvGrpSpPr>
-      <p:grpSpPr>
-        <a:xfrm>
-          <a:off x="0" y="0"/>
-          <a:ext cx="0" cy="0"/>
-          <a:chOff x="0" y="0"/>
-          <a:chExt cx="0" cy="0"/>
-        </a:xfrm>
-      </p:grpSpPr>
-      <p:sp>
-        <p:nvSpPr>
-          <p:cNvPr id="2" name="Title 1"/>
-          <p:cNvSpPr>
-            <a:spLocks noGrp="1"/>
-          </p:cNvSpPr>
-          <p:nvPr>
-            <p:ph type="title"/>
-          </p:nvPr>
-        </p:nvSpPr>
-        <p:spPr/>
-        <p:txBody>
-          <a:bodyPr/>
-          <a:lstStyle/>
-          <a:p>
-            <a:r>
-              <a:rPr lang="en-US" dirty="0" smtClean="0"/>
-              <a:t>Overview</a:t>
-            </a:r>
-            <a:endParaRPr lang="en-US" dirty="0"/>
-          </a:p>
-        </p:txBody>
-      </p:sp>
-      <p:sp>
-        <p:nvSpPr>
-          <p:cNvPr id="3" name="Content Placeholder 2"/>
-          <p:cNvSpPr>
-            <a:spLocks noGrp="1"/>
-          </p:cNvSpPr>
-          <p:nvPr>
-            <p:ph idx="1"/>
-          </p:nvPr>
-        </p:nvSpPr>
-        <p:spPr/>
-        <p:txBody>
-          <a:bodyPr/>
-          <a:lstStyle/>
-          <a:p>
-            <a:r>
-              <a:rPr lang="en-US" dirty="0" smtClean="0"/>
-              <a:t>Brief overview and history of </a:t>
-            </a:r>
-            <a:r>
-              <a:rPr lang="en-US" dirty="0" err="1"/>
-              <a:t>G</a:t>
-            </a:r>
-            <a:r>
-              <a:rPr lang="en-US" dirty="0" err="1" smtClean="0"/>
-              <a:t>it</a:t>
-            </a:r>
-            <a:endParaRPr lang="en-US" dirty="0" smtClean="0"/>
-          </a:p>
-          <a:p>
-            <a:r>
-              <a:rPr lang="en-US" dirty="0" smtClean="0"/>
-              <a:t>Intro to problems solved by source control</a:t>
-            </a:r>
-          </a:p>
-          <a:p>
-            <a:r>
-              <a:rPr lang="en-US" dirty="0" smtClean="0"/>
-              <a:t>Basic </a:t>
-            </a:r>
-            <a:r>
-              <a:rPr lang="en-US" dirty="0" err="1"/>
-              <a:t>G</a:t>
-            </a:r>
-            <a:r>
-              <a:rPr lang="en-US" dirty="0" err="1" smtClean="0"/>
-              <a:t>it</a:t>
-            </a:r>
-            <a:r>
-              <a:rPr lang="en-US" dirty="0" smtClean="0"/>
-              <a:t> commands and workflow (add, commit, and push)</a:t>
-            </a:r>
-          </a:p>
-          <a:p>
-            <a:r>
-              <a:rPr lang="en-US" dirty="0" smtClean="0"/>
-              <a:t>Overview of expanded ideas (clone, merging and conflicts, branching)</a:t>
-            </a:r>
-          </a:p>
-          <a:p>
-            <a:r>
-              <a:rPr lang="en-US" dirty="0" smtClean="0"/>
-              <a:t>Practical examples</a:t>
-            </a:r>
-          </a:p>
-          <a:p>
-            <a:r>
-              <a:rPr lang="en-US" dirty="0" smtClean="0"/>
-              <a:t>Setup of GitHub app</a:t>
-            </a:r>
-          </a:p>
-          <a:p>
-            <a:r>
-              <a:rPr lang="en-US" dirty="0" smtClean="0"/>
-              <a:t>Hands on experience</a:t>
-            </a:r>
-          </a:p>
-          <a:p>
-            <a:endParaRPr lang="en-US" dirty="0"/>
-          </a:p>
-        </p:txBody>
-      </p:sp>
-    </p:spTree>
-    <p:extLst>
-      <p:ext uri="{BB962C8B-B14F-4D97-AF65-F5344CB8AC3E}">
-        <p14:creationId xmlns:p14="http://schemas.microsoft.com/office/powerpoint/2010/main" val="1450765654"/>
-      </p:ext>
-    </p:extLst>
-  </p:cSld>
-  <p:clrMapOvr>
-    <a:masterClrMapping/>
-  </p:clrMapOvr>
-</p:sld>
-</file>
-
-<file path=ppt/slides/slide20.xml><?xml version="1.0" encoding="utf-8"?>
+<file path=ppt/slides/slide18.xml><?xml version="1.0" encoding="utf-8"?>
 <p:sld xmlns:a="http://schemas.openxmlformats.org/drawingml/2006/main" xmlns:r="http://schemas.openxmlformats.org/officeDocument/2006/relationships" xmlns:p="http://schemas.openxmlformats.org/presentationml/2006/main">
   <p:cSld>
     <p:spTree>
@@ -14884,11 +14721,7 @@
           <a:p>
             <a:r>
               <a:rPr lang="en-US" dirty="0" smtClean="0"/>
-              <a:t>These two images demonstrate that the content of your files physically changes when you switch branches</a:t>
-            </a:r>
-            <a:r>
-              <a:rPr lang="en-US" dirty="0" smtClean="0"/>
-              <a:t>. On the left you can see the folder where the project is housed.</a:t>
+              <a:t>These two images demonstrate that the content of your files physically changes when you switch branches. On the left you can see the folder where the project is housed.</a:t>
             </a:r>
             <a:endParaRPr lang="en-US" dirty="0"/>
           </a:p>
@@ -14907,7 +14740,7 @@
 </p:sld>
 </file>
 
-<file path=ppt/slides/slide21.xml><?xml version="1.0" encoding="utf-8"?>
+<file path=ppt/slides/slide19.xml><?xml version="1.0" encoding="utf-8"?>
 <p:sld xmlns:a="http://schemas.openxmlformats.org/drawingml/2006/main" xmlns:r="http://schemas.openxmlformats.org/officeDocument/2006/relationships" xmlns:p="http://schemas.openxmlformats.org/presentationml/2006/main">
   <p:cSld>
     <p:spTree>
@@ -15014,7 +14847,146 @@
 </p:sld>
 </file>
 
-<file path=ppt/slides/slide22.xml><?xml version="1.0" encoding="utf-8"?>
+<file path=ppt/slides/slide2.xml><?xml version="1.0" encoding="utf-8"?>
+<p:sld xmlns:a="http://schemas.openxmlformats.org/drawingml/2006/main" xmlns:r="http://schemas.openxmlformats.org/officeDocument/2006/relationships" xmlns:p="http://schemas.openxmlformats.org/presentationml/2006/main">
+  <p:cSld>
+    <p:spTree>
+      <p:nvGrpSpPr>
+        <p:cNvPr id="1" name=""/>
+        <p:cNvGrpSpPr/>
+        <p:nvPr/>
+      </p:nvGrpSpPr>
+      <p:grpSpPr>
+        <a:xfrm>
+          <a:off x="0" y="0"/>
+          <a:ext cx="0" cy="0"/>
+          <a:chOff x="0" y="0"/>
+          <a:chExt cx="0" cy="0"/>
+        </a:xfrm>
+      </p:grpSpPr>
+      <p:sp>
+        <p:nvSpPr>
+          <p:cNvPr id="2" name="Title 1"/>
+          <p:cNvSpPr>
+            <a:spLocks noGrp="1"/>
+          </p:cNvSpPr>
+          <p:nvPr>
+            <p:ph type="title"/>
+          </p:nvPr>
+        </p:nvSpPr>
+        <p:spPr/>
+        <p:txBody>
+          <a:bodyPr/>
+          <a:lstStyle/>
+          <a:p>
+            <a:r>
+              <a:rPr lang="en-US" dirty="0" smtClean="0"/>
+              <a:t>Overview</a:t>
+            </a:r>
+            <a:endParaRPr lang="en-US" dirty="0"/>
+          </a:p>
+        </p:txBody>
+      </p:sp>
+      <p:sp>
+        <p:nvSpPr>
+          <p:cNvPr id="3" name="Content Placeholder 2"/>
+          <p:cNvSpPr>
+            <a:spLocks noGrp="1"/>
+          </p:cNvSpPr>
+          <p:nvPr>
+            <p:ph idx="1"/>
+          </p:nvPr>
+        </p:nvSpPr>
+        <p:spPr/>
+        <p:txBody>
+          <a:bodyPr/>
+          <a:lstStyle/>
+          <a:p>
+            <a:r>
+              <a:rPr lang="en-US" dirty="0" smtClean="0"/>
+              <a:t>Intro to problems solved by source control</a:t>
+            </a:r>
+          </a:p>
+          <a:p>
+            <a:r>
+              <a:rPr lang="en-US" dirty="0" smtClean="0"/>
+              <a:t>Brief </a:t>
+            </a:r>
+            <a:r>
+              <a:rPr lang="en-US" dirty="0" smtClean="0"/>
+              <a:t>overview and history of </a:t>
+            </a:r>
+            <a:r>
+              <a:rPr lang="en-US" dirty="0" err="1"/>
+              <a:t>G</a:t>
+            </a:r>
+            <a:r>
+              <a:rPr lang="en-US" dirty="0" err="1" smtClean="0"/>
+              <a:t>it</a:t>
+            </a:r>
+            <a:endParaRPr lang="en-US" dirty="0" smtClean="0"/>
+          </a:p>
+          <a:p>
+            <a:r>
+              <a:rPr lang="en-US" dirty="0" smtClean="0"/>
+              <a:t>Basic </a:t>
+            </a:r>
+            <a:r>
+              <a:rPr lang="en-US" dirty="0" err="1"/>
+              <a:t>G</a:t>
+            </a:r>
+            <a:r>
+              <a:rPr lang="en-US" dirty="0" err="1" smtClean="0"/>
+              <a:t>it</a:t>
+            </a:r>
+            <a:r>
+              <a:rPr lang="en-US" dirty="0" smtClean="0"/>
+              <a:t> commands and workflow (add, commit, and push)</a:t>
+            </a:r>
+          </a:p>
+          <a:p>
+            <a:r>
+              <a:rPr lang="en-US" dirty="0" smtClean="0"/>
+              <a:t>Overview of expanded ideas (clone, merging and conflicts, branching)</a:t>
+            </a:r>
+          </a:p>
+          <a:p>
+            <a:r>
+              <a:rPr lang="en-US" dirty="0" smtClean="0"/>
+              <a:t>Practical examples</a:t>
+            </a:r>
+          </a:p>
+          <a:p>
+            <a:r>
+              <a:rPr lang="en-US" dirty="0" smtClean="0"/>
+              <a:t>Setup of GitHub app</a:t>
+            </a:r>
+          </a:p>
+          <a:p>
+            <a:r>
+              <a:rPr lang="en-US" dirty="0" smtClean="0"/>
+              <a:t>Hands on experience</a:t>
+            </a:r>
+          </a:p>
+          <a:p>
+            <a:endParaRPr lang="en-US" dirty="0"/>
+          </a:p>
+        </p:txBody>
+      </p:sp>
+    </p:spTree>
+    <p:extLst>
+      <p:ext uri="{BB962C8B-B14F-4D97-AF65-F5344CB8AC3E}">
+        <p14:creationId xmlns:p14="http://schemas.microsoft.com/office/powerpoint/2010/main" val="1450765654"/>
+      </p:ext>
+    </p:extLst>
+  </p:cSld>
+  <p:clrMapOvr>
+    <a:masterClrMapping/>
+  </p:clrMapOvr>
+</p:sld>
+</file>
+
+<file path=ppt/slides/slide20.xml><?xml version="1.0" encoding="utf-8"?>
 <p:sld xmlns:a="http://schemas.openxmlformats.org/drawingml/2006/main" xmlns:r="http://schemas.openxmlformats.org/officeDocument/2006/relationships" xmlns:p="http://schemas.openxmlformats.org/presentationml/2006/main">
   <p:cSld>
     <p:spTree>
@@ -15088,12 +15060,24 @@
               <a:t>Once I merged my branch into master, I no longer needed the branch. I wanted to delete the branch, but first I felt it was important to push my merge first. Since the repository didn’t know about the local merge, I had to use </a:t>
             </a:r>
             <a:r>
-              <a:rPr lang="en-US" dirty="0" err="1" smtClean="0"/>
+              <a:rPr lang="en-US" b="1" dirty="0" err="1" smtClean="0">
+                <a:solidFill>
+                  <a:srgbClr val="0070C0"/>
+                </a:solidFill>
+              </a:rPr>
               <a:t>git</a:t>
             </a:r>
             <a:r>
+              <a:rPr lang="en-US" b="1" dirty="0" smtClean="0">
+                <a:solidFill>
+                  <a:srgbClr val="0070C0"/>
+                </a:solidFill>
+              </a:rPr>
+              <a:t> push</a:t>
+            </a:r>
+            <a:r>
               <a:rPr lang="en-US" dirty="0" smtClean="0"/>
-              <a:t> push.</a:t>
+              <a:t>.</a:t>
             </a:r>
           </a:p>
           <a:p>
@@ -15102,24 +15086,48 @@
           <a:p>
             <a:r>
               <a:rPr lang="en-US" dirty="0" smtClean="0"/>
-              <a:t>With the merger pushed up I felt better about deleting my remote branch. So I used</a:t>
-            </a:r>
-          </a:p>
-          <a:p>
-            <a:r>
-              <a:rPr lang="en-US" dirty="0" err="1"/>
+              <a:t>With the merger pushed up I </a:t>
+            </a:r>
+            <a:r>
+              <a:rPr lang="en-US" dirty="0" smtClean="0"/>
+              <a:t>was ready to delete my </a:t>
+            </a:r>
+            <a:r>
+              <a:rPr lang="en-US" dirty="0" smtClean="0"/>
+              <a:t>remote branch. So I used</a:t>
+            </a:r>
+          </a:p>
+          <a:p>
+            <a:r>
+              <a:rPr lang="en-US" b="1" dirty="0" err="1">
+                <a:solidFill>
+                  <a:srgbClr val="0070C0"/>
+                </a:solidFill>
+              </a:rPr>
               <a:t>g</a:t>
             </a:r>
             <a:r>
-              <a:rPr lang="en-US" dirty="0" err="1" smtClean="0"/>
+              <a:rPr lang="en-US" b="1" dirty="0" err="1" smtClean="0">
+                <a:solidFill>
+                  <a:srgbClr val="0070C0"/>
+                </a:solidFill>
+              </a:rPr>
               <a:t>it</a:t>
             </a:r>
             <a:r>
-              <a:rPr lang="en-US" dirty="0" smtClean="0"/>
+              <a:rPr lang="en-US" b="1" dirty="0" smtClean="0">
+                <a:solidFill>
+                  <a:srgbClr val="0070C0"/>
+                </a:solidFill>
+              </a:rPr>
               <a:t> push origin –delete </a:t>
             </a:r>
             <a:r>
-              <a:rPr lang="en-US" dirty="0" err="1" smtClean="0"/>
+              <a:rPr lang="en-US" b="1" dirty="0" err="1" smtClean="0">
+                <a:solidFill>
+                  <a:srgbClr val="0070C0"/>
+                </a:solidFill>
+              </a:rPr>
               <a:t>avl-rbt</a:t>
             </a:r>
             <a:r>
@@ -15133,6 +15141,254 @@
     <p:extLst>
       <p:ext uri="{BB962C8B-B14F-4D97-AF65-F5344CB8AC3E}">
         <p14:creationId xmlns:p14="http://schemas.microsoft.com/office/powerpoint/2010/main" val="1245217097"/>
+      </p:ext>
+    </p:extLst>
+  </p:cSld>
+  <p:clrMapOvr>
+    <a:masterClrMapping/>
+  </p:clrMapOvr>
+</p:sld>
+</file>
+
+<file path=ppt/slides/slide21.xml><?xml version="1.0" encoding="utf-8"?>
+<p:sld xmlns:a="http://schemas.openxmlformats.org/drawingml/2006/main" xmlns:r="http://schemas.openxmlformats.org/officeDocument/2006/relationships" xmlns:p="http://schemas.openxmlformats.org/presentationml/2006/main">
+  <p:cSld>
+    <p:spTree>
+      <p:nvGrpSpPr>
+        <p:cNvPr id="1" name=""/>
+        <p:cNvGrpSpPr/>
+        <p:nvPr/>
+      </p:nvGrpSpPr>
+      <p:grpSpPr>
+        <a:xfrm>
+          <a:off x="0" y="0"/>
+          <a:ext cx="0" cy="0"/>
+          <a:chOff x="0" y="0"/>
+          <a:chExt cx="0" cy="0"/>
+        </a:xfrm>
+      </p:grpSpPr>
+      <p:sp>
+        <p:nvSpPr>
+          <p:cNvPr id="2" name="Title 1"/>
+          <p:cNvSpPr>
+            <a:spLocks noGrp="1"/>
+          </p:cNvSpPr>
+          <p:nvPr>
+            <p:ph type="title"/>
+          </p:nvPr>
+        </p:nvSpPr>
+        <p:spPr/>
+        <p:txBody>
+          <a:bodyPr/>
+          <a:lstStyle/>
+          <a:p>
+            <a:r>
+              <a:rPr lang="en-US" dirty="0" smtClean="0"/>
+              <a:t>GitHub setup</a:t>
+            </a:r>
+            <a:endParaRPr lang="en-US" dirty="0"/>
+          </a:p>
+        </p:txBody>
+      </p:sp>
+      <p:sp>
+        <p:nvSpPr>
+          <p:cNvPr id="3" name="Content Placeholder 2"/>
+          <p:cNvSpPr>
+            <a:spLocks noGrp="1"/>
+          </p:cNvSpPr>
+          <p:nvPr>
+            <p:ph idx="1"/>
+          </p:nvPr>
+        </p:nvSpPr>
+        <p:spPr/>
+        <p:txBody>
+          <a:bodyPr/>
+          <a:lstStyle/>
+          <a:p>
+            <a:r>
+              <a:rPr lang="en-US" dirty="0" smtClean="0"/>
+              <a:t>Sign up for a GitHub account:</a:t>
+            </a:r>
+          </a:p>
+          <a:p>
+            <a:pPr lvl="1"/>
+            <a:r>
+              <a:rPr lang="en-US" dirty="0"/>
+              <a:t>https://</a:t>
+            </a:r>
+            <a:r>
+              <a:rPr lang="en-US" dirty="0" smtClean="0"/>
+              <a:t>github.com</a:t>
+            </a:r>
+          </a:p>
+          <a:p>
+            <a:pPr lvl="1"/>
+            <a:r>
+              <a:rPr lang="en-US" dirty="0" smtClean="0"/>
+              <a:t>Use any email address to sign up.</a:t>
+            </a:r>
+          </a:p>
+          <a:p>
+            <a:r>
+              <a:rPr lang="en-US" dirty="0" smtClean="0"/>
+              <a:t>GitHub participates in the student developer pack. As a student, GitHub will give you several free repositories. </a:t>
+            </a:r>
+          </a:p>
+          <a:p>
+            <a:r>
+              <a:rPr lang="en-US" dirty="0" smtClean="0"/>
+              <a:t>You can add your Toledo email address to your profile on GitHub.</a:t>
+            </a:r>
+          </a:p>
+          <a:p>
+            <a:r>
+              <a:rPr lang="en-US" dirty="0"/>
+              <a:t>https://</a:t>
+            </a:r>
+            <a:r>
+              <a:rPr lang="en-US" dirty="0" smtClean="0"/>
+              <a:t>education.github.com/pack to sign up for your student developer pack.</a:t>
+            </a:r>
+            <a:endParaRPr lang="en-US" dirty="0"/>
+          </a:p>
+        </p:txBody>
+      </p:sp>
+    </p:spTree>
+    <p:extLst>
+      <p:ext uri="{BB962C8B-B14F-4D97-AF65-F5344CB8AC3E}">
+        <p14:creationId xmlns:p14="http://schemas.microsoft.com/office/powerpoint/2010/main" val="2728695247"/>
+      </p:ext>
+    </p:extLst>
+  </p:cSld>
+  <p:clrMapOvr>
+    <a:masterClrMapping/>
+  </p:clrMapOvr>
+</p:sld>
+</file>
+
+<file path=ppt/slides/slide22.xml><?xml version="1.0" encoding="utf-8"?>
+<p:sld xmlns:a="http://schemas.openxmlformats.org/drawingml/2006/main" xmlns:r="http://schemas.openxmlformats.org/officeDocument/2006/relationships" xmlns:p="http://schemas.openxmlformats.org/presentationml/2006/main">
+  <p:cSld>
+    <p:spTree>
+      <p:nvGrpSpPr>
+        <p:cNvPr id="1" name=""/>
+        <p:cNvGrpSpPr/>
+        <p:nvPr/>
+      </p:nvGrpSpPr>
+      <p:grpSpPr>
+        <a:xfrm>
+          <a:off x="0" y="0"/>
+          <a:ext cx="0" cy="0"/>
+          <a:chOff x="0" y="0"/>
+          <a:chExt cx="0" cy="0"/>
+        </a:xfrm>
+      </p:grpSpPr>
+      <p:sp>
+        <p:nvSpPr>
+          <p:cNvPr id="2" name="Title 1"/>
+          <p:cNvSpPr>
+            <a:spLocks noGrp="1"/>
+          </p:cNvSpPr>
+          <p:nvPr>
+            <p:ph type="title"/>
+          </p:nvPr>
+        </p:nvSpPr>
+        <p:spPr/>
+        <p:txBody>
+          <a:bodyPr/>
+          <a:lstStyle/>
+          <a:p>
+            <a:r>
+              <a:rPr lang="en-US" dirty="0" smtClean="0"/>
+              <a:t>GitHub </a:t>
+            </a:r>
+            <a:r>
+              <a:rPr lang="en-US" dirty="0"/>
+              <a:t>s</a:t>
+            </a:r>
+            <a:r>
+              <a:rPr lang="en-US" dirty="0" smtClean="0"/>
+              <a:t>etup</a:t>
+            </a:r>
+            <a:endParaRPr lang="en-US" dirty="0"/>
+          </a:p>
+        </p:txBody>
+      </p:sp>
+      <p:sp>
+        <p:nvSpPr>
+          <p:cNvPr id="3" name="Content Placeholder 2"/>
+          <p:cNvSpPr>
+            <a:spLocks noGrp="1"/>
+          </p:cNvSpPr>
+          <p:nvPr>
+            <p:ph idx="1"/>
+          </p:nvPr>
+        </p:nvSpPr>
+        <p:spPr>
+          <a:xfrm>
+            <a:off x="1154954" y="2603500"/>
+            <a:ext cx="8825659" cy="1235332"/>
+          </a:xfrm>
+        </p:spPr>
+        <p:txBody>
+          <a:bodyPr/>
+          <a:lstStyle/>
+          <a:p>
+            <a:r>
+              <a:rPr lang="en-US" dirty="0" smtClean="0"/>
+              <a:t>Download and install the GitHub </a:t>
+            </a:r>
+            <a:r>
+              <a:rPr lang="en-US" dirty="0"/>
+              <a:t>desktop </a:t>
+            </a:r>
+            <a:r>
+              <a:rPr lang="en-US" dirty="0" smtClean="0"/>
+              <a:t>app:</a:t>
+            </a:r>
+          </a:p>
+          <a:p>
+            <a:pPr lvl="1"/>
+            <a:r>
+              <a:rPr lang="en-US" dirty="0"/>
+              <a:t>https://desktop.github.com</a:t>
+            </a:r>
+            <a:r>
+              <a:rPr lang="en-US" dirty="0" smtClean="0"/>
+              <a:t>/</a:t>
+            </a:r>
+          </a:p>
+          <a:p>
+            <a:pPr lvl="1"/>
+            <a:r>
+              <a:rPr lang="en-US" dirty="0" smtClean="0"/>
+              <a:t>The download includes the desktop app as well as the </a:t>
+            </a:r>
+            <a:r>
+              <a:rPr lang="en-US" dirty="0" err="1"/>
+              <a:t>G</a:t>
+            </a:r>
+            <a:r>
+              <a:rPr lang="en-US" dirty="0" err="1" smtClean="0"/>
+              <a:t>it</a:t>
+            </a:r>
+            <a:r>
+              <a:rPr lang="en-US" dirty="0" smtClean="0"/>
+              <a:t> shell.</a:t>
+            </a:r>
+          </a:p>
+          <a:p>
+            <a:pPr marL="457200" lvl="1" indent="0">
+              <a:buNone/>
+            </a:pPr>
+            <a:endParaRPr lang="en-US" dirty="0"/>
+          </a:p>
+        </p:txBody>
+      </p:sp>
+    </p:spTree>
+    <p:extLst>
+      <p:ext uri="{BB962C8B-B14F-4D97-AF65-F5344CB8AC3E}">
+        <p14:creationId xmlns:p14="http://schemas.microsoft.com/office/powerpoint/2010/main" val="3310566302"/>
       </p:ext>
     </p:extLst>
   </p:cSld>
@@ -15175,20 +15431,16 @@
           <a:lstStyle/>
           <a:p>
             <a:r>
+              <a:rPr lang="en-US" dirty="0"/>
+              <a:t>P</a:t>
+            </a:r>
+            <a:r>
               <a:rPr lang="en-US" dirty="0" smtClean="0"/>
-              <a:t>What is </a:t>
-            </a:r>
-            <a:r>
-              <a:rPr lang="en-US" dirty="0" err="1"/>
-              <a:t>G</a:t>
-            </a:r>
-            <a:r>
-              <a:rPr lang="en-US" dirty="0" err="1" smtClean="0"/>
-              <a:t>it</a:t>
+              <a:t>rojects </a:t>
             </a:r>
             <a:r>
               <a:rPr lang="en-US" dirty="0" smtClean="0"/>
-              <a:t>?</a:t>
+              <a:t>without source control	</a:t>
             </a:r>
             <a:endParaRPr lang="en-US" dirty="0"/>
           </a:p>
@@ -15210,59 +15462,36 @@
           <a:lstStyle/>
           <a:p>
             <a:r>
+              <a:rPr lang="en-US" dirty="0" smtClean="0"/>
+              <a:t>In the past, you’ve probably written code or some other type of project and saved it to a flash drive.</a:t>
+            </a:r>
+          </a:p>
+          <a:p>
+            <a:r>
+              <a:rPr lang="en-US" dirty="0" smtClean="0"/>
+              <a:t>If the project stayed on your </a:t>
+            </a:r>
+            <a:r>
               <a:rPr lang="en-US" dirty="0" err="1" smtClean="0"/>
-              <a:t>Git</a:t>
+              <a:t>flashdrive</a:t>
             </a:r>
             <a:r>
               <a:rPr lang="en-US" dirty="0" smtClean="0"/>
-              <a:t> is a source control system.</a:t>
+              <a:t>. Changes were pretty straightforward. As soon as you copied the project to another machine or got another person involved, changes became more tedious. </a:t>
             </a:r>
           </a:p>
           <a:p>
             <a:r>
               <a:rPr lang="en-US" dirty="0" smtClean="0"/>
-              <a:t>What is source control</a:t>
-            </a:r>
-          </a:p>
-          <a:p>
-            <a:pPr lvl="1"/>
+              <a:t>There is a good chance you lost track of which copy of the project was the most recent. If your partner made changes, you would also have to rectify those changes. </a:t>
+            </a:r>
+            <a:endParaRPr lang="en-US" dirty="0" smtClean="0"/>
+          </a:p>
+          <a:p>
             <a:r>
               <a:rPr lang="en-US" dirty="0" smtClean="0"/>
-              <a:t>“…is </a:t>
-            </a:r>
-            <a:r>
-              <a:rPr lang="en-US" dirty="0"/>
-              <a:t>the management of changes to documents</a:t>
-            </a:r>
-            <a:r>
-              <a:rPr lang="en-US" dirty="0" smtClean="0"/>
-              <a:t>, computer </a:t>
-            </a:r>
-            <a:r>
-              <a:rPr lang="en-US" dirty="0"/>
-              <a:t>programs, large web sites, and other collections of </a:t>
-            </a:r>
-            <a:r>
-              <a:rPr lang="en-US" dirty="0" smtClean="0"/>
-              <a:t>information”. –Wikipedia</a:t>
-            </a:r>
-          </a:p>
-          <a:p>
-            <a:r>
-              <a:rPr lang="en-US" dirty="0" smtClean="0"/>
-              <a:t>Source control is also called version control and revision control.</a:t>
-            </a:r>
-          </a:p>
-          <a:p>
-            <a:r>
-              <a:rPr lang="en-US" dirty="0" smtClean="0"/>
-              <a:t>Older source control methods allowed users to check out a file from a file server, but that file become locked while it was checked out. This prevented 2 developers from modifying the same file at the same time. </a:t>
-            </a:r>
-          </a:p>
-          <a:p>
-            <a:pPr marL="457200" lvl="1" indent="0">
-              <a:buNone/>
-            </a:pPr>
+              <a:t>Imagine copy/paste updates with a team of developers.</a:t>
+            </a:r>
             <a:endParaRPr lang="en-US" dirty="0"/>
           </a:p>
         </p:txBody>
@@ -15270,7 +15499,7 @@
     </p:spTree>
     <p:extLst>
       <p:ext uri="{BB962C8B-B14F-4D97-AF65-F5344CB8AC3E}">
-        <p14:creationId xmlns:p14="http://schemas.microsoft.com/office/powerpoint/2010/main" val="2371513772"/>
+        <p14:creationId xmlns:p14="http://schemas.microsoft.com/office/powerpoint/2010/main" val="2752061556"/>
       </p:ext>
     </p:extLst>
   </p:cSld>
@@ -15326,7 +15555,7 @@
             </a:r>
             <a:r>
               <a:rPr lang="en-US" dirty="0" smtClean="0"/>
-              <a:t>	?</a:t>
+              <a:t>?</a:t>
             </a:r>
             <a:endParaRPr lang="en-US" dirty="0"/>
           </a:p>
@@ -15353,30 +15582,54 @@
             </a:r>
             <a:r>
               <a:rPr lang="en-US" dirty="0" smtClean="0"/>
-              <a:t> was invented by Linus Torvalds (inventor of Linux)</a:t>
+              <a:t> is a source control system.</a:t>
             </a:r>
           </a:p>
           <a:p>
             <a:r>
               <a:rPr lang="en-US" dirty="0" smtClean="0"/>
-              <a:t>Prior to 2005, the Linux community used </a:t>
-            </a:r>
-            <a:r>
-              <a:rPr lang="en-US" dirty="0" err="1" smtClean="0"/>
-              <a:t>BitKeeper</a:t>
-            </a:r>
+              <a:t>What is source control</a:t>
+            </a:r>
+          </a:p>
+          <a:p>
+            <a:pPr lvl="1"/>
             <a:r>
               <a:rPr lang="en-US" dirty="0" smtClean="0"/>
-              <a:t> as their source control tool. </a:t>
-            </a:r>
-            <a:r>
-              <a:rPr lang="en-US" dirty="0" err="1" smtClean="0"/>
-              <a:t>BitKeeper</a:t>
+              <a:t>“…is </a:t>
+            </a:r>
+            <a:r>
+              <a:rPr lang="en-US" dirty="0"/>
+              <a:t>the management of changes to documents</a:t>
             </a:r>
             <a:r>
               <a:rPr lang="en-US" dirty="0" smtClean="0"/>
-              <a:t> was stopped being free to use. This prompted the Linux community to make their own source control tool.</a:t>
-            </a:r>
+              <a:t>, computer </a:t>
+            </a:r>
+            <a:r>
+              <a:rPr lang="en-US" dirty="0"/>
+              <a:t>programs, large web sites, and other collections of </a:t>
+            </a:r>
+            <a:r>
+              <a:rPr lang="en-US" dirty="0" smtClean="0"/>
+              <a:t>information”. –Wikipedia</a:t>
+            </a:r>
+          </a:p>
+          <a:p>
+            <a:r>
+              <a:rPr lang="en-US" dirty="0" smtClean="0"/>
+              <a:t>Source control is also called version control and revision control.</a:t>
+            </a:r>
+          </a:p>
+          <a:p>
+            <a:r>
+              <a:rPr lang="en-US" dirty="0" smtClean="0"/>
+              <a:t>Older source control methods allowed users to check out a file from a file server, but that file become locked while it was checked out. This prevented 2 developers from modifying the same file at the same time. </a:t>
+            </a:r>
+          </a:p>
+          <a:p>
+            <a:pPr marL="457200" lvl="1" indent="0">
+              <a:buNone/>
+            </a:pPr>
             <a:endParaRPr lang="en-US" dirty="0"/>
           </a:p>
         </p:txBody>
@@ -15384,7 +15637,7 @@
     </p:spTree>
     <p:extLst>
       <p:ext uri="{BB962C8B-B14F-4D97-AF65-F5344CB8AC3E}">
-        <p14:creationId xmlns:p14="http://schemas.microsoft.com/office/powerpoint/2010/main" val="2904719245"/>
+        <p14:creationId xmlns:p14="http://schemas.microsoft.com/office/powerpoint/2010/main" val="2371513772"/>
       </p:ext>
     </p:extLst>
   </p:cSld>
@@ -15428,7 +15681,15 @@
           <a:p>
             <a:r>
               <a:rPr lang="en-US" dirty="0" smtClean="0"/>
-              <a:t>Coding without source control	</a:t>
+              <a:t>What is </a:t>
+            </a:r>
+            <a:r>
+              <a:rPr lang="en-US" dirty="0" err="1" smtClean="0"/>
+              <a:t>Git</a:t>
+            </a:r>
+            <a:r>
+              <a:rPr lang="en-US" dirty="0" smtClean="0"/>
+              <a:t>?</a:t>
             </a:r>
             <a:endParaRPr lang="en-US" dirty="0"/>
           </a:p>
@@ -15450,28 +15711,42 @@
           <a:lstStyle/>
           <a:p>
             <a:r>
+              <a:rPr lang="en-US" dirty="0" err="1" smtClean="0"/>
+              <a:t>Git</a:t>
+            </a:r>
+            <a:r>
               <a:rPr lang="en-US" dirty="0" smtClean="0"/>
-              <a:t>In the past, you’ve probably written code or some other type of project and saved it to a flash drive.</a:t>
+              <a:t> was invented by Linus Torvalds (inventor of Linux)</a:t>
             </a:r>
           </a:p>
           <a:p>
             <a:r>
               <a:rPr lang="en-US" dirty="0" smtClean="0"/>
-              <a:t>If the project stayed on your </a:t>
+              <a:t>Prior to 2005, the Linux community used </a:t>
             </a:r>
             <a:r>
               <a:rPr lang="en-US" dirty="0" err="1" smtClean="0"/>
-              <a:t>flashdrive</a:t>
+              <a:t>BitKeeper</a:t>
             </a:r>
             <a:r>
               <a:rPr lang="en-US" dirty="0" smtClean="0"/>
-              <a:t>. Changes were pretty straightforward. As soon as you copied the project to another machine or got another person involved, changes became more tedious. </a:t>
-            </a:r>
-          </a:p>
-          <a:p>
+              <a:t> as their source control tool. </a:t>
+            </a:r>
+            <a:r>
+              <a:rPr lang="en-US" dirty="0" err="1" smtClean="0"/>
+              <a:t>BitKeeper</a:t>
+            </a:r>
             <a:r>
               <a:rPr lang="en-US" dirty="0" smtClean="0"/>
-              <a:t>There is a good chance you lost track of which copy of the project was the most recent. If your partner made changes, you would also have to rectify those changes. </a:t>
+              <a:t> </a:t>
+            </a:r>
+            <a:r>
+              <a:rPr lang="en-US" dirty="0" smtClean="0"/>
+              <a:t>stopped </a:t>
+            </a:r>
+            <a:r>
+              <a:rPr lang="en-US" dirty="0" smtClean="0"/>
+              <a:t>being free to use. This prompted the Linux community to make their own source control tool.</a:t>
             </a:r>
             <a:endParaRPr lang="en-US" dirty="0"/>
           </a:p>
@@ -15480,7 +15755,7 @@
     </p:spTree>
     <p:extLst>
       <p:ext uri="{BB962C8B-B14F-4D97-AF65-F5344CB8AC3E}">
-        <p14:creationId xmlns:p14="http://schemas.microsoft.com/office/powerpoint/2010/main" val="2752061556"/>
+        <p14:creationId xmlns:p14="http://schemas.microsoft.com/office/powerpoint/2010/main" val="2904719245"/>
       </p:ext>
     </p:extLst>
   </p:cSld>
@@ -15527,12 +15802,20 @@
               <a:t>Basic </a:t>
             </a:r>
             <a:r>
+              <a:rPr lang="en-US" dirty="0" err="1"/>
+              <a:t>G</a:t>
+            </a:r>
+            <a:r>
               <a:rPr lang="en-US" dirty="0" err="1" smtClean="0"/>
-              <a:t>git</a:t>
+              <a:t>it</a:t>
             </a:r>
             <a:r>
               <a:rPr lang="en-US" dirty="0" smtClean="0"/>
-              <a:t> commands and workflow</a:t>
+              <a:t> </a:t>
+            </a:r>
+            <a:r>
+              <a:rPr lang="en-US" dirty="0" smtClean="0"/>
+              <a:t>commands and workflow</a:t>
             </a:r>
             <a:endParaRPr lang="en-US" dirty="0"/>
           </a:p>
@@ -15559,15 +15842,27 @@
           <a:lstStyle/>
           <a:p>
             <a:r>
-              <a:rPr lang="en-US" dirty="0" err="1"/>
+              <a:rPr lang="en-US" b="1" dirty="0" err="1">
+                <a:solidFill>
+                  <a:srgbClr val="0070C0"/>
+                </a:solidFill>
+              </a:rPr>
               <a:t>g</a:t>
             </a:r>
             <a:r>
-              <a:rPr lang="en-US" dirty="0" err="1" smtClean="0"/>
+              <a:rPr lang="en-US" b="1" dirty="0" err="1" smtClean="0">
+                <a:solidFill>
+                  <a:srgbClr val="0070C0"/>
+                </a:solidFill>
+              </a:rPr>
               <a:t>it</a:t>
             </a:r>
             <a:r>
-              <a:rPr lang="en-US" dirty="0" smtClean="0"/>
+              <a:rPr lang="en-US" b="1" dirty="0" smtClean="0">
+                <a:solidFill>
+                  <a:srgbClr val="0070C0"/>
+                </a:solidFill>
+              </a:rPr>
               <a:t> status</a:t>
             </a:r>
           </a:p>
@@ -15588,15 +15883,27 @@
           </a:p>
           <a:p>
             <a:r>
-              <a:rPr lang="en-US" dirty="0" err="1"/>
+              <a:rPr lang="en-US" b="1" dirty="0" err="1">
+                <a:solidFill>
+                  <a:srgbClr val="0070C0"/>
+                </a:solidFill>
+              </a:rPr>
               <a:t>g</a:t>
             </a:r>
             <a:r>
-              <a:rPr lang="en-US" dirty="0" err="1" smtClean="0"/>
+              <a:rPr lang="en-US" b="1" dirty="0" err="1" smtClean="0">
+                <a:solidFill>
+                  <a:srgbClr val="0070C0"/>
+                </a:solidFill>
+              </a:rPr>
               <a:t>it</a:t>
             </a:r>
             <a:r>
-              <a:rPr lang="en-US" dirty="0" smtClean="0"/>
+              <a:rPr lang="en-US" b="1" dirty="0" smtClean="0">
+                <a:solidFill>
+                  <a:srgbClr val="0070C0"/>
+                </a:solidFill>
+              </a:rPr>
               <a:t> add –A </a:t>
             </a:r>
           </a:p>
@@ -15698,12 +16005,20 @@
               <a:t>Basic </a:t>
             </a:r>
             <a:r>
+              <a:rPr lang="en-US" dirty="0" err="1"/>
+              <a:t>G</a:t>
+            </a:r>
+            <a:r>
               <a:rPr lang="en-US" dirty="0" err="1" smtClean="0"/>
-              <a:t>git</a:t>
+              <a:t>it</a:t>
             </a:r>
             <a:r>
               <a:rPr lang="en-US" dirty="0" smtClean="0"/>
-              <a:t> commands and workflow</a:t>
+              <a:t> </a:t>
+            </a:r>
+            <a:r>
+              <a:rPr lang="en-US" dirty="0" smtClean="0"/>
+              <a:t>commands and workflow</a:t>
             </a:r>
             <a:endParaRPr lang="en-US" dirty="0"/>
           </a:p>
@@ -15725,15 +16040,27 @@
           <a:lstStyle/>
           <a:p>
             <a:r>
-              <a:rPr lang="en-US" dirty="0" err="1"/>
+              <a:rPr lang="en-US" b="1" dirty="0" err="1">
+                <a:solidFill>
+                  <a:srgbClr val="0070C0"/>
+                </a:solidFill>
+              </a:rPr>
               <a:t>g</a:t>
             </a:r>
             <a:r>
-              <a:rPr lang="en-US" dirty="0" err="1" smtClean="0"/>
+              <a:rPr lang="en-US" b="1" dirty="0" err="1" smtClean="0">
+                <a:solidFill>
+                  <a:srgbClr val="0070C0"/>
+                </a:solidFill>
+              </a:rPr>
               <a:t>it</a:t>
             </a:r>
             <a:r>
-              <a:rPr lang="en-US" dirty="0" smtClean="0"/>
+              <a:rPr lang="en-US" b="1" dirty="0" smtClean="0">
+                <a:solidFill>
+                  <a:srgbClr val="0070C0"/>
+                </a:solidFill>
+              </a:rPr>
               <a:t> commit –m “your message here”</a:t>
             </a:r>
           </a:p>
@@ -15769,23 +16096,43 @@
           </a:p>
           <a:p>
             <a:r>
-              <a:rPr lang="en-US" dirty="0" err="1"/>
+              <a:rPr lang="en-US" b="1" dirty="0" err="1">
+                <a:solidFill>
+                  <a:srgbClr val="0070C0"/>
+                </a:solidFill>
+              </a:rPr>
               <a:t>g</a:t>
             </a:r>
             <a:r>
-              <a:rPr lang="en-US" dirty="0" err="1" smtClean="0"/>
+              <a:rPr lang="en-US" b="1" dirty="0" err="1" smtClean="0">
+                <a:solidFill>
+                  <a:srgbClr val="0070C0"/>
+                </a:solidFill>
+              </a:rPr>
               <a:t>it</a:t>
             </a:r>
             <a:r>
-              <a:rPr lang="en-US" dirty="0" smtClean="0"/>
+              <a:rPr lang="en-US" b="1" dirty="0" smtClean="0">
+                <a:solidFill>
+                  <a:srgbClr val="0070C0"/>
+                </a:solidFill>
+              </a:rPr>
               <a:t> </a:t>
             </a:r>
             <a:r>
-              <a:rPr lang="en-US" dirty="0"/>
+              <a:rPr lang="en-US" b="1" dirty="0">
+                <a:solidFill>
+                  <a:srgbClr val="0070C0"/>
+                </a:solidFill>
+              </a:rPr>
               <a:t>p</a:t>
             </a:r>
             <a:r>
-              <a:rPr lang="en-US" dirty="0" smtClean="0"/>
+              <a:rPr lang="en-US" b="1" dirty="0" smtClean="0">
+                <a:solidFill>
+                  <a:srgbClr val="0070C0"/>
+                </a:solidFill>
+              </a:rPr>
               <a:t>ush</a:t>
             </a:r>
           </a:p>
@@ -15894,12 +16241,24 @@
               <a:t> repository as seen from GitHub. The same history can be viewed from the shell using </a:t>
             </a:r>
             <a:r>
-              <a:rPr lang="en-US" dirty="0" err="1" smtClean="0"/>
+              <a:rPr lang="en-US" b="1" dirty="0" err="1" smtClean="0">
+                <a:solidFill>
+                  <a:srgbClr val="0070C0"/>
+                </a:solidFill>
+              </a:rPr>
               <a:t>git</a:t>
             </a:r>
             <a:r>
+              <a:rPr lang="en-US" b="1" dirty="0" smtClean="0">
+                <a:solidFill>
+                  <a:srgbClr val="0070C0"/>
+                </a:solidFill>
+              </a:rPr>
+              <a:t> log</a:t>
+            </a:r>
+            <a:r>
               <a:rPr lang="en-US" dirty="0" smtClean="0"/>
-              <a:t> log. </a:t>
+              <a:t>. </a:t>
             </a:r>
           </a:p>
           <a:p>
@@ -16035,7 +16394,7 @@
         </p:blipFill>
         <p:spPr>
           <a:xfrm>
-            <a:off x="1296818" y="3085574"/>
+            <a:off x="1322774" y="3085574"/>
             <a:ext cx="8773749" cy="3772426"/>
           </a:xfrm>
           <a:prstGeom prst="rect">

</xml_diff>

<commit_message>
added more git commands to command file
</commit_message>
<xml_diff>
--- a/Intro to git.pptx
+++ b/Intro to git.pptx
@@ -22,11 +22,12 @@
     <p:sldId id="271" r:id="rId16"/>
     <p:sldId id="274" r:id="rId17"/>
     <p:sldId id="275" r:id="rId18"/>
-    <p:sldId id="273" r:id="rId19"/>
-    <p:sldId id="276" r:id="rId20"/>
-    <p:sldId id="277" r:id="rId21"/>
-    <p:sldId id="281" r:id="rId22"/>
-    <p:sldId id="280" r:id="rId23"/>
+    <p:sldId id="282" r:id="rId19"/>
+    <p:sldId id="273" r:id="rId20"/>
+    <p:sldId id="276" r:id="rId21"/>
+    <p:sldId id="277" r:id="rId22"/>
+    <p:sldId id="281" r:id="rId23"/>
+    <p:sldId id="280" r:id="rId24"/>
   </p:sldIdLst>
   <p:sldSz cx="12192000" cy="6858000"/>
   <p:notesSz cx="6858000" cy="9144000"/>
@@ -14637,6 +14638,137 @@
           <a:chExt cx="0" cy="0"/>
         </a:xfrm>
       </p:grpSpPr>
+      <p:sp>
+        <p:nvSpPr>
+          <p:cNvPr id="2" name="Title 1"/>
+          <p:cNvSpPr>
+            <a:spLocks noGrp="1"/>
+          </p:cNvSpPr>
+          <p:nvPr>
+            <p:ph type="title"/>
+          </p:nvPr>
+        </p:nvSpPr>
+        <p:spPr/>
+        <p:txBody>
+          <a:bodyPr/>
+          <a:lstStyle/>
+          <a:p>
+            <a:r>
+              <a:rPr lang="en-US" dirty="0" smtClean="0"/>
+              <a:t>Intermediate </a:t>
+            </a:r>
+            <a:r>
+              <a:rPr lang="en-US" dirty="0" err="1" smtClean="0"/>
+              <a:t>Git</a:t>
+            </a:r>
+            <a:r>
+              <a:rPr lang="en-US" dirty="0" smtClean="0"/>
+              <a:t> commands</a:t>
+            </a:r>
+            <a:endParaRPr lang="en-US" dirty="0"/>
+          </a:p>
+        </p:txBody>
+      </p:sp>
+      <p:sp>
+        <p:nvSpPr>
+          <p:cNvPr id="3" name="Content Placeholder 2"/>
+          <p:cNvSpPr>
+            <a:spLocks noGrp="1"/>
+          </p:cNvSpPr>
+          <p:nvPr>
+            <p:ph idx="1"/>
+          </p:nvPr>
+        </p:nvSpPr>
+        <p:spPr/>
+        <p:txBody>
+          <a:bodyPr>
+            <a:normAutofit lnSpcReduction="10000"/>
+          </a:bodyPr>
+          <a:lstStyle/>
+          <a:p>
+            <a:r>
+              <a:rPr lang="en-US" dirty="0" smtClean="0"/>
+              <a:t>.</a:t>
+            </a:r>
+            <a:r>
+              <a:rPr lang="en-US" dirty="0" err="1" smtClean="0"/>
+              <a:t>gitignore</a:t>
+            </a:r>
+            <a:endParaRPr lang="en-US" dirty="0" smtClean="0"/>
+          </a:p>
+          <a:p>
+            <a:pPr lvl="1"/>
+            <a:r>
+              <a:rPr lang="en-US" dirty="0" err="1" smtClean="0"/>
+              <a:t>Git</a:t>
+            </a:r>
+            <a:r>
+              <a:rPr lang="en-US" dirty="0" smtClean="0"/>
+              <a:t> ignore file is a list of document types that </a:t>
+            </a:r>
+            <a:r>
+              <a:rPr lang="en-US" dirty="0" err="1" smtClean="0"/>
+              <a:t>git</a:t>
+            </a:r>
+            <a:r>
+              <a:rPr lang="en-US" dirty="0" smtClean="0"/>
+              <a:t> should ignore. If the file type shows up in your local repository, it won’t be tracked by the remote repository. There are special rules that apply when a file type exists before a </a:t>
+            </a:r>
+            <a:r>
+              <a:rPr lang="en-US" dirty="0" err="1" smtClean="0"/>
+              <a:t>git</a:t>
+            </a:r>
+            <a:r>
+              <a:rPr lang="en-US" dirty="0" smtClean="0"/>
+              <a:t> ignore file excludes that type. </a:t>
+            </a:r>
+          </a:p>
+          <a:p>
+            <a:r>
+              <a:rPr lang="en-US" dirty="0" smtClean="0"/>
+              <a:t>Forking</a:t>
+            </a:r>
+          </a:p>
+          <a:p>
+            <a:pPr lvl="1"/>
+            <a:r>
+              <a:rPr lang="en-US" dirty="0" smtClean="0"/>
+              <a:t>If there is an existing repository, you can make a copy of the repository that is unique from the original. You can update this forked copy without modifying the original repository. If you make a change that you feel the original code should have, you can make a pull request from you fork to the original repository. Forking is different from cloning in that you are making a brand new repository that is being filled with preexisting code.</a:t>
+            </a:r>
+            <a:endParaRPr lang="en-US" dirty="0"/>
+          </a:p>
+        </p:txBody>
+      </p:sp>
+    </p:spTree>
+    <p:extLst>
+      <p:ext uri="{BB962C8B-B14F-4D97-AF65-F5344CB8AC3E}">
+        <p14:creationId xmlns:p14="http://schemas.microsoft.com/office/powerpoint/2010/main" val="2700752005"/>
+      </p:ext>
+    </p:extLst>
+  </p:cSld>
+  <p:clrMapOvr>
+    <a:masterClrMapping/>
+  </p:clrMapOvr>
+</p:sld>
+</file>
+
+<file path=ppt/slides/slide19.xml><?xml version="1.0" encoding="utf-8"?>
+<p:sld xmlns:a="http://schemas.openxmlformats.org/drawingml/2006/main" xmlns:r="http://schemas.openxmlformats.org/officeDocument/2006/relationships" xmlns:p="http://schemas.openxmlformats.org/presentationml/2006/main">
+  <p:cSld>
+    <p:spTree>
+      <p:nvGrpSpPr>
+        <p:cNvPr id="1" name=""/>
+        <p:cNvGrpSpPr/>
+        <p:nvPr/>
+      </p:nvGrpSpPr>
+      <p:grpSpPr>
+        <a:xfrm>
+          <a:off x="0" y="0"/>
+          <a:ext cx="0" cy="0"/>
+          <a:chOff x="0" y="0"/>
+          <a:chExt cx="0" cy="0"/>
+        </a:xfrm>
+      </p:grpSpPr>
       <p:pic>
         <p:nvPicPr>
           <p:cNvPr id="2" name="Content Placeholder 3"/>
@@ -14740,7 +14872,142 @@
 </p:sld>
 </file>
 
-<file path=ppt/slides/slide19.xml><?xml version="1.0" encoding="utf-8"?>
+<file path=ppt/slides/slide2.xml><?xml version="1.0" encoding="utf-8"?>
+<p:sld xmlns:a="http://schemas.openxmlformats.org/drawingml/2006/main" xmlns:r="http://schemas.openxmlformats.org/officeDocument/2006/relationships" xmlns:p="http://schemas.openxmlformats.org/presentationml/2006/main">
+  <p:cSld>
+    <p:spTree>
+      <p:nvGrpSpPr>
+        <p:cNvPr id="1" name=""/>
+        <p:cNvGrpSpPr/>
+        <p:nvPr/>
+      </p:nvGrpSpPr>
+      <p:grpSpPr>
+        <a:xfrm>
+          <a:off x="0" y="0"/>
+          <a:ext cx="0" cy="0"/>
+          <a:chOff x="0" y="0"/>
+          <a:chExt cx="0" cy="0"/>
+        </a:xfrm>
+      </p:grpSpPr>
+      <p:sp>
+        <p:nvSpPr>
+          <p:cNvPr id="2" name="Title 1"/>
+          <p:cNvSpPr>
+            <a:spLocks noGrp="1"/>
+          </p:cNvSpPr>
+          <p:nvPr>
+            <p:ph type="title"/>
+          </p:nvPr>
+        </p:nvSpPr>
+        <p:spPr/>
+        <p:txBody>
+          <a:bodyPr/>
+          <a:lstStyle/>
+          <a:p>
+            <a:r>
+              <a:rPr lang="en-US" dirty="0" smtClean="0"/>
+              <a:t>Overview</a:t>
+            </a:r>
+            <a:endParaRPr lang="en-US" dirty="0"/>
+          </a:p>
+        </p:txBody>
+      </p:sp>
+      <p:sp>
+        <p:nvSpPr>
+          <p:cNvPr id="3" name="Content Placeholder 2"/>
+          <p:cNvSpPr>
+            <a:spLocks noGrp="1"/>
+          </p:cNvSpPr>
+          <p:nvPr>
+            <p:ph idx="1"/>
+          </p:nvPr>
+        </p:nvSpPr>
+        <p:spPr/>
+        <p:txBody>
+          <a:bodyPr/>
+          <a:lstStyle/>
+          <a:p>
+            <a:r>
+              <a:rPr lang="en-US" dirty="0" smtClean="0"/>
+              <a:t>Intro to problems solved by source control</a:t>
+            </a:r>
+          </a:p>
+          <a:p>
+            <a:r>
+              <a:rPr lang="en-US" dirty="0" smtClean="0"/>
+              <a:t>Brief overview and history of </a:t>
+            </a:r>
+            <a:r>
+              <a:rPr lang="en-US" dirty="0" err="1"/>
+              <a:t>G</a:t>
+            </a:r>
+            <a:r>
+              <a:rPr lang="en-US" dirty="0" err="1" smtClean="0"/>
+              <a:t>it</a:t>
+            </a:r>
+            <a:endParaRPr lang="en-US" dirty="0" smtClean="0"/>
+          </a:p>
+          <a:p>
+            <a:r>
+              <a:rPr lang="en-US" dirty="0" smtClean="0"/>
+              <a:t>Basic </a:t>
+            </a:r>
+            <a:r>
+              <a:rPr lang="en-US" dirty="0" err="1"/>
+              <a:t>G</a:t>
+            </a:r>
+            <a:r>
+              <a:rPr lang="en-US" dirty="0" err="1" smtClean="0"/>
+              <a:t>it</a:t>
+            </a:r>
+            <a:r>
+              <a:rPr lang="en-US" dirty="0" smtClean="0"/>
+              <a:t> commands and workflow (add, commit, and push)</a:t>
+            </a:r>
+          </a:p>
+          <a:p>
+            <a:r>
+              <a:rPr lang="en-US" dirty="0" smtClean="0"/>
+              <a:t>Overview of expanded ideas (clone, merging and conflicts, branching)</a:t>
+            </a:r>
+          </a:p>
+          <a:p>
+            <a:r>
+              <a:rPr lang="en-US" dirty="0" smtClean="0"/>
+              <a:t>Practical examples</a:t>
+            </a:r>
+          </a:p>
+          <a:p>
+            <a:r>
+              <a:rPr lang="en-US" dirty="0" smtClean="0"/>
+              <a:t>Setup of GitHub app</a:t>
+            </a:r>
+          </a:p>
+          <a:p>
+            <a:r>
+              <a:rPr lang="en-US" dirty="0" smtClean="0"/>
+              <a:t>Hands on experience</a:t>
+            </a:r>
+          </a:p>
+          <a:p>
+            <a:endParaRPr lang="en-US" dirty="0"/>
+          </a:p>
+        </p:txBody>
+      </p:sp>
+    </p:spTree>
+    <p:extLst>
+      <p:ext uri="{BB962C8B-B14F-4D97-AF65-F5344CB8AC3E}">
+        <p14:creationId xmlns:p14="http://schemas.microsoft.com/office/powerpoint/2010/main" val="1450765654"/>
+      </p:ext>
+    </p:extLst>
+  </p:cSld>
+  <p:clrMapOvr>
+    <a:masterClrMapping/>
+  </p:clrMapOvr>
+</p:sld>
+</file>
+
+<file path=ppt/slides/slide20.xml><?xml version="1.0" encoding="utf-8"?>
 <p:sld xmlns:a="http://schemas.openxmlformats.org/drawingml/2006/main" xmlns:r="http://schemas.openxmlformats.org/officeDocument/2006/relationships" xmlns:p="http://schemas.openxmlformats.org/presentationml/2006/main">
   <p:cSld>
     <p:spTree>
@@ -14847,146 +15114,7 @@
 </p:sld>
 </file>
 
-<file path=ppt/slides/slide2.xml><?xml version="1.0" encoding="utf-8"?>
-<p:sld xmlns:a="http://schemas.openxmlformats.org/drawingml/2006/main" xmlns:r="http://schemas.openxmlformats.org/officeDocument/2006/relationships" xmlns:p="http://schemas.openxmlformats.org/presentationml/2006/main">
-  <p:cSld>
-    <p:spTree>
-      <p:nvGrpSpPr>
-        <p:cNvPr id="1" name=""/>
-        <p:cNvGrpSpPr/>
-        <p:nvPr/>
-      </p:nvGrpSpPr>
-      <p:grpSpPr>
-        <a:xfrm>
-          <a:off x="0" y="0"/>
-          <a:ext cx="0" cy="0"/>
-          <a:chOff x="0" y="0"/>
-          <a:chExt cx="0" cy="0"/>
-        </a:xfrm>
-      </p:grpSpPr>
-      <p:sp>
-        <p:nvSpPr>
-          <p:cNvPr id="2" name="Title 1"/>
-          <p:cNvSpPr>
-            <a:spLocks noGrp="1"/>
-          </p:cNvSpPr>
-          <p:nvPr>
-            <p:ph type="title"/>
-          </p:nvPr>
-        </p:nvSpPr>
-        <p:spPr/>
-        <p:txBody>
-          <a:bodyPr/>
-          <a:lstStyle/>
-          <a:p>
-            <a:r>
-              <a:rPr lang="en-US" dirty="0" smtClean="0"/>
-              <a:t>Overview</a:t>
-            </a:r>
-            <a:endParaRPr lang="en-US" dirty="0"/>
-          </a:p>
-        </p:txBody>
-      </p:sp>
-      <p:sp>
-        <p:nvSpPr>
-          <p:cNvPr id="3" name="Content Placeholder 2"/>
-          <p:cNvSpPr>
-            <a:spLocks noGrp="1"/>
-          </p:cNvSpPr>
-          <p:nvPr>
-            <p:ph idx="1"/>
-          </p:nvPr>
-        </p:nvSpPr>
-        <p:spPr/>
-        <p:txBody>
-          <a:bodyPr/>
-          <a:lstStyle/>
-          <a:p>
-            <a:r>
-              <a:rPr lang="en-US" dirty="0" smtClean="0"/>
-              <a:t>Intro to problems solved by source control</a:t>
-            </a:r>
-          </a:p>
-          <a:p>
-            <a:r>
-              <a:rPr lang="en-US" dirty="0" smtClean="0"/>
-              <a:t>Brief </a:t>
-            </a:r>
-            <a:r>
-              <a:rPr lang="en-US" dirty="0" smtClean="0"/>
-              <a:t>overview and history of </a:t>
-            </a:r>
-            <a:r>
-              <a:rPr lang="en-US" dirty="0" err="1"/>
-              <a:t>G</a:t>
-            </a:r>
-            <a:r>
-              <a:rPr lang="en-US" dirty="0" err="1" smtClean="0"/>
-              <a:t>it</a:t>
-            </a:r>
-            <a:endParaRPr lang="en-US" dirty="0" smtClean="0"/>
-          </a:p>
-          <a:p>
-            <a:r>
-              <a:rPr lang="en-US" dirty="0" smtClean="0"/>
-              <a:t>Basic </a:t>
-            </a:r>
-            <a:r>
-              <a:rPr lang="en-US" dirty="0" err="1"/>
-              <a:t>G</a:t>
-            </a:r>
-            <a:r>
-              <a:rPr lang="en-US" dirty="0" err="1" smtClean="0"/>
-              <a:t>it</a:t>
-            </a:r>
-            <a:r>
-              <a:rPr lang="en-US" dirty="0" smtClean="0"/>
-              <a:t> commands and workflow (add, commit, and push)</a:t>
-            </a:r>
-          </a:p>
-          <a:p>
-            <a:r>
-              <a:rPr lang="en-US" dirty="0" smtClean="0"/>
-              <a:t>Overview of expanded ideas (clone, merging and conflicts, branching)</a:t>
-            </a:r>
-          </a:p>
-          <a:p>
-            <a:r>
-              <a:rPr lang="en-US" dirty="0" smtClean="0"/>
-              <a:t>Practical examples</a:t>
-            </a:r>
-          </a:p>
-          <a:p>
-            <a:r>
-              <a:rPr lang="en-US" dirty="0" smtClean="0"/>
-              <a:t>Setup of GitHub app</a:t>
-            </a:r>
-          </a:p>
-          <a:p>
-            <a:r>
-              <a:rPr lang="en-US" dirty="0" smtClean="0"/>
-              <a:t>Hands on experience</a:t>
-            </a:r>
-          </a:p>
-          <a:p>
-            <a:endParaRPr lang="en-US" dirty="0"/>
-          </a:p>
-        </p:txBody>
-      </p:sp>
-    </p:spTree>
-    <p:extLst>
-      <p:ext uri="{BB962C8B-B14F-4D97-AF65-F5344CB8AC3E}">
-        <p14:creationId xmlns:p14="http://schemas.microsoft.com/office/powerpoint/2010/main" val="1450765654"/>
-      </p:ext>
-    </p:extLst>
-  </p:cSld>
-  <p:clrMapOvr>
-    <a:masterClrMapping/>
-  </p:clrMapOvr>
-</p:sld>
-</file>
-
-<file path=ppt/slides/slide20.xml><?xml version="1.0" encoding="utf-8"?>
+<file path=ppt/slides/slide21.xml><?xml version="1.0" encoding="utf-8"?>
 <p:sld xmlns:a="http://schemas.openxmlformats.org/drawingml/2006/main" xmlns:r="http://schemas.openxmlformats.org/officeDocument/2006/relationships" xmlns:p="http://schemas.openxmlformats.org/presentationml/2006/main">
   <p:cSld>
     <p:spTree>
@@ -15086,15 +15214,7 @@
           <a:p>
             <a:r>
               <a:rPr lang="en-US" dirty="0" smtClean="0"/>
-              <a:t>With the merger pushed up I </a:t>
-            </a:r>
-            <a:r>
-              <a:rPr lang="en-US" dirty="0" smtClean="0"/>
-              <a:t>was ready to delete my </a:t>
-            </a:r>
-            <a:r>
-              <a:rPr lang="en-US" dirty="0" smtClean="0"/>
-              <a:t>remote branch. So I used</a:t>
+              <a:t>With the merger pushed up I was ready to delete my remote branch. So I used</a:t>
             </a:r>
           </a:p>
           <a:p>
@@ -15150,7 +15270,7 @@
 </p:sld>
 </file>
 
-<file path=ppt/slides/slide21.xml><?xml version="1.0" encoding="utf-8"?>
+<file path=ppt/slides/slide22.xml><?xml version="1.0" encoding="utf-8"?>
 <p:sld xmlns:a="http://schemas.openxmlformats.org/drawingml/2006/main" xmlns:r="http://schemas.openxmlformats.org/officeDocument/2006/relationships" xmlns:p="http://schemas.openxmlformats.org/presentationml/2006/main">
   <p:cSld>
     <p:spTree>
@@ -15266,7 +15386,7 @@
 </p:sld>
 </file>
 
-<file path=ppt/slides/slide22.xml><?xml version="1.0" encoding="utf-8"?>
+<file path=ppt/slides/slide23.xml><?xml version="1.0" encoding="utf-8"?>
 <p:sld xmlns:a="http://schemas.openxmlformats.org/drawingml/2006/main" xmlns:r="http://schemas.openxmlformats.org/officeDocument/2006/relationships" xmlns:p="http://schemas.openxmlformats.org/presentationml/2006/main">
   <p:cSld>
     <p:spTree>
@@ -15436,11 +15556,7 @@
             </a:r>
             <a:r>
               <a:rPr lang="en-US" dirty="0" smtClean="0"/>
-              <a:t>rojects </a:t>
-            </a:r>
-            <a:r>
-              <a:rPr lang="en-US" dirty="0" smtClean="0"/>
-              <a:t>without source control	</a:t>
+              <a:t>rojects without source control	</a:t>
             </a:r>
             <a:endParaRPr lang="en-US" dirty="0"/>
           </a:p>
@@ -15485,7 +15601,6 @@
               <a:rPr lang="en-US" dirty="0" smtClean="0"/>
               <a:t>There is a good chance you lost track of which copy of the project was the most recent. If your partner made changes, you would also have to rectify those changes. </a:t>
             </a:r>
-            <a:endParaRPr lang="en-US" dirty="0" smtClean="0"/>
           </a:p>
           <a:p>
             <a:r>
@@ -15738,15 +15853,7 @@
             </a:r>
             <a:r>
               <a:rPr lang="en-US" dirty="0" smtClean="0"/>
-              <a:t> </a:t>
-            </a:r>
-            <a:r>
-              <a:rPr lang="en-US" dirty="0" smtClean="0"/>
-              <a:t>stopped </a:t>
-            </a:r>
-            <a:r>
-              <a:rPr lang="en-US" dirty="0" smtClean="0"/>
-              <a:t>being free to use. This prompted the Linux community to make their own source control tool.</a:t>
+              <a:t> stopped being free to use. This prompted the Linux community to make their own source control tool.</a:t>
             </a:r>
             <a:endParaRPr lang="en-US" dirty="0"/>
           </a:p>
@@ -15811,11 +15918,7 @@
             </a:r>
             <a:r>
               <a:rPr lang="en-US" dirty="0" smtClean="0"/>
-              <a:t> </a:t>
-            </a:r>
-            <a:r>
-              <a:rPr lang="en-US" dirty="0" smtClean="0"/>
-              <a:t>commands and workflow</a:t>
+              <a:t> commands and workflow</a:t>
             </a:r>
             <a:endParaRPr lang="en-US" dirty="0"/>
           </a:p>
@@ -15873,12 +15976,20 @@
               <a:t>This is a basic command where the shell will tell you the current state of your local repository. As a part of </a:t>
             </a:r>
             <a:r>
+              <a:rPr lang="en-US" dirty="0" err="1"/>
+              <a:t>G</a:t>
+            </a:r>
+            <a:r>
               <a:rPr lang="en-US" dirty="0" err="1" smtClean="0"/>
-              <a:t>git</a:t>
+              <a:t>it</a:t>
             </a:r>
             <a:r>
               <a:rPr lang="en-US" dirty="0" smtClean="0"/>
-              <a:t> workflow, this should be frequently used before other commands.</a:t>
+              <a:t> </a:t>
+            </a:r>
+            <a:r>
+              <a:rPr lang="en-US" dirty="0" smtClean="0"/>
+              <a:t>workflow, this should be frequently used before other commands.</a:t>
             </a:r>
           </a:p>
           <a:p>
@@ -16014,11 +16125,7 @@
             </a:r>
             <a:r>
               <a:rPr lang="en-US" dirty="0" smtClean="0"/>
-              <a:t> </a:t>
-            </a:r>
-            <a:r>
-              <a:rPr lang="en-US" dirty="0" smtClean="0"/>
-              <a:t>commands and workflow</a:t>
+              <a:t> commands and workflow</a:t>
             </a:r>
             <a:endParaRPr lang="en-US" dirty="0"/>
           </a:p>

</xml_diff>

<commit_message>
added instructions for hands on practice
</commit_message>
<xml_diff>
--- a/Intro to git.pptx
+++ b/Intro to git.pptx
@@ -28,6 +28,9 @@
     <p:sldId id="277" r:id="rId22"/>
     <p:sldId id="281" r:id="rId23"/>
     <p:sldId id="280" r:id="rId24"/>
+    <p:sldId id="283" r:id="rId25"/>
+    <p:sldId id="284" r:id="rId26"/>
+    <p:sldId id="285" r:id="rId27"/>
   </p:sldIdLst>
   <p:sldSz cx="12192000" cy="6858000"/>
   <p:notesSz cx="6858000" cy="9144000"/>
@@ -15518,6 +15521,382 @@
 </p:sld>
 </file>
 
+<file path=ppt/slides/slide24.xml><?xml version="1.0" encoding="utf-8"?>
+<p:sld xmlns:a="http://schemas.openxmlformats.org/drawingml/2006/main" xmlns:r="http://schemas.openxmlformats.org/officeDocument/2006/relationships" xmlns:p="http://schemas.openxmlformats.org/presentationml/2006/main">
+  <p:cSld>
+    <p:spTree>
+      <p:nvGrpSpPr>
+        <p:cNvPr id="1" name=""/>
+        <p:cNvGrpSpPr/>
+        <p:nvPr/>
+      </p:nvGrpSpPr>
+      <p:grpSpPr>
+        <a:xfrm>
+          <a:off x="0" y="0"/>
+          <a:ext cx="0" cy="0"/>
+          <a:chOff x="0" y="0"/>
+          <a:chExt cx="0" cy="0"/>
+        </a:xfrm>
+      </p:grpSpPr>
+      <p:sp>
+        <p:nvSpPr>
+          <p:cNvPr id="2" name="Title 1"/>
+          <p:cNvSpPr>
+            <a:spLocks noGrp="1"/>
+          </p:cNvSpPr>
+          <p:nvPr>
+            <p:ph type="title"/>
+          </p:nvPr>
+        </p:nvSpPr>
+        <p:spPr/>
+        <p:txBody>
+          <a:bodyPr/>
+          <a:lstStyle/>
+          <a:p>
+            <a:r>
+              <a:rPr lang="en-US" dirty="0" smtClean="0"/>
+              <a:t>Hands on exercise</a:t>
+            </a:r>
+            <a:endParaRPr lang="en-US" dirty="0"/>
+          </a:p>
+        </p:txBody>
+      </p:sp>
+      <p:sp>
+        <p:nvSpPr>
+          <p:cNvPr id="3" name="Content Placeholder 2"/>
+          <p:cNvSpPr>
+            <a:spLocks noGrp="1"/>
+          </p:cNvSpPr>
+          <p:nvPr>
+            <p:ph idx="1"/>
+          </p:nvPr>
+        </p:nvSpPr>
+        <p:spPr/>
+        <p:txBody>
+          <a:bodyPr/>
+          <a:lstStyle/>
+          <a:p>
+            <a:r>
+              <a:rPr lang="en-US" dirty="0" smtClean="0"/>
+              <a:t>Pair up with one or two people.</a:t>
+            </a:r>
+          </a:p>
+          <a:p>
+            <a:r>
+              <a:rPr lang="en-US" dirty="0" smtClean="0"/>
+              <a:t>One person should fork the repository from my GitHub</a:t>
+            </a:r>
+          </a:p>
+          <a:p>
+            <a:pPr lvl="1"/>
+            <a:r>
+              <a:rPr lang="en-US" dirty="0"/>
+              <a:t>https://</a:t>
+            </a:r>
+            <a:r>
+              <a:rPr lang="en-US" dirty="0" smtClean="0"/>
+              <a:t>github.com/StevePaytosh/git_session is where you can view the repo.</a:t>
+            </a:r>
+          </a:p>
+          <a:p>
+            <a:pPr lvl="1"/>
+            <a:r>
+              <a:rPr lang="en-US" dirty="0" smtClean="0"/>
+              <a:t>At the top right of the page, click fork. This will create your own copy of the repository.</a:t>
+            </a:r>
+          </a:p>
+          <a:p>
+            <a:pPr lvl="1"/>
+            <a:r>
+              <a:rPr lang="en-US" dirty="0" smtClean="0"/>
+              <a:t>Go to your copy of the repository on GitHub and in the top-middle area click settings.</a:t>
+            </a:r>
+          </a:p>
+          <a:p>
+            <a:pPr lvl="1"/>
+            <a:r>
+              <a:rPr lang="en-US" dirty="0" smtClean="0"/>
+              <a:t>Click collaborators and add your partners to the repository.</a:t>
+            </a:r>
+          </a:p>
+          <a:p>
+            <a:r>
+              <a:rPr lang="en-US" dirty="0" smtClean="0"/>
+              <a:t>Once everybody is added to the repository, clone of copy of it to your desktop from the app. </a:t>
+            </a:r>
+            <a:endParaRPr lang="en-US" dirty="0"/>
+          </a:p>
+        </p:txBody>
+      </p:sp>
+    </p:spTree>
+    <p:extLst>
+      <p:ext uri="{BB962C8B-B14F-4D97-AF65-F5344CB8AC3E}">
+        <p14:creationId xmlns:p14="http://schemas.microsoft.com/office/powerpoint/2010/main" val="2693296803"/>
+      </p:ext>
+    </p:extLst>
+  </p:cSld>
+  <p:clrMapOvr>
+    <a:masterClrMapping/>
+  </p:clrMapOvr>
+</p:sld>
+</file>
+
+<file path=ppt/slides/slide25.xml><?xml version="1.0" encoding="utf-8"?>
+<p:sld xmlns:a="http://schemas.openxmlformats.org/drawingml/2006/main" xmlns:r="http://schemas.openxmlformats.org/officeDocument/2006/relationships" xmlns:p="http://schemas.openxmlformats.org/presentationml/2006/main">
+  <p:cSld>
+    <p:spTree>
+      <p:nvGrpSpPr>
+        <p:cNvPr id="1" name=""/>
+        <p:cNvGrpSpPr/>
+        <p:nvPr/>
+      </p:nvGrpSpPr>
+      <p:grpSpPr>
+        <a:xfrm>
+          <a:off x="0" y="0"/>
+          <a:ext cx="0" cy="0"/>
+          <a:chOff x="0" y="0"/>
+          <a:chExt cx="0" cy="0"/>
+        </a:xfrm>
+      </p:grpSpPr>
+      <p:sp>
+        <p:nvSpPr>
+          <p:cNvPr id="2" name="Title 1"/>
+          <p:cNvSpPr>
+            <a:spLocks noGrp="1"/>
+          </p:cNvSpPr>
+          <p:nvPr>
+            <p:ph type="title"/>
+          </p:nvPr>
+        </p:nvSpPr>
+        <p:spPr/>
+        <p:txBody>
+          <a:bodyPr/>
+          <a:lstStyle/>
+          <a:p>
+            <a:r>
+              <a:rPr lang="en-US" dirty="0" smtClean="0"/>
+              <a:t>Hands on exercise</a:t>
+            </a:r>
+            <a:endParaRPr lang="en-US" dirty="0"/>
+          </a:p>
+        </p:txBody>
+      </p:sp>
+      <p:pic>
+        <p:nvPicPr>
+          <p:cNvPr id="4" name="Content Placeholder 3"/>
+          <p:cNvPicPr>
+            <a:picLocks noGrp="1" noChangeAspect="1"/>
+          </p:cNvPicPr>
+          <p:nvPr>
+            <p:ph idx="1"/>
+          </p:nvPr>
+        </p:nvPicPr>
+        <p:blipFill>
+          <a:blip r:embed="rId2">
+            <a:extLst>
+              <a:ext uri="{28A0092B-C50C-407E-A947-70E740481C1C}">
+                <a14:useLocalDpi xmlns:a14="http://schemas.microsoft.com/office/drawing/2010/main" val="0"/>
+              </a:ext>
+            </a:extLst>
+          </a:blip>
+          <a:stretch>
+            <a:fillRect/>
+          </a:stretch>
+        </p:blipFill>
+        <p:spPr>
+          <a:xfrm>
+            <a:off x="4889611" y="2405792"/>
+            <a:ext cx="5805524" cy="3416300"/>
+          </a:xfrm>
+        </p:spPr>
+      </p:pic>
+      <p:sp>
+        <p:nvSpPr>
+          <p:cNvPr id="5" name="TextBox 4"/>
+          <p:cNvSpPr txBox="1"/>
+          <p:nvPr/>
+        </p:nvSpPr>
+        <p:spPr>
+          <a:xfrm>
+            <a:off x="263611" y="2405792"/>
+            <a:ext cx="4291913" cy="923330"/>
+          </a:xfrm>
+          <a:prstGeom prst="rect">
+            <a:avLst/>
+          </a:prstGeom>
+          <a:noFill/>
+        </p:spPr>
+        <p:txBody>
+          <a:bodyPr wrap="square" rtlCol="0">
+            <a:spAutoFit/>
+          </a:bodyPr>
+          <a:lstStyle/>
+          <a:p>
+            <a:r>
+              <a:rPr lang="en-US" dirty="0" smtClean="0"/>
+              <a:t>In the </a:t>
+            </a:r>
+            <a:r>
+              <a:rPr lang="en-US" dirty="0" err="1" smtClean="0"/>
+              <a:t>github</a:t>
+            </a:r>
+            <a:r>
+              <a:rPr lang="en-US" dirty="0" smtClean="0"/>
+              <a:t> app, you can click the plus sign to clone a repository to your machine. </a:t>
+            </a:r>
+            <a:endParaRPr lang="en-US" dirty="0"/>
+          </a:p>
+        </p:txBody>
+      </p:sp>
+    </p:spTree>
+    <p:extLst>
+      <p:ext uri="{BB962C8B-B14F-4D97-AF65-F5344CB8AC3E}">
+        <p14:creationId xmlns:p14="http://schemas.microsoft.com/office/powerpoint/2010/main" val="4275405753"/>
+      </p:ext>
+    </p:extLst>
+  </p:cSld>
+  <p:clrMapOvr>
+    <a:masterClrMapping/>
+  </p:clrMapOvr>
+</p:sld>
+</file>
+
+<file path=ppt/slides/slide26.xml><?xml version="1.0" encoding="utf-8"?>
+<p:sld xmlns:a="http://schemas.openxmlformats.org/drawingml/2006/main" xmlns:r="http://schemas.openxmlformats.org/officeDocument/2006/relationships" xmlns:p="http://schemas.openxmlformats.org/presentationml/2006/main">
+  <p:cSld>
+    <p:spTree>
+      <p:nvGrpSpPr>
+        <p:cNvPr id="1" name=""/>
+        <p:cNvGrpSpPr/>
+        <p:nvPr/>
+      </p:nvGrpSpPr>
+      <p:grpSpPr>
+        <a:xfrm>
+          <a:off x="0" y="0"/>
+          <a:ext cx="0" cy="0"/>
+          <a:chOff x="0" y="0"/>
+          <a:chExt cx="0" cy="0"/>
+        </a:xfrm>
+      </p:grpSpPr>
+      <p:sp>
+        <p:nvSpPr>
+          <p:cNvPr id="2" name="Title 1"/>
+          <p:cNvSpPr>
+            <a:spLocks noGrp="1"/>
+          </p:cNvSpPr>
+          <p:nvPr>
+            <p:ph type="title"/>
+          </p:nvPr>
+        </p:nvSpPr>
+        <p:spPr/>
+        <p:txBody>
+          <a:bodyPr/>
+          <a:lstStyle/>
+          <a:p>
+            <a:r>
+              <a:rPr lang="en-US" dirty="0" smtClean="0"/>
+              <a:t>Hands on exercise</a:t>
+            </a:r>
+            <a:endParaRPr lang="en-US" dirty="0"/>
+          </a:p>
+        </p:txBody>
+      </p:sp>
+      <p:sp>
+        <p:nvSpPr>
+          <p:cNvPr id="3" name="Content Placeholder 2"/>
+          <p:cNvSpPr>
+            <a:spLocks noGrp="1"/>
+          </p:cNvSpPr>
+          <p:nvPr>
+            <p:ph idx="1"/>
+          </p:nvPr>
+        </p:nvSpPr>
+        <p:spPr/>
+        <p:txBody>
+          <a:bodyPr>
+            <a:normAutofit fontScale="92500" lnSpcReduction="20000"/>
+          </a:bodyPr>
+          <a:lstStyle/>
+          <a:p>
+            <a:r>
+              <a:rPr lang="en-US" dirty="0" smtClean="0"/>
+              <a:t>Once everybody has cloned the repository to their machine, they should open up the </a:t>
+            </a:r>
+            <a:r>
+              <a:rPr lang="en-US" dirty="0" err="1" smtClean="0"/>
+              <a:t>git</a:t>
+            </a:r>
+            <a:r>
+              <a:rPr lang="en-US" dirty="0" smtClean="0"/>
+              <a:t> shell by right clicking the name of the repository.</a:t>
+            </a:r>
+          </a:p>
+          <a:p>
+            <a:r>
+              <a:rPr lang="en-US" dirty="0" smtClean="0"/>
+              <a:t>The basic exercise will be for each team member to write an addition to the Princess Foo story. Each team member should switch to the </a:t>
+            </a:r>
+            <a:r>
+              <a:rPr lang="en-US" dirty="0" err="1" smtClean="0"/>
+              <a:t>princess_foo</a:t>
+            </a:r>
+            <a:r>
+              <a:rPr lang="en-US" dirty="0" smtClean="0"/>
+              <a:t> branch and then create their own branch. Immediately push your new branch to the remote repository.</a:t>
+            </a:r>
+          </a:p>
+          <a:p>
+            <a:r>
+              <a:rPr lang="en-US" dirty="0" smtClean="0"/>
+              <a:t>Write as much content and make the story take whatever turns you want. Avoid changing any existing content in the story until later. As a rule, commit and push after each paragraph.</a:t>
+            </a:r>
+          </a:p>
+          <a:p>
+            <a:r>
+              <a:rPr lang="en-US" dirty="0" smtClean="0"/>
+              <a:t>When you wish to finish the exercise, merge </a:t>
+            </a:r>
+            <a:r>
+              <a:rPr lang="en-US" dirty="0" err="1" smtClean="0"/>
+              <a:t>princess_foo</a:t>
+            </a:r>
+            <a:r>
+              <a:rPr lang="en-US" dirty="0" smtClean="0"/>
+              <a:t> into your branch. If you do not own the repository, create a pull request on GitHub to merge your branch into </a:t>
+            </a:r>
+            <a:r>
+              <a:rPr lang="en-US" dirty="0" err="1" smtClean="0"/>
+              <a:t>princess_foo</a:t>
+            </a:r>
+            <a:r>
+              <a:rPr lang="en-US" dirty="0" smtClean="0"/>
+              <a:t>. If you own the repository, simply merge your branch into </a:t>
+            </a:r>
+            <a:r>
+              <a:rPr lang="en-US" dirty="0" err="1" smtClean="0"/>
+              <a:t>princess_foo</a:t>
+            </a:r>
+            <a:r>
+              <a:rPr lang="en-US" dirty="0" smtClean="0"/>
+              <a:t>.</a:t>
+            </a:r>
+            <a:endParaRPr lang="en-US" dirty="0"/>
+          </a:p>
+        </p:txBody>
+      </p:sp>
+    </p:spTree>
+    <p:extLst>
+      <p:ext uri="{BB962C8B-B14F-4D97-AF65-F5344CB8AC3E}">
+        <p14:creationId xmlns:p14="http://schemas.microsoft.com/office/powerpoint/2010/main" val="1729923469"/>
+      </p:ext>
+    </p:extLst>
+  </p:cSld>
+  <p:clrMapOvr>
+    <a:masterClrMapping/>
+  </p:clrMapOvr>
+</p:sld>
+</file>
+
 <file path=ppt/slides/slide3.xml><?xml version="1.0" encoding="utf-8"?>
 <p:sld xmlns:a="http://schemas.openxmlformats.org/drawingml/2006/main" xmlns:r="http://schemas.openxmlformats.org/officeDocument/2006/relationships" xmlns:p="http://schemas.openxmlformats.org/presentationml/2006/main">
   <p:cSld>
@@ -15985,11 +16364,7 @@
             </a:r>
             <a:r>
               <a:rPr lang="en-US" dirty="0" smtClean="0"/>
-              <a:t> </a:t>
-            </a:r>
-            <a:r>
-              <a:rPr lang="en-US" dirty="0" smtClean="0"/>
-              <a:t>workflow, this should be frequently used before other commands.</a:t>
+              <a:t> workflow, this should be frequently used before other commands.</a:t>
             </a:r>
           </a:p>
           <a:p>

</xml_diff>